<commit_message>
Update git part 1
</commit_message>
<xml_diff>
--- a/git_course/1_basics/git_basic.pptx
+++ b/git_course/1_basics/git_basic.pptx
@@ -247,7 +247,7 @@
           <a:p>
             <a:fld id="{3BADDCAA-88FC-44D4-A91A-DD0530AB88E0}" type="datetimeFigureOut">
               <a:rPr lang="en-NL" smtClean="0"/>
-              <a:t>11/11/2024</a:t>
+              <a:t>13/11/2024</a:t>
             </a:fld>
             <a:endParaRPr lang="en-NL"/>
           </a:p>
@@ -1014,15 +1014,15 @@
             </a:r>
             <a:r>
               <a:rPr lang="nl-NL" dirty="0"/>
-              <a:t> </a:t>
-            </a:r>
-            <a:r>
-              <a:rPr lang="nl-NL" dirty="0" err="1"/>
-              <a:t>with</a:t>
+              <a:t> of </a:t>
+            </a:r>
+            <a:r>
+              <a:rPr lang="nl-NL"/>
+              <a:t>an </a:t>
             </a:r>
             <a:r>
               <a:rPr lang="nl-NL" dirty="0"/>
-              <a:t> update.</a:t>
+              <a:t>update.</a:t>
             </a:r>
           </a:p>
         </p:txBody>
@@ -4900,7 +4900,7 @@
           <a:p>
             <a:fld id="{0EBB069A-003F-4FC0-8534-236B0C5C7B5F}" type="datetimeFigureOut">
               <a:rPr lang="en-NL" smtClean="0"/>
-              <a:t>11/11/2024</a:t>
+              <a:t>13/11/2024</a:t>
             </a:fld>
             <a:endParaRPr lang="en-NL"/>
           </a:p>
@@ -5100,7 +5100,7 @@
           <a:p>
             <a:fld id="{0EBB069A-003F-4FC0-8534-236B0C5C7B5F}" type="datetimeFigureOut">
               <a:rPr lang="en-NL" smtClean="0"/>
-              <a:t>11/11/2024</a:t>
+              <a:t>13/11/2024</a:t>
             </a:fld>
             <a:endParaRPr lang="en-NL"/>
           </a:p>
@@ -5310,7 +5310,7 @@
           <a:p>
             <a:fld id="{0EBB069A-003F-4FC0-8534-236B0C5C7B5F}" type="datetimeFigureOut">
               <a:rPr lang="en-NL" smtClean="0"/>
-              <a:t>11/11/2024</a:t>
+              <a:t>13/11/2024</a:t>
             </a:fld>
             <a:endParaRPr lang="en-NL"/>
           </a:p>
@@ -5510,7 +5510,7 @@
           <a:p>
             <a:fld id="{0EBB069A-003F-4FC0-8534-236B0C5C7B5F}" type="datetimeFigureOut">
               <a:rPr lang="en-NL" smtClean="0"/>
-              <a:t>11/11/2024</a:t>
+              <a:t>13/11/2024</a:t>
             </a:fld>
             <a:endParaRPr lang="en-NL"/>
           </a:p>
@@ -5786,7 +5786,7 @@
           <a:p>
             <a:fld id="{0EBB069A-003F-4FC0-8534-236B0C5C7B5F}" type="datetimeFigureOut">
               <a:rPr lang="en-NL" smtClean="0"/>
-              <a:t>11/11/2024</a:t>
+              <a:t>13/11/2024</a:t>
             </a:fld>
             <a:endParaRPr lang="en-NL"/>
           </a:p>
@@ -6054,7 +6054,7 @@
           <a:p>
             <a:fld id="{0EBB069A-003F-4FC0-8534-236B0C5C7B5F}" type="datetimeFigureOut">
               <a:rPr lang="en-NL" smtClean="0"/>
-              <a:t>11/11/2024</a:t>
+              <a:t>13/11/2024</a:t>
             </a:fld>
             <a:endParaRPr lang="en-NL"/>
           </a:p>
@@ -6469,7 +6469,7 @@
           <a:p>
             <a:fld id="{0EBB069A-003F-4FC0-8534-236B0C5C7B5F}" type="datetimeFigureOut">
               <a:rPr lang="en-NL" smtClean="0"/>
-              <a:t>11/11/2024</a:t>
+              <a:t>13/11/2024</a:t>
             </a:fld>
             <a:endParaRPr lang="en-NL"/>
           </a:p>
@@ -6611,7 +6611,7 @@
           <a:p>
             <a:fld id="{0EBB069A-003F-4FC0-8534-236B0C5C7B5F}" type="datetimeFigureOut">
               <a:rPr lang="en-NL" smtClean="0"/>
-              <a:t>11/11/2024</a:t>
+              <a:t>13/11/2024</a:t>
             </a:fld>
             <a:endParaRPr lang="en-NL"/>
           </a:p>
@@ -6724,7 +6724,7 @@
           <a:p>
             <a:fld id="{0EBB069A-003F-4FC0-8534-236B0C5C7B5F}" type="datetimeFigureOut">
               <a:rPr lang="en-NL" smtClean="0"/>
-              <a:t>11/11/2024</a:t>
+              <a:t>13/11/2024</a:t>
             </a:fld>
             <a:endParaRPr lang="en-NL"/>
           </a:p>
@@ -7037,7 +7037,7 @@
           <a:p>
             <a:fld id="{0EBB069A-003F-4FC0-8534-236B0C5C7B5F}" type="datetimeFigureOut">
               <a:rPr lang="en-NL" smtClean="0"/>
-              <a:t>11/11/2024</a:t>
+              <a:t>13/11/2024</a:t>
             </a:fld>
             <a:endParaRPr lang="en-NL"/>
           </a:p>
@@ -7326,7 +7326,7 @@
           <a:p>
             <a:fld id="{0EBB069A-003F-4FC0-8534-236B0C5C7B5F}" type="datetimeFigureOut">
               <a:rPr lang="en-NL" smtClean="0"/>
-              <a:t>11/11/2024</a:t>
+              <a:t>13/11/2024</a:t>
             </a:fld>
             <a:endParaRPr lang="en-NL"/>
           </a:p>
@@ -7569,7 +7569,7 @@
           <a:p>
             <a:fld id="{0EBB069A-003F-4FC0-8534-236B0C5C7B5F}" type="datetimeFigureOut">
               <a:rPr lang="en-NL" smtClean="0"/>
-              <a:t>11/11/2024</a:t>
+              <a:t>13/11/2024</a:t>
             </a:fld>
             <a:endParaRPr lang="en-NL"/>
           </a:p>

</xml_diff>

<commit_message>
Update git part 2
</commit_message>
<xml_diff>
--- a/git_course/1_basics/git_basic.pptx
+++ b/git_course/1_basics/git_basic.pptx
@@ -5,7 +5,7 @@
     <p:sldMasterId id="2147483648" r:id="rId1"/>
   </p:sldMasterIdLst>
   <p:notesMasterIdLst>
-    <p:notesMasterId r:id="rId53"/>
+    <p:notesMasterId r:id="rId62"/>
   </p:notesMasterIdLst>
   <p:sldIdLst>
     <p:sldId id="256" r:id="rId2"/>
@@ -59,6 +59,15 @@
     <p:sldId id="412" r:id="rId50"/>
     <p:sldId id="413" r:id="rId51"/>
     <p:sldId id="414" r:id="rId52"/>
+    <p:sldId id="416" r:id="rId53"/>
+    <p:sldId id="415" r:id="rId54"/>
+    <p:sldId id="417" r:id="rId55"/>
+    <p:sldId id="419" r:id="rId56"/>
+    <p:sldId id="420" r:id="rId57"/>
+    <p:sldId id="421" r:id="rId58"/>
+    <p:sldId id="422" r:id="rId59"/>
+    <p:sldId id="423" r:id="rId60"/>
+    <p:sldId id="424" r:id="rId61"/>
   </p:sldIdLst>
   <p:sldSz cx="12192000" cy="6858000"/>
   <p:notesSz cx="6858000" cy="9144000"/>
@@ -247,7 +256,7 @@
           <a:p>
             <a:fld id="{3BADDCAA-88FC-44D4-A91A-DD0530AB88E0}" type="datetimeFigureOut">
               <a:rPr lang="en-NL" smtClean="0"/>
-              <a:t>19/11/2024</a:t>
+              <a:t>20/11/2024</a:t>
             </a:fld>
             <a:endParaRPr lang="en-NL"/>
           </a:p>
@@ -4909,6 +4918,594 @@
 </p:notes>
 </file>
 
+<file path=ppt/notesSlides/notesSlide45.xml><?xml version="1.0" encoding="utf-8"?>
+<p:notes xmlns:a="http://schemas.openxmlformats.org/drawingml/2006/main" xmlns:r="http://schemas.openxmlformats.org/officeDocument/2006/relationships" xmlns:p="http://schemas.openxmlformats.org/presentationml/2006/main">
+  <p:cSld>
+    <p:spTree>
+      <p:nvGrpSpPr>
+        <p:cNvPr id="1" name="">
+          <a:extLst>
+            <a:ext uri="{FF2B5EF4-FFF2-40B4-BE49-F238E27FC236}">
+              <a16:creationId xmlns:a16="http://schemas.microsoft.com/office/drawing/2014/main" id="{2AC9C3C4-26A4-B8A6-7FA3-84A51E6D1AD4}"/>
+            </a:ext>
+          </a:extLst>
+        </p:cNvPr>
+        <p:cNvGrpSpPr/>
+        <p:nvPr/>
+      </p:nvGrpSpPr>
+      <p:grpSpPr>
+        <a:xfrm>
+          <a:off x="0" y="0"/>
+          <a:ext cx="0" cy="0"/>
+          <a:chOff x="0" y="0"/>
+          <a:chExt cx="0" cy="0"/>
+        </a:xfrm>
+      </p:grpSpPr>
+      <p:sp>
+        <p:nvSpPr>
+          <p:cNvPr id="2" name="Slide Image Placeholder 1">
+            <a:extLst>
+              <a:ext uri="{FF2B5EF4-FFF2-40B4-BE49-F238E27FC236}">
+                <a16:creationId xmlns:a16="http://schemas.microsoft.com/office/drawing/2014/main" id="{69B8D984-5B37-8E22-79E8-43882E977613}"/>
+              </a:ext>
+            </a:extLst>
+          </p:cNvPr>
+          <p:cNvSpPr>
+            <a:spLocks noGrp="1" noRot="1" noChangeAspect="1"/>
+          </p:cNvSpPr>
+          <p:nvPr>
+            <p:ph type="sldImg"/>
+          </p:nvPr>
+        </p:nvSpPr>
+        <p:spPr/>
+      </p:sp>
+      <p:sp>
+        <p:nvSpPr>
+          <p:cNvPr id="3" name="Notes Placeholder 2">
+            <a:extLst>
+              <a:ext uri="{FF2B5EF4-FFF2-40B4-BE49-F238E27FC236}">
+                <a16:creationId xmlns:a16="http://schemas.microsoft.com/office/drawing/2014/main" id="{7FA61004-01B9-B253-9D31-AD58DD992EC6}"/>
+              </a:ext>
+            </a:extLst>
+          </p:cNvPr>
+          <p:cNvSpPr>
+            <a:spLocks noGrp="1"/>
+          </p:cNvSpPr>
+          <p:nvPr>
+            <p:ph type="body" idx="1"/>
+          </p:nvPr>
+        </p:nvSpPr>
+        <p:spPr/>
+        <p:txBody>
+          <a:bodyPr/>
+          <a:lstStyle/>
+          <a:p>
+            <a:endParaRPr lang="nl-NL" dirty="0"/>
+          </a:p>
+        </p:txBody>
+      </p:sp>
+      <p:sp>
+        <p:nvSpPr>
+          <p:cNvPr id="4" name="Slide Number Placeholder 3">
+            <a:extLst>
+              <a:ext uri="{FF2B5EF4-FFF2-40B4-BE49-F238E27FC236}">
+                <a16:creationId xmlns:a16="http://schemas.microsoft.com/office/drawing/2014/main" id="{2D2CCE51-4DAA-DB45-27B4-8BECFCBD32F9}"/>
+              </a:ext>
+            </a:extLst>
+          </p:cNvPr>
+          <p:cNvSpPr>
+            <a:spLocks noGrp="1"/>
+          </p:cNvSpPr>
+          <p:nvPr>
+            <p:ph type="sldNum" sz="quarter" idx="5"/>
+          </p:nvPr>
+        </p:nvSpPr>
+        <p:spPr/>
+        <p:txBody>
+          <a:bodyPr/>
+          <a:lstStyle/>
+          <a:p>
+            <a:fld id="{9583DEA5-E342-4DB2-B087-D0B9C490B19E}" type="slidenum">
+              <a:rPr lang="nl-NL" smtClean="0"/>
+              <a:t>53</a:t>
+            </a:fld>
+            <a:endParaRPr lang="nl-NL"/>
+          </a:p>
+        </p:txBody>
+      </p:sp>
+    </p:spTree>
+    <p:extLst>
+      <p:ext uri="{BB962C8B-B14F-4D97-AF65-F5344CB8AC3E}">
+        <p14:creationId xmlns:p14="http://schemas.microsoft.com/office/powerpoint/2010/main" val="1917489426"/>
+      </p:ext>
+    </p:extLst>
+  </p:cSld>
+  <p:clrMapOvr>
+    <a:masterClrMapping/>
+  </p:clrMapOvr>
+</p:notes>
+</file>
+
+<file path=ppt/notesSlides/notesSlide46.xml><?xml version="1.0" encoding="utf-8"?>
+<p:notes xmlns:a="http://schemas.openxmlformats.org/drawingml/2006/main" xmlns:r="http://schemas.openxmlformats.org/officeDocument/2006/relationships" xmlns:p="http://schemas.openxmlformats.org/presentationml/2006/main">
+  <p:cSld>
+    <p:spTree>
+      <p:nvGrpSpPr>
+        <p:cNvPr id="1" name="">
+          <a:extLst>
+            <a:ext uri="{FF2B5EF4-FFF2-40B4-BE49-F238E27FC236}">
+              <a16:creationId xmlns:a16="http://schemas.microsoft.com/office/drawing/2014/main" id="{708FE4F3-54F2-8358-496D-C3D406C9BA31}"/>
+            </a:ext>
+          </a:extLst>
+        </p:cNvPr>
+        <p:cNvGrpSpPr/>
+        <p:nvPr/>
+      </p:nvGrpSpPr>
+      <p:grpSpPr>
+        <a:xfrm>
+          <a:off x="0" y="0"/>
+          <a:ext cx="0" cy="0"/>
+          <a:chOff x="0" y="0"/>
+          <a:chExt cx="0" cy="0"/>
+        </a:xfrm>
+      </p:grpSpPr>
+      <p:sp>
+        <p:nvSpPr>
+          <p:cNvPr id="2" name="Slide Image Placeholder 1">
+            <a:extLst>
+              <a:ext uri="{FF2B5EF4-FFF2-40B4-BE49-F238E27FC236}">
+                <a16:creationId xmlns:a16="http://schemas.microsoft.com/office/drawing/2014/main" id="{607ACB25-F7B5-0814-71C9-9724E8DD5138}"/>
+              </a:ext>
+            </a:extLst>
+          </p:cNvPr>
+          <p:cNvSpPr>
+            <a:spLocks noGrp="1" noRot="1" noChangeAspect="1"/>
+          </p:cNvSpPr>
+          <p:nvPr>
+            <p:ph type="sldImg"/>
+          </p:nvPr>
+        </p:nvSpPr>
+        <p:spPr/>
+      </p:sp>
+      <p:sp>
+        <p:nvSpPr>
+          <p:cNvPr id="3" name="Notes Placeholder 2">
+            <a:extLst>
+              <a:ext uri="{FF2B5EF4-FFF2-40B4-BE49-F238E27FC236}">
+                <a16:creationId xmlns:a16="http://schemas.microsoft.com/office/drawing/2014/main" id="{D76DC027-A5CE-614B-9DA1-34732408898E}"/>
+              </a:ext>
+            </a:extLst>
+          </p:cNvPr>
+          <p:cNvSpPr>
+            <a:spLocks noGrp="1"/>
+          </p:cNvSpPr>
+          <p:nvPr>
+            <p:ph type="body" idx="1"/>
+          </p:nvPr>
+        </p:nvSpPr>
+        <p:spPr/>
+        <p:txBody>
+          <a:bodyPr/>
+          <a:lstStyle/>
+          <a:p>
+            <a:endParaRPr lang="nl-NL" dirty="0"/>
+          </a:p>
+        </p:txBody>
+      </p:sp>
+      <p:sp>
+        <p:nvSpPr>
+          <p:cNvPr id="4" name="Slide Number Placeholder 3">
+            <a:extLst>
+              <a:ext uri="{FF2B5EF4-FFF2-40B4-BE49-F238E27FC236}">
+                <a16:creationId xmlns:a16="http://schemas.microsoft.com/office/drawing/2014/main" id="{61EB8D9E-FDF3-CA26-2939-F0F933252717}"/>
+              </a:ext>
+            </a:extLst>
+          </p:cNvPr>
+          <p:cNvSpPr>
+            <a:spLocks noGrp="1"/>
+          </p:cNvSpPr>
+          <p:nvPr>
+            <p:ph type="sldNum" sz="quarter" idx="5"/>
+          </p:nvPr>
+        </p:nvSpPr>
+        <p:spPr/>
+        <p:txBody>
+          <a:bodyPr/>
+          <a:lstStyle/>
+          <a:p>
+            <a:fld id="{9583DEA5-E342-4DB2-B087-D0B9C490B19E}" type="slidenum">
+              <a:rPr lang="nl-NL" smtClean="0"/>
+              <a:t>54</a:t>
+            </a:fld>
+            <a:endParaRPr lang="nl-NL"/>
+          </a:p>
+        </p:txBody>
+      </p:sp>
+    </p:spTree>
+    <p:extLst>
+      <p:ext uri="{BB962C8B-B14F-4D97-AF65-F5344CB8AC3E}">
+        <p14:creationId xmlns:p14="http://schemas.microsoft.com/office/powerpoint/2010/main" val="4138850565"/>
+      </p:ext>
+    </p:extLst>
+  </p:cSld>
+  <p:clrMapOvr>
+    <a:masterClrMapping/>
+  </p:clrMapOvr>
+</p:notes>
+</file>
+
+<file path=ppt/notesSlides/notesSlide47.xml><?xml version="1.0" encoding="utf-8"?>
+<p:notes xmlns:a="http://schemas.openxmlformats.org/drawingml/2006/main" xmlns:r="http://schemas.openxmlformats.org/officeDocument/2006/relationships" xmlns:p="http://schemas.openxmlformats.org/presentationml/2006/main">
+  <p:cSld>
+    <p:spTree>
+      <p:nvGrpSpPr>
+        <p:cNvPr id="1" name="">
+          <a:extLst>
+            <a:ext uri="{FF2B5EF4-FFF2-40B4-BE49-F238E27FC236}">
+              <a16:creationId xmlns:a16="http://schemas.microsoft.com/office/drawing/2014/main" id="{2A853B62-0F0A-6883-7A69-B4C73570F7A6}"/>
+            </a:ext>
+          </a:extLst>
+        </p:cNvPr>
+        <p:cNvGrpSpPr/>
+        <p:nvPr/>
+      </p:nvGrpSpPr>
+      <p:grpSpPr>
+        <a:xfrm>
+          <a:off x="0" y="0"/>
+          <a:ext cx="0" cy="0"/>
+          <a:chOff x="0" y="0"/>
+          <a:chExt cx="0" cy="0"/>
+        </a:xfrm>
+      </p:grpSpPr>
+      <p:sp>
+        <p:nvSpPr>
+          <p:cNvPr id="2" name="Slide Image Placeholder 1">
+            <a:extLst>
+              <a:ext uri="{FF2B5EF4-FFF2-40B4-BE49-F238E27FC236}">
+                <a16:creationId xmlns:a16="http://schemas.microsoft.com/office/drawing/2014/main" id="{6716188C-3FE9-1F4C-D309-DA16E78B425E}"/>
+              </a:ext>
+            </a:extLst>
+          </p:cNvPr>
+          <p:cNvSpPr>
+            <a:spLocks noGrp="1" noRot="1" noChangeAspect="1"/>
+          </p:cNvSpPr>
+          <p:nvPr>
+            <p:ph type="sldImg"/>
+          </p:nvPr>
+        </p:nvSpPr>
+        <p:spPr/>
+      </p:sp>
+      <p:sp>
+        <p:nvSpPr>
+          <p:cNvPr id="3" name="Notes Placeholder 2">
+            <a:extLst>
+              <a:ext uri="{FF2B5EF4-FFF2-40B4-BE49-F238E27FC236}">
+                <a16:creationId xmlns:a16="http://schemas.microsoft.com/office/drawing/2014/main" id="{31E29A67-2B6E-BC06-108A-FF9E514EA4D5}"/>
+              </a:ext>
+            </a:extLst>
+          </p:cNvPr>
+          <p:cNvSpPr>
+            <a:spLocks noGrp="1"/>
+          </p:cNvSpPr>
+          <p:nvPr>
+            <p:ph type="body" idx="1"/>
+          </p:nvPr>
+        </p:nvSpPr>
+        <p:spPr/>
+        <p:txBody>
+          <a:bodyPr/>
+          <a:lstStyle/>
+          <a:p>
+            <a:r>
+              <a:rPr lang="nl-NL" dirty="0"/>
+              <a:t>Demo: </a:t>
+            </a:r>
+            <a:r>
+              <a:rPr lang="nl-NL" dirty="0" err="1"/>
+              <a:t>merge</a:t>
+            </a:r>
+            <a:r>
+              <a:rPr lang="nl-NL" dirty="0"/>
+              <a:t> </a:t>
+            </a:r>
+            <a:r>
+              <a:rPr lang="nl-NL" dirty="0" err="1"/>
+              <a:t>conflicts</a:t>
+            </a:r>
+            <a:endParaRPr lang="nl-NL" dirty="0"/>
+          </a:p>
+        </p:txBody>
+      </p:sp>
+      <p:sp>
+        <p:nvSpPr>
+          <p:cNvPr id="4" name="Slide Number Placeholder 3">
+            <a:extLst>
+              <a:ext uri="{FF2B5EF4-FFF2-40B4-BE49-F238E27FC236}">
+                <a16:creationId xmlns:a16="http://schemas.microsoft.com/office/drawing/2014/main" id="{69CFF6B3-B322-BE54-509E-EF2190EAFD75}"/>
+              </a:ext>
+            </a:extLst>
+          </p:cNvPr>
+          <p:cNvSpPr>
+            <a:spLocks noGrp="1"/>
+          </p:cNvSpPr>
+          <p:nvPr>
+            <p:ph type="sldNum" sz="quarter" idx="5"/>
+          </p:nvPr>
+        </p:nvSpPr>
+        <p:spPr/>
+        <p:txBody>
+          <a:bodyPr/>
+          <a:lstStyle/>
+          <a:p>
+            <a:fld id="{9583DEA5-E342-4DB2-B087-D0B9C490B19E}" type="slidenum">
+              <a:rPr lang="nl-NL" smtClean="0"/>
+              <a:t>55</a:t>
+            </a:fld>
+            <a:endParaRPr lang="nl-NL"/>
+          </a:p>
+        </p:txBody>
+      </p:sp>
+    </p:spTree>
+    <p:extLst>
+      <p:ext uri="{BB962C8B-B14F-4D97-AF65-F5344CB8AC3E}">
+        <p14:creationId xmlns:p14="http://schemas.microsoft.com/office/powerpoint/2010/main" val="2798171829"/>
+      </p:ext>
+    </p:extLst>
+  </p:cSld>
+  <p:clrMapOvr>
+    <a:masterClrMapping/>
+  </p:clrMapOvr>
+</p:notes>
+</file>
+
+<file path=ppt/notesSlides/notesSlide48.xml><?xml version="1.0" encoding="utf-8"?>
+<p:notes xmlns:a="http://schemas.openxmlformats.org/drawingml/2006/main" xmlns:r="http://schemas.openxmlformats.org/officeDocument/2006/relationships" xmlns:p="http://schemas.openxmlformats.org/presentationml/2006/main">
+  <p:cSld>
+    <p:spTree>
+      <p:nvGrpSpPr>
+        <p:cNvPr id="1" name="">
+          <a:extLst>
+            <a:ext uri="{FF2B5EF4-FFF2-40B4-BE49-F238E27FC236}">
+              <a16:creationId xmlns:a16="http://schemas.microsoft.com/office/drawing/2014/main" id="{5E6829EE-54E0-529B-AEE5-417B1BC4E512}"/>
+            </a:ext>
+          </a:extLst>
+        </p:cNvPr>
+        <p:cNvGrpSpPr/>
+        <p:nvPr/>
+      </p:nvGrpSpPr>
+      <p:grpSpPr>
+        <a:xfrm>
+          <a:off x="0" y="0"/>
+          <a:ext cx="0" cy="0"/>
+          <a:chOff x="0" y="0"/>
+          <a:chExt cx="0" cy="0"/>
+        </a:xfrm>
+      </p:grpSpPr>
+      <p:sp>
+        <p:nvSpPr>
+          <p:cNvPr id="2" name="Slide Image Placeholder 1">
+            <a:extLst>
+              <a:ext uri="{FF2B5EF4-FFF2-40B4-BE49-F238E27FC236}">
+                <a16:creationId xmlns:a16="http://schemas.microsoft.com/office/drawing/2014/main" id="{85DF5601-40DC-00AF-48E4-683C0907541B}"/>
+              </a:ext>
+            </a:extLst>
+          </p:cNvPr>
+          <p:cNvSpPr>
+            <a:spLocks noGrp="1" noRot="1" noChangeAspect="1"/>
+          </p:cNvSpPr>
+          <p:nvPr>
+            <p:ph type="sldImg"/>
+          </p:nvPr>
+        </p:nvSpPr>
+        <p:spPr/>
+      </p:sp>
+      <p:sp>
+        <p:nvSpPr>
+          <p:cNvPr id="3" name="Notes Placeholder 2">
+            <a:extLst>
+              <a:ext uri="{FF2B5EF4-FFF2-40B4-BE49-F238E27FC236}">
+                <a16:creationId xmlns:a16="http://schemas.microsoft.com/office/drawing/2014/main" id="{D51B1CC6-6B66-4298-947B-B155441DB147}"/>
+              </a:ext>
+            </a:extLst>
+          </p:cNvPr>
+          <p:cNvSpPr>
+            <a:spLocks noGrp="1"/>
+          </p:cNvSpPr>
+          <p:nvPr>
+            <p:ph type="body" idx="1"/>
+          </p:nvPr>
+        </p:nvSpPr>
+        <p:spPr/>
+        <p:txBody>
+          <a:bodyPr/>
+          <a:lstStyle/>
+          <a:p>
+            <a:r>
+              <a:rPr lang="nl-NL" dirty="0"/>
+              <a:t>Demo: </a:t>
+            </a:r>
+            <a:r>
+              <a:rPr lang="nl-NL" dirty="0" err="1"/>
+              <a:t>merge</a:t>
+            </a:r>
+            <a:r>
+              <a:rPr lang="nl-NL" dirty="0"/>
+              <a:t> </a:t>
+            </a:r>
+            <a:r>
+              <a:rPr lang="nl-NL" dirty="0" err="1"/>
+              <a:t>conflicts</a:t>
+            </a:r>
+            <a:endParaRPr lang="nl-NL" dirty="0"/>
+          </a:p>
+        </p:txBody>
+      </p:sp>
+      <p:sp>
+        <p:nvSpPr>
+          <p:cNvPr id="4" name="Slide Number Placeholder 3">
+            <a:extLst>
+              <a:ext uri="{FF2B5EF4-FFF2-40B4-BE49-F238E27FC236}">
+                <a16:creationId xmlns:a16="http://schemas.microsoft.com/office/drawing/2014/main" id="{E278DCD5-EC33-941E-1A0E-660ADF0A5920}"/>
+              </a:ext>
+            </a:extLst>
+          </p:cNvPr>
+          <p:cNvSpPr>
+            <a:spLocks noGrp="1"/>
+          </p:cNvSpPr>
+          <p:nvPr>
+            <p:ph type="sldNum" sz="quarter" idx="5"/>
+          </p:nvPr>
+        </p:nvSpPr>
+        <p:spPr/>
+        <p:txBody>
+          <a:bodyPr/>
+          <a:lstStyle/>
+          <a:p>
+            <a:fld id="{9583DEA5-E342-4DB2-B087-D0B9C490B19E}" type="slidenum">
+              <a:rPr lang="nl-NL" smtClean="0"/>
+              <a:t>56</a:t>
+            </a:fld>
+            <a:endParaRPr lang="nl-NL"/>
+          </a:p>
+        </p:txBody>
+      </p:sp>
+    </p:spTree>
+    <p:extLst>
+      <p:ext uri="{BB962C8B-B14F-4D97-AF65-F5344CB8AC3E}">
+        <p14:creationId xmlns:p14="http://schemas.microsoft.com/office/powerpoint/2010/main" val="2266726284"/>
+      </p:ext>
+    </p:extLst>
+  </p:cSld>
+  <p:clrMapOvr>
+    <a:masterClrMapping/>
+  </p:clrMapOvr>
+</p:notes>
+</file>
+
+<file path=ppt/notesSlides/notesSlide49.xml><?xml version="1.0" encoding="utf-8"?>
+<p:notes xmlns:a="http://schemas.openxmlformats.org/drawingml/2006/main" xmlns:r="http://schemas.openxmlformats.org/officeDocument/2006/relationships" xmlns:p="http://schemas.openxmlformats.org/presentationml/2006/main">
+  <p:cSld>
+    <p:spTree>
+      <p:nvGrpSpPr>
+        <p:cNvPr id="1" name="">
+          <a:extLst>
+            <a:ext uri="{FF2B5EF4-FFF2-40B4-BE49-F238E27FC236}">
+              <a16:creationId xmlns:a16="http://schemas.microsoft.com/office/drawing/2014/main" id="{2F72A247-01CC-E0C7-C062-6D1F31076EE7}"/>
+            </a:ext>
+          </a:extLst>
+        </p:cNvPr>
+        <p:cNvGrpSpPr/>
+        <p:nvPr/>
+      </p:nvGrpSpPr>
+      <p:grpSpPr>
+        <a:xfrm>
+          <a:off x="0" y="0"/>
+          <a:ext cx="0" cy="0"/>
+          <a:chOff x="0" y="0"/>
+          <a:chExt cx="0" cy="0"/>
+        </a:xfrm>
+      </p:grpSpPr>
+      <p:sp>
+        <p:nvSpPr>
+          <p:cNvPr id="2" name="Slide Image Placeholder 1">
+            <a:extLst>
+              <a:ext uri="{FF2B5EF4-FFF2-40B4-BE49-F238E27FC236}">
+                <a16:creationId xmlns:a16="http://schemas.microsoft.com/office/drawing/2014/main" id="{777EC35E-64B1-12E8-C2CC-3571D807B7AB}"/>
+              </a:ext>
+            </a:extLst>
+          </p:cNvPr>
+          <p:cNvSpPr>
+            <a:spLocks noGrp="1" noRot="1" noChangeAspect="1"/>
+          </p:cNvSpPr>
+          <p:nvPr>
+            <p:ph type="sldImg"/>
+          </p:nvPr>
+        </p:nvSpPr>
+        <p:spPr/>
+      </p:sp>
+      <p:sp>
+        <p:nvSpPr>
+          <p:cNvPr id="3" name="Notes Placeholder 2">
+            <a:extLst>
+              <a:ext uri="{FF2B5EF4-FFF2-40B4-BE49-F238E27FC236}">
+                <a16:creationId xmlns:a16="http://schemas.microsoft.com/office/drawing/2014/main" id="{9910FCFC-BB1B-0B1F-1A84-CC66E360900B}"/>
+              </a:ext>
+            </a:extLst>
+          </p:cNvPr>
+          <p:cNvSpPr>
+            <a:spLocks noGrp="1"/>
+          </p:cNvSpPr>
+          <p:nvPr>
+            <p:ph type="body" idx="1"/>
+          </p:nvPr>
+        </p:nvSpPr>
+        <p:spPr/>
+        <p:txBody>
+          <a:bodyPr/>
+          <a:lstStyle/>
+          <a:p>
+            <a:r>
+              <a:rPr lang="nl-NL" dirty="0"/>
+              <a:t>Demo: </a:t>
+            </a:r>
+            <a:r>
+              <a:rPr lang="nl-NL" dirty="0" err="1"/>
+              <a:t>merge</a:t>
+            </a:r>
+            <a:r>
+              <a:rPr lang="nl-NL" dirty="0"/>
+              <a:t> </a:t>
+            </a:r>
+            <a:r>
+              <a:rPr lang="nl-NL" dirty="0" err="1"/>
+              <a:t>conflicts</a:t>
+            </a:r>
+            <a:endParaRPr lang="nl-NL" dirty="0"/>
+          </a:p>
+        </p:txBody>
+      </p:sp>
+      <p:sp>
+        <p:nvSpPr>
+          <p:cNvPr id="4" name="Slide Number Placeholder 3">
+            <a:extLst>
+              <a:ext uri="{FF2B5EF4-FFF2-40B4-BE49-F238E27FC236}">
+                <a16:creationId xmlns:a16="http://schemas.microsoft.com/office/drawing/2014/main" id="{E0066C72-3603-3B87-E709-207F91DD2B91}"/>
+              </a:ext>
+            </a:extLst>
+          </p:cNvPr>
+          <p:cNvSpPr>
+            <a:spLocks noGrp="1"/>
+          </p:cNvSpPr>
+          <p:nvPr>
+            <p:ph type="sldNum" sz="quarter" idx="5"/>
+          </p:nvPr>
+        </p:nvSpPr>
+        <p:spPr/>
+        <p:txBody>
+          <a:bodyPr/>
+          <a:lstStyle/>
+          <a:p>
+            <a:fld id="{9583DEA5-E342-4DB2-B087-D0B9C490B19E}" type="slidenum">
+              <a:rPr lang="nl-NL" smtClean="0"/>
+              <a:t>57</a:t>
+            </a:fld>
+            <a:endParaRPr lang="nl-NL"/>
+          </a:p>
+        </p:txBody>
+      </p:sp>
+    </p:spTree>
+    <p:extLst>
+      <p:ext uri="{BB962C8B-B14F-4D97-AF65-F5344CB8AC3E}">
+        <p14:creationId xmlns:p14="http://schemas.microsoft.com/office/powerpoint/2010/main" val="2302792869"/>
+      </p:ext>
+    </p:extLst>
+  </p:cSld>
+  <p:clrMapOvr>
+    <a:masterClrMapping/>
+  </p:clrMapOvr>
+</p:notes>
+</file>
+
 <file path=ppt/notesSlides/notesSlide5.xml><?xml version="1.0" encoding="utf-8"?>
 <p:notes xmlns:a="http://schemas.openxmlformats.org/drawingml/2006/main" xmlns:r="http://schemas.openxmlformats.org/officeDocument/2006/relationships" xmlns:p="http://schemas.openxmlformats.org/presentationml/2006/main">
   <p:cSld>
@@ -5044,6 +5641,238 @@
     <p:extLst>
       <p:ext uri="{BB962C8B-B14F-4D97-AF65-F5344CB8AC3E}">
         <p14:creationId xmlns:p14="http://schemas.microsoft.com/office/powerpoint/2010/main" val="1368150738"/>
+      </p:ext>
+    </p:extLst>
+  </p:cSld>
+  <p:clrMapOvr>
+    <a:masterClrMapping/>
+  </p:clrMapOvr>
+</p:notes>
+</file>
+
+<file path=ppt/notesSlides/notesSlide50.xml><?xml version="1.0" encoding="utf-8"?>
+<p:notes xmlns:a="http://schemas.openxmlformats.org/drawingml/2006/main" xmlns:r="http://schemas.openxmlformats.org/officeDocument/2006/relationships" xmlns:p="http://schemas.openxmlformats.org/presentationml/2006/main">
+  <p:cSld>
+    <p:spTree>
+      <p:nvGrpSpPr>
+        <p:cNvPr id="1" name="">
+          <a:extLst>
+            <a:ext uri="{FF2B5EF4-FFF2-40B4-BE49-F238E27FC236}">
+              <a16:creationId xmlns:a16="http://schemas.microsoft.com/office/drawing/2014/main" id="{04C4B9DE-F720-EE06-9D4B-002747945290}"/>
+            </a:ext>
+          </a:extLst>
+        </p:cNvPr>
+        <p:cNvGrpSpPr/>
+        <p:nvPr/>
+      </p:nvGrpSpPr>
+      <p:grpSpPr>
+        <a:xfrm>
+          <a:off x="0" y="0"/>
+          <a:ext cx="0" cy="0"/>
+          <a:chOff x="0" y="0"/>
+          <a:chExt cx="0" cy="0"/>
+        </a:xfrm>
+      </p:grpSpPr>
+      <p:sp>
+        <p:nvSpPr>
+          <p:cNvPr id="2" name="Slide Image Placeholder 1">
+            <a:extLst>
+              <a:ext uri="{FF2B5EF4-FFF2-40B4-BE49-F238E27FC236}">
+                <a16:creationId xmlns:a16="http://schemas.microsoft.com/office/drawing/2014/main" id="{9635F701-DF39-0EB6-4C2D-FC35CDB075F7}"/>
+              </a:ext>
+            </a:extLst>
+          </p:cNvPr>
+          <p:cNvSpPr>
+            <a:spLocks noGrp="1" noRot="1" noChangeAspect="1"/>
+          </p:cNvSpPr>
+          <p:nvPr>
+            <p:ph type="sldImg"/>
+          </p:nvPr>
+        </p:nvSpPr>
+        <p:spPr/>
+      </p:sp>
+      <p:sp>
+        <p:nvSpPr>
+          <p:cNvPr id="3" name="Notes Placeholder 2">
+            <a:extLst>
+              <a:ext uri="{FF2B5EF4-FFF2-40B4-BE49-F238E27FC236}">
+                <a16:creationId xmlns:a16="http://schemas.microsoft.com/office/drawing/2014/main" id="{4A5D91D5-F167-ACCC-62C3-20E20357F756}"/>
+              </a:ext>
+            </a:extLst>
+          </p:cNvPr>
+          <p:cNvSpPr>
+            <a:spLocks noGrp="1"/>
+          </p:cNvSpPr>
+          <p:nvPr>
+            <p:ph type="body" idx="1"/>
+          </p:nvPr>
+        </p:nvSpPr>
+        <p:spPr/>
+        <p:txBody>
+          <a:bodyPr/>
+          <a:lstStyle/>
+          <a:p>
+            <a:endParaRPr lang="nl-NL" dirty="0"/>
+          </a:p>
+        </p:txBody>
+      </p:sp>
+      <p:sp>
+        <p:nvSpPr>
+          <p:cNvPr id="4" name="Slide Number Placeholder 3">
+            <a:extLst>
+              <a:ext uri="{FF2B5EF4-FFF2-40B4-BE49-F238E27FC236}">
+                <a16:creationId xmlns:a16="http://schemas.microsoft.com/office/drawing/2014/main" id="{2018CC1D-98EA-F18E-8C52-D5F295D80B9B}"/>
+              </a:ext>
+            </a:extLst>
+          </p:cNvPr>
+          <p:cNvSpPr>
+            <a:spLocks noGrp="1"/>
+          </p:cNvSpPr>
+          <p:nvPr>
+            <p:ph type="sldNum" sz="quarter" idx="5"/>
+          </p:nvPr>
+        </p:nvSpPr>
+        <p:spPr/>
+        <p:txBody>
+          <a:bodyPr/>
+          <a:lstStyle/>
+          <a:p>
+            <a:fld id="{9583DEA5-E342-4DB2-B087-D0B9C490B19E}" type="slidenum">
+              <a:rPr lang="nl-NL" smtClean="0"/>
+              <a:t>58</a:t>
+            </a:fld>
+            <a:endParaRPr lang="nl-NL"/>
+          </a:p>
+        </p:txBody>
+      </p:sp>
+    </p:spTree>
+    <p:extLst>
+      <p:ext uri="{BB962C8B-B14F-4D97-AF65-F5344CB8AC3E}">
+        <p14:creationId xmlns:p14="http://schemas.microsoft.com/office/powerpoint/2010/main" val="2015580176"/>
+      </p:ext>
+    </p:extLst>
+  </p:cSld>
+  <p:clrMapOvr>
+    <a:masterClrMapping/>
+  </p:clrMapOvr>
+</p:notes>
+</file>
+
+<file path=ppt/notesSlides/notesSlide51.xml><?xml version="1.0" encoding="utf-8"?>
+<p:notes xmlns:a="http://schemas.openxmlformats.org/drawingml/2006/main" xmlns:r="http://schemas.openxmlformats.org/officeDocument/2006/relationships" xmlns:p="http://schemas.openxmlformats.org/presentationml/2006/main">
+  <p:cSld>
+    <p:spTree>
+      <p:nvGrpSpPr>
+        <p:cNvPr id="1" name="">
+          <a:extLst>
+            <a:ext uri="{FF2B5EF4-FFF2-40B4-BE49-F238E27FC236}">
+              <a16:creationId xmlns:a16="http://schemas.microsoft.com/office/drawing/2014/main" id="{7EC8D2FA-25A3-F7DD-9713-7067792F793D}"/>
+            </a:ext>
+          </a:extLst>
+        </p:cNvPr>
+        <p:cNvGrpSpPr/>
+        <p:nvPr/>
+      </p:nvGrpSpPr>
+      <p:grpSpPr>
+        <a:xfrm>
+          <a:off x="0" y="0"/>
+          <a:ext cx="0" cy="0"/>
+          <a:chOff x="0" y="0"/>
+          <a:chExt cx="0" cy="0"/>
+        </a:xfrm>
+      </p:grpSpPr>
+      <p:sp>
+        <p:nvSpPr>
+          <p:cNvPr id="2" name="Slide Image Placeholder 1">
+            <a:extLst>
+              <a:ext uri="{FF2B5EF4-FFF2-40B4-BE49-F238E27FC236}">
+                <a16:creationId xmlns:a16="http://schemas.microsoft.com/office/drawing/2014/main" id="{D502B169-32A7-3C1E-2CB9-C4818F6A3C3D}"/>
+              </a:ext>
+            </a:extLst>
+          </p:cNvPr>
+          <p:cNvSpPr>
+            <a:spLocks noGrp="1" noRot="1" noChangeAspect="1"/>
+          </p:cNvSpPr>
+          <p:nvPr>
+            <p:ph type="sldImg"/>
+          </p:nvPr>
+        </p:nvSpPr>
+        <p:spPr/>
+      </p:sp>
+      <p:sp>
+        <p:nvSpPr>
+          <p:cNvPr id="3" name="Notes Placeholder 2">
+            <a:extLst>
+              <a:ext uri="{FF2B5EF4-FFF2-40B4-BE49-F238E27FC236}">
+                <a16:creationId xmlns:a16="http://schemas.microsoft.com/office/drawing/2014/main" id="{0C8F827B-F299-4E4A-317C-474DB31CE72C}"/>
+              </a:ext>
+            </a:extLst>
+          </p:cNvPr>
+          <p:cNvSpPr>
+            <a:spLocks noGrp="1"/>
+          </p:cNvSpPr>
+          <p:nvPr>
+            <p:ph type="body" idx="1"/>
+          </p:nvPr>
+        </p:nvSpPr>
+        <p:spPr/>
+        <p:txBody>
+          <a:bodyPr/>
+          <a:lstStyle/>
+          <a:p>
+            <a:r>
+              <a:rPr lang="nl-NL" dirty="0"/>
+              <a:t>Demo: </a:t>
+            </a:r>
+            <a:r>
+              <a:rPr lang="nl-NL" dirty="0" err="1"/>
+              <a:t>merge</a:t>
+            </a:r>
+            <a:r>
+              <a:rPr lang="nl-NL" dirty="0"/>
+              <a:t> </a:t>
+            </a:r>
+            <a:r>
+              <a:rPr lang="nl-NL" dirty="0" err="1"/>
+              <a:t>conflicts</a:t>
+            </a:r>
+            <a:endParaRPr lang="nl-NL" dirty="0"/>
+          </a:p>
+        </p:txBody>
+      </p:sp>
+      <p:sp>
+        <p:nvSpPr>
+          <p:cNvPr id="4" name="Slide Number Placeholder 3">
+            <a:extLst>
+              <a:ext uri="{FF2B5EF4-FFF2-40B4-BE49-F238E27FC236}">
+                <a16:creationId xmlns:a16="http://schemas.microsoft.com/office/drawing/2014/main" id="{73EB33BD-A64F-5A05-492A-3B5C554105EF}"/>
+              </a:ext>
+            </a:extLst>
+          </p:cNvPr>
+          <p:cNvSpPr>
+            <a:spLocks noGrp="1"/>
+          </p:cNvSpPr>
+          <p:nvPr>
+            <p:ph type="sldNum" sz="quarter" idx="5"/>
+          </p:nvPr>
+        </p:nvSpPr>
+        <p:spPr/>
+        <p:txBody>
+          <a:bodyPr/>
+          <a:lstStyle/>
+          <a:p>
+            <a:fld id="{9583DEA5-E342-4DB2-B087-D0B9C490B19E}" type="slidenum">
+              <a:rPr lang="nl-NL" smtClean="0"/>
+              <a:t>60</a:t>
+            </a:fld>
+            <a:endParaRPr lang="nl-NL"/>
+          </a:p>
+        </p:txBody>
+      </p:sp>
+    </p:spTree>
+    <p:extLst>
+      <p:ext uri="{BB962C8B-B14F-4D97-AF65-F5344CB8AC3E}">
+        <p14:creationId xmlns:p14="http://schemas.microsoft.com/office/powerpoint/2010/main" val="2301614096"/>
       </p:ext>
     </p:extLst>
   </p:cSld>
@@ -5621,7 +6450,7 @@
           <a:p>
             <a:fld id="{0EBB069A-003F-4FC0-8534-236B0C5C7B5F}" type="datetimeFigureOut">
               <a:rPr lang="en-NL" smtClean="0"/>
-              <a:t>19/11/2024</a:t>
+              <a:t>20/11/2024</a:t>
             </a:fld>
             <a:endParaRPr lang="en-NL"/>
           </a:p>
@@ -5821,7 +6650,7 @@
           <a:p>
             <a:fld id="{0EBB069A-003F-4FC0-8534-236B0C5C7B5F}" type="datetimeFigureOut">
               <a:rPr lang="en-NL" smtClean="0"/>
-              <a:t>19/11/2024</a:t>
+              <a:t>20/11/2024</a:t>
             </a:fld>
             <a:endParaRPr lang="en-NL"/>
           </a:p>
@@ -6031,7 +6860,7 @@
           <a:p>
             <a:fld id="{0EBB069A-003F-4FC0-8534-236B0C5C7B5F}" type="datetimeFigureOut">
               <a:rPr lang="en-NL" smtClean="0"/>
-              <a:t>19/11/2024</a:t>
+              <a:t>20/11/2024</a:t>
             </a:fld>
             <a:endParaRPr lang="en-NL"/>
           </a:p>
@@ -6231,7 +7060,7 @@
           <a:p>
             <a:fld id="{0EBB069A-003F-4FC0-8534-236B0C5C7B5F}" type="datetimeFigureOut">
               <a:rPr lang="en-NL" smtClean="0"/>
-              <a:t>19/11/2024</a:t>
+              <a:t>20/11/2024</a:t>
             </a:fld>
             <a:endParaRPr lang="en-NL"/>
           </a:p>
@@ -6507,7 +7336,7 @@
           <a:p>
             <a:fld id="{0EBB069A-003F-4FC0-8534-236B0C5C7B5F}" type="datetimeFigureOut">
               <a:rPr lang="en-NL" smtClean="0"/>
-              <a:t>19/11/2024</a:t>
+              <a:t>20/11/2024</a:t>
             </a:fld>
             <a:endParaRPr lang="en-NL"/>
           </a:p>
@@ -6775,7 +7604,7 @@
           <a:p>
             <a:fld id="{0EBB069A-003F-4FC0-8534-236B0C5C7B5F}" type="datetimeFigureOut">
               <a:rPr lang="en-NL" smtClean="0"/>
-              <a:t>19/11/2024</a:t>
+              <a:t>20/11/2024</a:t>
             </a:fld>
             <a:endParaRPr lang="en-NL"/>
           </a:p>
@@ -7190,7 +8019,7 @@
           <a:p>
             <a:fld id="{0EBB069A-003F-4FC0-8534-236B0C5C7B5F}" type="datetimeFigureOut">
               <a:rPr lang="en-NL" smtClean="0"/>
-              <a:t>19/11/2024</a:t>
+              <a:t>20/11/2024</a:t>
             </a:fld>
             <a:endParaRPr lang="en-NL"/>
           </a:p>
@@ -7332,7 +8161,7 @@
           <a:p>
             <a:fld id="{0EBB069A-003F-4FC0-8534-236B0C5C7B5F}" type="datetimeFigureOut">
               <a:rPr lang="en-NL" smtClean="0"/>
-              <a:t>19/11/2024</a:t>
+              <a:t>20/11/2024</a:t>
             </a:fld>
             <a:endParaRPr lang="en-NL"/>
           </a:p>
@@ -7445,7 +8274,7 @@
           <a:p>
             <a:fld id="{0EBB069A-003F-4FC0-8534-236B0C5C7B5F}" type="datetimeFigureOut">
               <a:rPr lang="en-NL" smtClean="0"/>
-              <a:t>19/11/2024</a:t>
+              <a:t>20/11/2024</a:t>
             </a:fld>
             <a:endParaRPr lang="en-NL"/>
           </a:p>
@@ -7758,7 +8587,7 @@
           <a:p>
             <a:fld id="{0EBB069A-003F-4FC0-8534-236B0C5C7B5F}" type="datetimeFigureOut">
               <a:rPr lang="en-NL" smtClean="0"/>
-              <a:t>19/11/2024</a:t>
+              <a:t>20/11/2024</a:t>
             </a:fld>
             <a:endParaRPr lang="en-NL"/>
           </a:p>
@@ -8047,7 +8876,7 @@
           <a:p>
             <a:fld id="{0EBB069A-003F-4FC0-8534-236B0C5C7B5F}" type="datetimeFigureOut">
               <a:rPr lang="en-NL" smtClean="0"/>
-              <a:t>19/11/2024</a:t>
+              <a:t>20/11/2024</a:t>
             </a:fld>
             <a:endParaRPr lang="en-NL"/>
           </a:p>
@@ -8290,7 +9119,7 @@
           <a:p>
             <a:fld id="{0EBB069A-003F-4FC0-8534-236B0C5C7B5F}" type="datetimeFigureOut">
               <a:rPr lang="en-NL" smtClean="0"/>
-              <a:t>19/11/2024</a:t>
+              <a:t>20/11/2024</a:t>
             </a:fld>
             <a:endParaRPr lang="en-NL"/>
           </a:p>
@@ -15527,10 +16356,10 @@
       </p:sp>
       <p:pic>
         <p:nvPicPr>
-          <p:cNvPr id="4" name="Picture 3">
-            <a:extLst>
-              <a:ext uri="{FF2B5EF4-FFF2-40B4-BE49-F238E27FC236}">
-                <a16:creationId xmlns:a16="http://schemas.microsoft.com/office/drawing/2014/main" id="{10F1785D-DBAB-C34E-4C20-A2078BA9DAEA}"/>
+          <p:cNvPr id="5" name="Picture 4">
+            <a:extLst>
+              <a:ext uri="{FF2B5EF4-FFF2-40B4-BE49-F238E27FC236}">
+                <a16:creationId xmlns:a16="http://schemas.microsoft.com/office/drawing/2014/main" id="{EFD1F773-09F8-033D-B9E0-51794CE193B0}"/>
               </a:ext>
             </a:extLst>
           </p:cNvPr>
@@ -15546,9 +16375,9 @@
           </a:stretch>
         </p:blipFill>
         <p:spPr>
-          <a:xfrm rot="1217736">
-            <a:off x="8321964" y="3685187"/>
-            <a:ext cx="2694468" cy="2415360"/>
+          <a:xfrm>
+            <a:off x="7154652" y="1226003"/>
+            <a:ext cx="3491640" cy="4720697"/>
           </a:xfrm>
           <a:prstGeom prst="rect">
             <a:avLst/>
@@ -36477,6 +37306,3286 @@
 </p:sld>
 </file>
 
+<file path=ppt/slides/slide52.xml><?xml version="1.0" encoding="utf-8"?>
+<p:sld xmlns:a="http://schemas.openxmlformats.org/drawingml/2006/main" xmlns:r="http://schemas.openxmlformats.org/officeDocument/2006/relationships" xmlns:p="http://schemas.openxmlformats.org/presentationml/2006/main">
+  <p:cSld>
+    <p:spTree>
+      <p:nvGrpSpPr>
+        <p:cNvPr id="1" name="">
+          <a:extLst>
+            <a:ext uri="{FF2B5EF4-FFF2-40B4-BE49-F238E27FC236}">
+              <a16:creationId xmlns:a16="http://schemas.microsoft.com/office/drawing/2014/main" id="{1268F17F-9DE9-F4F7-38C7-3CC8D403AE3C}"/>
+            </a:ext>
+          </a:extLst>
+        </p:cNvPr>
+        <p:cNvGrpSpPr/>
+        <p:nvPr/>
+      </p:nvGrpSpPr>
+      <p:grpSpPr>
+        <a:xfrm>
+          <a:off x="0" y="0"/>
+          <a:ext cx="0" cy="0"/>
+          <a:chOff x="0" y="0"/>
+          <a:chExt cx="0" cy="0"/>
+        </a:xfrm>
+      </p:grpSpPr>
+      <p:sp>
+        <p:nvSpPr>
+          <p:cNvPr id="4" name="Title 3">
+            <a:extLst>
+              <a:ext uri="{FF2B5EF4-FFF2-40B4-BE49-F238E27FC236}">
+                <a16:creationId xmlns:a16="http://schemas.microsoft.com/office/drawing/2014/main" id="{55B06F5E-CE4E-5B85-8301-472511F7A744}"/>
+              </a:ext>
+            </a:extLst>
+          </p:cNvPr>
+          <p:cNvSpPr>
+            <a:spLocks noGrp="1"/>
+          </p:cNvSpPr>
+          <p:nvPr>
+            <p:ph type="title"/>
+          </p:nvPr>
+        </p:nvSpPr>
+        <p:spPr/>
+        <p:txBody>
+          <a:bodyPr/>
+          <a:lstStyle/>
+          <a:p>
+            <a:r>
+              <a:rPr lang="nl-NL" noProof="0" dirty="0" err="1"/>
+              <a:t>Merge</a:t>
+            </a:r>
+            <a:r>
+              <a:rPr lang="nl-NL" noProof="0" dirty="0"/>
+              <a:t> conflicten</a:t>
+            </a:r>
+          </a:p>
+        </p:txBody>
+      </p:sp>
+      <p:sp>
+        <p:nvSpPr>
+          <p:cNvPr id="5" name="Text Placeholder 4">
+            <a:extLst>
+              <a:ext uri="{FF2B5EF4-FFF2-40B4-BE49-F238E27FC236}">
+                <a16:creationId xmlns:a16="http://schemas.microsoft.com/office/drawing/2014/main" id="{9BFE6609-517F-ED46-3EC3-4396F6FC3469}"/>
+              </a:ext>
+            </a:extLst>
+          </p:cNvPr>
+          <p:cNvSpPr>
+            <a:spLocks noGrp="1"/>
+          </p:cNvSpPr>
+          <p:nvPr>
+            <p:ph type="body" idx="1"/>
+          </p:nvPr>
+        </p:nvSpPr>
+        <p:spPr/>
+        <p:txBody>
+          <a:bodyPr/>
+          <a:lstStyle/>
+          <a:p>
+            <a:endParaRPr lang="en-NL"/>
+          </a:p>
+        </p:txBody>
+      </p:sp>
+    </p:spTree>
+    <p:extLst>
+      <p:ext uri="{BB962C8B-B14F-4D97-AF65-F5344CB8AC3E}">
+        <p14:creationId xmlns:p14="http://schemas.microsoft.com/office/powerpoint/2010/main" val="1019506956"/>
+      </p:ext>
+    </p:extLst>
+  </p:cSld>
+  <p:clrMapOvr>
+    <a:masterClrMapping/>
+  </p:clrMapOvr>
+</p:sld>
+</file>
+
+<file path=ppt/slides/slide53.xml><?xml version="1.0" encoding="utf-8"?>
+<p:sld xmlns:a="http://schemas.openxmlformats.org/drawingml/2006/main" xmlns:r="http://schemas.openxmlformats.org/officeDocument/2006/relationships" xmlns:p="http://schemas.openxmlformats.org/presentationml/2006/main">
+  <p:cSld>
+    <p:spTree>
+      <p:nvGrpSpPr>
+        <p:cNvPr id="1" name="">
+          <a:extLst>
+            <a:ext uri="{FF2B5EF4-FFF2-40B4-BE49-F238E27FC236}">
+              <a16:creationId xmlns:a16="http://schemas.microsoft.com/office/drawing/2014/main" id="{B47C4A54-78D8-1B64-0B7A-56CC3E9E3D5D}"/>
+            </a:ext>
+          </a:extLst>
+        </p:cNvPr>
+        <p:cNvGrpSpPr/>
+        <p:nvPr/>
+      </p:nvGrpSpPr>
+      <p:grpSpPr>
+        <a:xfrm>
+          <a:off x="0" y="0"/>
+          <a:ext cx="0" cy="0"/>
+          <a:chOff x="0" y="0"/>
+          <a:chExt cx="0" cy="0"/>
+        </a:xfrm>
+      </p:grpSpPr>
+      <p:sp>
+        <p:nvSpPr>
+          <p:cNvPr id="2" name="Title 1">
+            <a:extLst>
+              <a:ext uri="{FF2B5EF4-FFF2-40B4-BE49-F238E27FC236}">
+                <a16:creationId xmlns:a16="http://schemas.microsoft.com/office/drawing/2014/main" id="{F6556FDC-A28D-62CE-3848-8E830F6BA50A}"/>
+              </a:ext>
+            </a:extLst>
+          </p:cNvPr>
+          <p:cNvSpPr>
+            <a:spLocks noGrp="1"/>
+          </p:cNvSpPr>
+          <p:nvPr>
+            <p:ph type="title"/>
+          </p:nvPr>
+        </p:nvSpPr>
+        <p:spPr>
+          <a:xfrm>
+            <a:off x="838200" y="365126"/>
+            <a:ext cx="10515600" cy="718608"/>
+          </a:xfrm>
+        </p:spPr>
+        <p:txBody>
+          <a:bodyPr>
+            <a:normAutofit/>
+          </a:bodyPr>
+          <a:lstStyle/>
+          <a:p>
+            <a:r>
+              <a:rPr lang="nl-NL" sz="3600" noProof="0" dirty="0"/>
+              <a:t>Wat is een conflict?</a:t>
+            </a:r>
+          </a:p>
+        </p:txBody>
+      </p:sp>
+      <p:sp>
+        <p:nvSpPr>
+          <p:cNvPr id="9" name="Content Placeholder 2">
+            <a:extLst>
+              <a:ext uri="{FF2B5EF4-FFF2-40B4-BE49-F238E27FC236}">
+                <a16:creationId xmlns:a16="http://schemas.microsoft.com/office/drawing/2014/main" id="{5BA4A57E-6515-F2BC-F6E0-5CF098CE5AA0}"/>
+              </a:ext>
+            </a:extLst>
+          </p:cNvPr>
+          <p:cNvSpPr>
+            <a:spLocks noGrp="1"/>
+          </p:cNvSpPr>
+          <p:nvPr>
+            <p:ph idx="1"/>
+          </p:nvPr>
+        </p:nvSpPr>
+        <p:spPr>
+          <a:xfrm>
+            <a:off x="838200" y="1456267"/>
+            <a:ext cx="5520398" cy="4720696"/>
+          </a:xfrm>
+        </p:spPr>
+        <p:txBody>
+          <a:bodyPr>
+            <a:normAutofit/>
+          </a:bodyPr>
+          <a:lstStyle/>
+          <a:p>
+            <a:pPr marL="0" indent="0">
+              <a:buNone/>
+            </a:pPr>
+            <a:r>
+              <a:rPr lang="nl-NL" sz="1800" dirty="0">
+                <a:cs typeface="Courier New" panose="02070309020205020404" pitchFamily="49" charset="0"/>
+              </a:rPr>
+              <a:t>Branches staan los van elkaar en kunnen tegelijkertijd wijzigen.</a:t>
+            </a:r>
+          </a:p>
+          <a:p>
+            <a:pPr marL="0" indent="0">
+              <a:buNone/>
+            </a:pPr>
+            <a:endParaRPr lang="nl-NL" sz="1800" dirty="0">
+              <a:cs typeface="Courier New" panose="02070309020205020404" pitchFamily="49" charset="0"/>
+            </a:endParaRPr>
+          </a:p>
+          <a:p>
+            <a:pPr marL="0" indent="0">
+              <a:buNone/>
+            </a:pPr>
+            <a:r>
+              <a:rPr lang="nl-NL" sz="1800" dirty="0">
+                <a:cs typeface="Courier New" panose="02070309020205020404" pitchFamily="49" charset="0"/>
+              </a:rPr>
+              <a:t>Hierdoor kunnen wijzigingen ontstaan die strijdig met elkaar zijn.</a:t>
+            </a:r>
+          </a:p>
+          <a:p>
+            <a:pPr marL="0" indent="0">
+              <a:buNone/>
+            </a:pPr>
+            <a:endParaRPr lang="nl-NL" sz="1800" dirty="0">
+              <a:cs typeface="Courier New" panose="02070309020205020404" pitchFamily="49" charset="0"/>
+            </a:endParaRPr>
+          </a:p>
+          <a:p>
+            <a:pPr marL="0" indent="0">
+              <a:buNone/>
+            </a:pPr>
+            <a:endParaRPr lang="nl-NL" sz="1800" dirty="0">
+              <a:cs typeface="Courier New" panose="02070309020205020404" pitchFamily="49" charset="0"/>
+            </a:endParaRPr>
+          </a:p>
+          <a:p>
+            <a:pPr marL="0" indent="0">
+              <a:buNone/>
+            </a:pPr>
+            <a:endParaRPr lang="nl-NL" sz="1800" dirty="0">
+              <a:cs typeface="Courier New" panose="02070309020205020404" pitchFamily="49" charset="0"/>
+            </a:endParaRPr>
+          </a:p>
+          <a:p>
+            <a:pPr>
+              <a:buFontTx/>
+              <a:buChar char="-"/>
+            </a:pPr>
+            <a:endParaRPr lang="nl-NL" sz="1800" dirty="0">
+              <a:cs typeface="Courier New" panose="02070309020205020404" pitchFamily="49" charset="0"/>
+            </a:endParaRPr>
+          </a:p>
+          <a:p>
+            <a:pPr>
+              <a:buFontTx/>
+              <a:buChar char="-"/>
+            </a:pPr>
+            <a:endParaRPr lang="nl-NL" sz="1800" dirty="0">
+              <a:cs typeface="Courier New" panose="02070309020205020404" pitchFamily="49" charset="0"/>
+            </a:endParaRPr>
+          </a:p>
+        </p:txBody>
+      </p:sp>
+      <p:sp>
+        <p:nvSpPr>
+          <p:cNvPr id="4" name="Rectangle 3">
+            <a:extLst>
+              <a:ext uri="{FF2B5EF4-FFF2-40B4-BE49-F238E27FC236}">
+                <a16:creationId xmlns:a16="http://schemas.microsoft.com/office/drawing/2014/main" id="{04AA0283-E5FB-BBA0-BC2B-E16DADF2D312}"/>
+              </a:ext>
+            </a:extLst>
+          </p:cNvPr>
+          <p:cNvSpPr/>
+          <p:nvPr/>
+        </p:nvSpPr>
+        <p:spPr>
+          <a:xfrm>
+            <a:off x="6823418" y="2048321"/>
+            <a:ext cx="2032781" cy="921490"/>
+          </a:xfrm>
+          <a:prstGeom prst="rect">
+            <a:avLst/>
+          </a:prstGeom>
+          <a:solidFill>
+            <a:schemeClr val="bg1">
+              <a:lumMod val="85000"/>
+            </a:schemeClr>
+          </a:solidFill>
+        </p:spPr>
+        <p:style>
+          <a:lnRef idx="1">
+            <a:schemeClr val="accent3"/>
+          </a:lnRef>
+          <a:fillRef idx="2">
+            <a:schemeClr val="accent3"/>
+          </a:fillRef>
+          <a:effectRef idx="1">
+            <a:schemeClr val="accent3"/>
+          </a:effectRef>
+          <a:fontRef idx="minor">
+            <a:schemeClr val="dk1"/>
+          </a:fontRef>
+        </p:style>
+        <p:txBody>
+          <a:bodyPr rtlCol="0" anchor="t"/>
+          <a:lstStyle/>
+          <a:p>
+            <a:r>
+              <a:rPr lang="nl-NL" sz="1600" b="1" dirty="0"/>
+              <a:t>utils.py</a:t>
+            </a:r>
+          </a:p>
+          <a:p>
+            <a:endParaRPr lang="nl-NL" sz="1600" dirty="0"/>
+          </a:p>
+          <a:p>
+            <a:r>
+              <a:rPr lang="nl-NL" sz="1600" dirty="0">
+                <a:solidFill>
+                  <a:schemeClr val="accent2">
+                    <a:lumMod val="75000"/>
+                  </a:schemeClr>
+                </a:solidFill>
+              </a:rPr>
+              <a:t>"""Utilities module"""</a:t>
+            </a:r>
+          </a:p>
+        </p:txBody>
+      </p:sp>
+      <p:sp>
+        <p:nvSpPr>
+          <p:cNvPr id="6" name="Rectangle 5">
+            <a:extLst>
+              <a:ext uri="{FF2B5EF4-FFF2-40B4-BE49-F238E27FC236}">
+                <a16:creationId xmlns:a16="http://schemas.microsoft.com/office/drawing/2014/main" id="{0B372155-F66B-8BD5-442F-1923BB00F820}"/>
+              </a:ext>
+            </a:extLst>
+          </p:cNvPr>
+          <p:cNvSpPr/>
+          <p:nvPr/>
+        </p:nvSpPr>
+        <p:spPr>
+          <a:xfrm>
+            <a:off x="9321019" y="2048321"/>
+            <a:ext cx="2032781" cy="921490"/>
+          </a:xfrm>
+          <a:prstGeom prst="rect">
+            <a:avLst/>
+          </a:prstGeom>
+          <a:solidFill>
+            <a:schemeClr val="bg1">
+              <a:lumMod val="85000"/>
+            </a:schemeClr>
+          </a:solidFill>
+        </p:spPr>
+        <p:style>
+          <a:lnRef idx="1">
+            <a:schemeClr val="accent3"/>
+          </a:lnRef>
+          <a:fillRef idx="2">
+            <a:schemeClr val="accent3"/>
+          </a:fillRef>
+          <a:effectRef idx="1">
+            <a:schemeClr val="accent3"/>
+          </a:effectRef>
+          <a:fontRef idx="minor">
+            <a:schemeClr val="dk1"/>
+          </a:fontRef>
+        </p:style>
+        <p:txBody>
+          <a:bodyPr rtlCol="0" anchor="t"/>
+          <a:lstStyle/>
+          <a:p>
+            <a:r>
+              <a:rPr lang="nl-NL" sz="1600" b="1" dirty="0"/>
+              <a:t>main.py</a:t>
+            </a:r>
+          </a:p>
+          <a:p>
+            <a:endParaRPr lang="nl-NL" sz="1600" dirty="0"/>
+          </a:p>
+          <a:p>
+            <a:r>
+              <a:rPr lang="nl-NL" sz="1600" dirty="0">
+                <a:solidFill>
+                  <a:schemeClr val="accent2">
+                    <a:lumMod val="75000"/>
+                  </a:schemeClr>
+                </a:solidFill>
+              </a:rPr>
+              <a:t>"""</a:t>
+            </a:r>
+            <a:r>
+              <a:rPr lang="nl-NL" sz="1600" dirty="0" err="1">
+                <a:solidFill>
+                  <a:schemeClr val="accent2">
+                    <a:lumMod val="75000"/>
+                  </a:schemeClr>
+                </a:solidFill>
+              </a:rPr>
+              <a:t>Main</a:t>
+            </a:r>
+            <a:r>
+              <a:rPr lang="nl-NL" sz="1600" dirty="0">
+                <a:solidFill>
+                  <a:schemeClr val="accent2">
+                    <a:lumMod val="75000"/>
+                  </a:schemeClr>
+                </a:solidFill>
+              </a:rPr>
+              <a:t> module"""</a:t>
+            </a:r>
+          </a:p>
+        </p:txBody>
+      </p:sp>
+      <p:sp>
+        <p:nvSpPr>
+          <p:cNvPr id="13" name="Rectangle 12">
+            <a:extLst>
+              <a:ext uri="{FF2B5EF4-FFF2-40B4-BE49-F238E27FC236}">
+                <a16:creationId xmlns:a16="http://schemas.microsoft.com/office/drawing/2014/main" id="{0805E1C2-9BEF-6615-2EB9-EFFBCCB8DCB3}"/>
+              </a:ext>
+            </a:extLst>
+          </p:cNvPr>
+          <p:cNvSpPr/>
+          <p:nvPr/>
+        </p:nvSpPr>
+        <p:spPr>
+          <a:xfrm>
+            <a:off x="9321019" y="4304708"/>
+            <a:ext cx="2032781" cy="921490"/>
+          </a:xfrm>
+          <a:prstGeom prst="rect">
+            <a:avLst/>
+          </a:prstGeom>
+          <a:solidFill>
+            <a:schemeClr val="bg1">
+              <a:lumMod val="85000"/>
+            </a:schemeClr>
+          </a:solidFill>
+        </p:spPr>
+        <p:style>
+          <a:lnRef idx="1">
+            <a:schemeClr val="accent3"/>
+          </a:lnRef>
+          <a:fillRef idx="2">
+            <a:schemeClr val="accent3"/>
+          </a:fillRef>
+          <a:effectRef idx="1">
+            <a:schemeClr val="accent3"/>
+          </a:effectRef>
+          <a:fontRef idx="minor">
+            <a:schemeClr val="dk1"/>
+          </a:fontRef>
+        </p:style>
+        <p:txBody>
+          <a:bodyPr rtlCol="0" anchor="t"/>
+          <a:lstStyle/>
+          <a:p>
+            <a:r>
+              <a:rPr lang="nl-NL" sz="1600" b="1" dirty="0"/>
+              <a:t>main.py</a:t>
+            </a:r>
+          </a:p>
+          <a:p>
+            <a:endParaRPr lang="nl-NL" sz="1600" dirty="0"/>
+          </a:p>
+          <a:p>
+            <a:r>
+              <a:rPr lang="nl-NL" sz="1600" dirty="0">
+                <a:solidFill>
+                  <a:schemeClr val="tx1"/>
+                </a:solidFill>
+              </a:rPr>
+              <a:t>print(</a:t>
+            </a:r>
+            <a:r>
+              <a:rPr lang="nl-NL" sz="1600" dirty="0">
+                <a:solidFill>
+                  <a:schemeClr val="accent2">
+                    <a:lumMod val="75000"/>
+                  </a:schemeClr>
+                </a:solidFill>
+              </a:rPr>
+              <a:t>"</a:t>
+            </a:r>
+            <a:r>
+              <a:rPr lang="nl-NL" sz="1600" dirty="0" err="1">
+                <a:solidFill>
+                  <a:schemeClr val="accent2">
+                    <a:lumMod val="75000"/>
+                  </a:schemeClr>
+                </a:solidFill>
+              </a:rPr>
+              <a:t>Hello</a:t>
+            </a:r>
+            <a:r>
+              <a:rPr lang="nl-NL" sz="1600" dirty="0">
+                <a:solidFill>
+                  <a:schemeClr val="accent2">
+                    <a:lumMod val="75000"/>
+                  </a:schemeClr>
+                </a:solidFill>
+              </a:rPr>
+              <a:t> World"</a:t>
+            </a:r>
+            <a:r>
+              <a:rPr lang="nl-NL" sz="1600" dirty="0">
+                <a:solidFill>
+                  <a:schemeClr val="tx1"/>
+                </a:solidFill>
+              </a:rPr>
+              <a:t>)</a:t>
+            </a:r>
+          </a:p>
+        </p:txBody>
+      </p:sp>
+      <p:sp>
+        <p:nvSpPr>
+          <p:cNvPr id="27" name="TextBox 26">
+            <a:extLst>
+              <a:ext uri="{FF2B5EF4-FFF2-40B4-BE49-F238E27FC236}">
+                <a16:creationId xmlns:a16="http://schemas.microsoft.com/office/drawing/2014/main" id="{B92D1DFD-09D2-FD32-A96B-F07940640DC2}"/>
+              </a:ext>
+            </a:extLst>
+          </p:cNvPr>
+          <p:cNvSpPr txBox="1"/>
+          <p:nvPr/>
+        </p:nvSpPr>
+        <p:spPr>
+          <a:xfrm>
+            <a:off x="8152228" y="1456267"/>
+            <a:ext cx="1926425" cy="369332"/>
+          </a:xfrm>
+          <a:prstGeom prst="rect">
+            <a:avLst/>
+          </a:prstGeom>
+          <a:noFill/>
+        </p:spPr>
+        <p:txBody>
+          <a:bodyPr wrap="none" rtlCol="0">
+            <a:spAutoFit/>
+          </a:bodyPr>
+          <a:lstStyle/>
+          <a:p>
+            <a:r>
+              <a:rPr lang="nl-NL" dirty="0"/>
+              <a:t>feature/make-</a:t>
+            </a:r>
+            <a:r>
+              <a:rPr lang="nl-NL" dirty="0" err="1"/>
+              <a:t>utils</a:t>
+            </a:r>
+            <a:endParaRPr lang="nl-NL" dirty="0"/>
+          </a:p>
+        </p:txBody>
+      </p:sp>
+      <p:sp>
+        <p:nvSpPr>
+          <p:cNvPr id="29" name="TextBox 28">
+            <a:extLst>
+              <a:ext uri="{FF2B5EF4-FFF2-40B4-BE49-F238E27FC236}">
+                <a16:creationId xmlns:a16="http://schemas.microsoft.com/office/drawing/2014/main" id="{E14F7B3F-35DA-96D3-ABD4-F77DEB4B8BAA}"/>
+              </a:ext>
+            </a:extLst>
+          </p:cNvPr>
+          <p:cNvSpPr txBox="1"/>
+          <p:nvPr/>
+        </p:nvSpPr>
+        <p:spPr>
+          <a:xfrm>
+            <a:off x="8648100" y="5666951"/>
+            <a:ext cx="934679" cy="369332"/>
+          </a:xfrm>
+          <a:prstGeom prst="rect">
+            <a:avLst/>
+          </a:prstGeom>
+          <a:noFill/>
+        </p:spPr>
+        <p:txBody>
+          <a:bodyPr wrap="none" rtlCol="0">
+            <a:spAutoFit/>
+          </a:bodyPr>
+          <a:lstStyle/>
+          <a:p>
+            <a:r>
+              <a:rPr lang="nl-NL" dirty="0" err="1"/>
+              <a:t>develop</a:t>
+            </a:r>
+            <a:endParaRPr lang="nl-NL" dirty="0"/>
+          </a:p>
+        </p:txBody>
+      </p:sp>
+    </p:spTree>
+    <p:extLst>
+      <p:ext uri="{BB962C8B-B14F-4D97-AF65-F5344CB8AC3E}">
+        <p14:creationId xmlns:p14="http://schemas.microsoft.com/office/powerpoint/2010/main" val="3748223051"/>
+      </p:ext>
+    </p:extLst>
+  </p:cSld>
+  <p:clrMapOvr>
+    <a:masterClrMapping/>
+  </p:clrMapOvr>
+</p:sld>
+</file>
+
+<file path=ppt/slides/slide54.xml><?xml version="1.0" encoding="utf-8"?>
+<p:sld xmlns:a="http://schemas.openxmlformats.org/drawingml/2006/main" xmlns:r="http://schemas.openxmlformats.org/officeDocument/2006/relationships" xmlns:p="http://schemas.openxmlformats.org/presentationml/2006/main">
+  <p:cSld>
+    <p:spTree>
+      <p:nvGrpSpPr>
+        <p:cNvPr id="1" name="">
+          <a:extLst>
+            <a:ext uri="{FF2B5EF4-FFF2-40B4-BE49-F238E27FC236}">
+              <a16:creationId xmlns:a16="http://schemas.microsoft.com/office/drawing/2014/main" id="{C6E9C739-404E-22E9-D61A-28993D0407AD}"/>
+            </a:ext>
+          </a:extLst>
+        </p:cNvPr>
+        <p:cNvGrpSpPr/>
+        <p:nvPr/>
+      </p:nvGrpSpPr>
+      <p:grpSpPr>
+        <a:xfrm>
+          <a:off x="0" y="0"/>
+          <a:ext cx="0" cy="0"/>
+          <a:chOff x="0" y="0"/>
+          <a:chExt cx="0" cy="0"/>
+        </a:xfrm>
+      </p:grpSpPr>
+      <p:sp>
+        <p:nvSpPr>
+          <p:cNvPr id="2" name="Title 1">
+            <a:extLst>
+              <a:ext uri="{FF2B5EF4-FFF2-40B4-BE49-F238E27FC236}">
+                <a16:creationId xmlns:a16="http://schemas.microsoft.com/office/drawing/2014/main" id="{49962951-B381-89E4-7AE6-0A616AA67ADE}"/>
+              </a:ext>
+            </a:extLst>
+          </p:cNvPr>
+          <p:cNvSpPr>
+            <a:spLocks noGrp="1"/>
+          </p:cNvSpPr>
+          <p:nvPr>
+            <p:ph type="title"/>
+          </p:nvPr>
+        </p:nvSpPr>
+        <p:spPr>
+          <a:xfrm>
+            <a:off x="838200" y="365126"/>
+            <a:ext cx="10515600" cy="718608"/>
+          </a:xfrm>
+        </p:spPr>
+        <p:txBody>
+          <a:bodyPr>
+            <a:normAutofit/>
+          </a:bodyPr>
+          <a:lstStyle/>
+          <a:p>
+            <a:r>
+              <a:rPr lang="nl-NL" sz="3600" noProof="0" dirty="0"/>
+              <a:t>Wat is een conflict?</a:t>
+            </a:r>
+          </a:p>
+        </p:txBody>
+      </p:sp>
+      <p:sp>
+        <p:nvSpPr>
+          <p:cNvPr id="9" name="Content Placeholder 2">
+            <a:extLst>
+              <a:ext uri="{FF2B5EF4-FFF2-40B4-BE49-F238E27FC236}">
+                <a16:creationId xmlns:a16="http://schemas.microsoft.com/office/drawing/2014/main" id="{4250F02E-2EA2-E117-0FAB-AF41B4A71E44}"/>
+              </a:ext>
+            </a:extLst>
+          </p:cNvPr>
+          <p:cNvSpPr>
+            <a:spLocks noGrp="1"/>
+          </p:cNvSpPr>
+          <p:nvPr>
+            <p:ph idx="1"/>
+          </p:nvPr>
+        </p:nvSpPr>
+        <p:spPr>
+          <a:xfrm>
+            <a:off x="838200" y="1456267"/>
+            <a:ext cx="5520398" cy="4720696"/>
+          </a:xfrm>
+        </p:spPr>
+        <p:txBody>
+          <a:bodyPr>
+            <a:normAutofit/>
+          </a:bodyPr>
+          <a:lstStyle/>
+          <a:p>
+            <a:pPr marL="0" indent="0">
+              <a:buNone/>
+            </a:pPr>
+            <a:r>
+              <a:rPr lang="nl-NL" sz="1800" dirty="0">
+                <a:cs typeface="Courier New" panose="02070309020205020404" pitchFamily="49" charset="0"/>
+              </a:rPr>
+              <a:t>Branches staan los van elkaar en kunnen tegelijkertijd wijzigen.</a:t>
+            </a:r>
+          </a:p>
+          <a:p>
+            <a:pPr marL="0" indent="0">
+              <a:buNone/>
+            </a:pPr>
+            <a:endParaRPr lang="nl-NL" sz="1800" dirty="0">
+              <a:cs typeface="Courier New" panose="02070309020205020404" pitchFamily="49" charset="0"/>
+            </a:endParaRPr>
+          </a:p>
+          <a:p>
+            <a:pPr marL="0" indent="0">
+              <a:buNone/>
+            </a:pPr>
+            <a:r>
+              <a:rPr lang="nl-NL" sz="1800" dirty="0">
+                <a:cs typeface="Courier New" panose="02070309020205020404" pitchFamily="49" charset="0"/>
+              </a:rPr>
+              <a:t>Hierdoor kunnen wijzigingen ontstaan die strijdig met elkaar zijn.</a:t>
+            </a:r>
+          </a:p>
+          <a:p>
+            <a:pPr marL="0" indent="0">
+              <a:buNone/>
+            </a:pPr>
+            <a:endParaRPr lang="nl-NL" sz="1800" dirty="0">
+              <a:cs typeface="Courier New" panose="02070309020205020404" pitchFamily="49" charset="0"/>
+            </a:endParaRPr>
+          </a:p>
+          <a:p>
+            <a:pPr marL="0" indent="0">
+              <a:buNone/>
+            </a:pPr>
+            <a:r>
+              <a:rPr lang="nl-NL" sz="1800" b="1" dirty="0">
+                <a:cs typeface="Courier New" panose="02070309020205020404" pitchFamily="49" charset="0"/>
+              </a:rPr>
+              <a:t>Geen conflict:</a:t>
+            </a:r>
+          </a:p>
+          <a:p>
+            <a:pPr marL="0" indent="0">
+              <a:buNone/>
+            </a:pPr>
+            <a:r>
+              <a:rPr lang="nl-NL" sz="1800" dirty="0">
+                <a:cs typeface="Courier New" panose="02070309020205020404" pitchFamily="49" charset="0"/>
+              </a:rPr>
+              <a:t>Nieuw / gewijzigd / verwijderd bestand op </a:t>
+            </a:r>
+            <a:r>
+              <a:rPr lang="nl-NL" sz="1800" u="sng" dirty="0">
+                <a:cs typeface="Courier New" panose="02070309020205020404" pitchFamily="49" charset="0"/>
+              </a:rPr>
+              <a:t>één </a:t>
+            </a:r>
+            <a:r>
+              <a:rPr lang="nl-NL" sz="1800" u="sng" dirty="0" err="1">
+                <a:cs typeface="Courier New" panose="02070309020205020404" pitchFamily="49" charset="0"/>
+              </a:rPr>
+              <a:t>branch</a:t>
+            </a:r>
+            <a:r>
+              <a:rPr lang="nl-NL" sz="1800" dirty="0">
+                <a:cs typeface="Courier New" panose="02070309020205020404" pitchFamily="49" charset="0"/>
+              </a:rPr>
+              <a:t>.</a:t>
+            </a:r>
+          </a:p>
+        </p:txBody>
+      </p:sp>
+      <p:sp>
+        <p:nvSpPr>
+          <p:cNvPr id="14" name="Rectangle 13">
+            <a:extLst>
+              <a:ext uri="{FF2B5EF4-FFF2-40B4-BE49-F238E27FC236}">
+                <a16:creationId xmlns:a16="http://schemas.microsoft.com/office/drawing/2014/main" id="{FD6C0ACA-9DF2-59CD-AC1E-ABD07A0BD3C2}"/>
+              </a:ext>
+            </a:extLst>
+          </p:cNvPr>
+          <p:cNvSpPr/>
+          <p:nvPr/>
+        </p:nvSpPr>
+        <p:spPr>
+          <a:xfrm>
+            <a:off x="6823417" y="4304708"/>
+            <a:ext cx="2032781" cy="921490"/>
+          </a:xfrm>
+          <a:prstGeom prst="rect">
+            <a:avLst/>
+          </a:prstGeom>
+          <a:solidFill>
+            <a:schemeClr val="accent6">
+              <a:lumMod val="40000"/>
+              <a:lumOff val="60000"/>
+            </a:schemeClr>
+          </a:solidFill>
+        </p:spPr>
+        <p:style>
+          <a:lnRef idx="1">
+            <a:schemeClr val="accent6"/>
+          </a:lnRef>
+          <a:fillRef idx="2">
+            <a:schemeClr val="accent6"/>
+          </a:fillRef>
+          <a:effectRef idx="1">
+            <a:schemeClr val="accent6"/>
+          </a:effectRef>
+          <a:fontRef idx="minor">
+            <a:schemeClr val="dk1"/>
+          </a:fontRef>
+        </p:style>
+        <p:txBody>
+          <a:bodyPr rtlCol="0" anchor="t"/>
+          <a:lstStyle/>
+          <a:p>
+            <a:r>
+              <a:rPr lang="nl-NL" sz="1600" b="1" dirty="0"/>
+              <a:t>utils.py</a:t>
+            </a:r>
+          </a:p>
+          <a:p>
+            <a:endParaRPr lang="nl-NL" sz="1600" dirty="0"/>
+          </a:p>
+          <a:p>
+            <a:r>
+              <a:rPr lang="nl-NL" sz="1600" dirty="0">
+                <a:solidFill>
+                  <a:schemeClr val="accent2">
+                    <a:lumMod val="75000"/>
+                  </a:schemeClr>
+                </a:solidFill>
+              </a:rPr>
+              <a:t>"""Utilities module"""</a:t>
+            </a:r>
+          </a:p>
+        </p:txBody>
+      </p:sp>
+      <p:cxnSp>
+        <p:nvCxnSpPr>
+          <p:cNvPr id="18" name="Straight Arrow Connector 17">
+            <a:extLst>
+              <a:ext uri="{FF2B5EF4-FFF2-40B4-BE49-F238E27FC236}">
+                <a16:creationId xmlns:a16="http://schemas.microsoft.com/office/drawing/2014/main" id="{2800D65B-0F00-B0B5-0C23-E731C5001550}"/>
+              </a:ext>
+            </a:extLst>
+          </p:cNvPr>
+          <p:cNvCxnSpPr>
+            <a:cxnSpLocks/>
+            <a:stCxn id="16" idx="2"/>
+            <a:endCxn id="14" idx="0"/>
+          </p:cNvCxnSpPr>
+          <p:nvPr/>
+        </p:nvCxnSpPr>
+        <p:spPr>
+          <a:xfrm flipH="1">
+            <a:off x="7839808" y="2969811"/>
+            <a:ext cx="1" cy="1334897"/>
+          </a:xfrm>
+          <a:prstGeom prst="straightConnector1">
+            <a:avLst/>
+          </a:prstGeom>
+          <a:ln>
+            <a:tailEnd type="triangle"/>
+          </a:ln>
+        </p:spPr>
+        <p:style>
+          <a:lnRef idx="2">
+            <a:schemeClr val="accent6"/>
+          </a:lnRef>
+          <a:fillRef idx="0">
+            <a:schemeClr val="accent6"/>
+          </a:fillRef>
+          <a:effectRef idx="1">
+            <a:schemeClr val="accent6"/>
+          </a:effectRef>
+          <a:fontRef idx="minor">
+            <a:schemeClr val="tx1"/>
+          </a:fontRef>
+        </p:style>
+      </p:cxnSp>
+      <p:sp>
+        <p:nvSpPr>
+          <p:cNvPr id="7" name="Rectangle 6">
+            <a:extLst>
+              <a:ext uri="{FF2B5EF4-FFF2-40B4-BE49-F238E27FC236}">
+                <a16:creationId xmlns:a16="http://schemas.microsoft.com/office/drawing/2014/main" id="{09A87AB6-35D6-9BCF-A89C-A4EB234A78DB}"/>
+              </a:ext>
+            </a:extLst>
+          </p:cNvPr>
+          <p:cNvSpPr/>
+          <p:nvPr/>
+        </p:nvSpPr>
+        <p:spPr>
+          <a:xfrm>
+            <a:off x="9321019" y="4304708"/>
+            <a:ext cx="2032781" cy="921490"/>
+          </a:xfrm>
+          <a:prstGeom prst="rect">
+            <a:avLst/>
+          </a:prstGeom>
+          <a:solidFill>
+            <a:schemeClr val="bg1">
+              <a:lumMod val="85000"/>
+            </a:schemeClr>
+          </a:solidFill>
+        </p:spPr>
+        <p:style>
+          <a:lnRef idx="1">
+            <a:schemeClr val="accent3"/>
+          </a:lnRef>
+          <a:fillRef idx="2">
+            <a:schemeClr val="accent3"/>
+          </a:fillRef>
+          <a:effectRef idx="1">
+            <a:schemeClr val="accent3"/>
+          </a:effectRef>
+          <a:fontRef idx="minor">
+            <a:schemeClr val="dk1"/>
+          </a:fontRef>
+        </p:style>
+        <p:txBody>
+          <a:bodyPr rtlCol="0" anchor="t"/>
+          <a:lstStyle/>
+          <a:p>
+            <a:r>
+              <a:rPr lang="nl-NL" sz="1600" b="1" dirty="0"/>
+              <a:t>main.py</a:t>
+            </a:r>
+          </a:p>
+          <a:p>
+            <a:endParaRPr lang="nl-NL" sz="1600" dirty="0"/>
+          </a:p>
+          <a:p>
+            <a:r>
+              <a:rPr lang="nl-NL" sz="1600" dirty="0">
+                <a:solidFill>
+                  <a:schemeClr val="tx1"/>
+                </a:solidFill>
+              </a:rPr>
+              <a:t>print(</a:t>
+            </a:r>
+            <a:r>
+              <a:rPr lang="nl-NL" sz="1600" dirty="0">
+                <a:solidFill>
+                  <a:schemeClr val="accent2">
+                    <a:lumMod val="75000"/>
+                  </a:schemeClr>
+                </a:solidFill>
+              </a:rPr>
+              <a:t>"</a:t>
+            </a:r>
+            <a:r>
+              <a:rPr lang="nl-NL" sz="1600" dirty="0" err="1">
+                <a:solidFill>
+                  <a:schemeClr val="accent2">
+                    <a:lumMod val="75000"/>
+                  </a:schemeClr>
+                </a:solidFill>
+              </a:rPr>
+              <a:t>Hello</a:t>
+            </a:r>
+            <a:r>
+              <a:rPr lang="nl-NL" sz="1600" dirty="0">
+                <a:solidFill>
+                  <a:schemeClr val="accent2">
+                    <a:lumMod val="75000"/>
+                  </a:schemeClr>
+                </a:solidFill>
+              </a:rPr>
+              <a:t> World"</a:t>
+            </a:r>
+            <a:r>
+              <a:rPr lang="nl-NL" sz="1600" dirty="0">
+                <a:solidFill>
+                  <a:schemeClr val="tx1"/>
+                </a:solidFill>
+              </a:rPr>
+              <a:t>)</a:t>
+            </a:r>
+          </a:p>
+        </p:txBody>
+      </p:sp>
+      <p:sp>
+        <p:nvSpPr>
+          <p:cNvPr id="12" name="TextBox 11">
+            <a:extLst>
+              <a:ext uri="{FF2B5EF4-FFF2-40B4-BE49-F238E27FC236}">
+                <a16:creationId xmlns:a16="http://schemas.microsoft.com/office/drawing/2014/main" id="{7A1A6AD8-69C5-2721-1391-DFE214520156}"/>
+              </a:ext>
+            </a:extLst>
+          </p:cNvPr>
+          <p:cNvSpPr txBox="1"/>
+          <p:nvPr/>
+        </p:nvSpPr>
+        <p:spPr>
+          <a:xfrm>
+            <a:off x="8648100" y="5666951"/>
+            <a:ext cx="934679" cy="369332"/>
+          </a:xfrm>
+          <a:prstGeom prst="rect">
+            <a:avLst/>
+          </a:prstGeom>
+          <a:noFill/>
+        </p:spPr>
+        <p:txBody>
+          <a:bodyPr wrap="none" rtlCol="0">
+            <a:spAutoFit/>
+          </a:bodyPr>
+          <a:lstStyle/>
+          <a:p>
+            <a:r>
+              <a:rPr lang="nl-NL" dirty="0" err="1"/>
+              <a:t>develop</a:t>
+            </a:r>
+            <a:endParaRPr lang="nl-NL" dirty="0"/>
+          </a:p>
+        </p:txBody>
+      </p:sp>
+      <p:sp>
+        <p:nvSpPr>
+          <p:cNvPr id="16" name="Rectangle 15">
+            <a:extLst>
+              <a:ext uri="{FF2B5EF4-FFF2-40B4-BE49-F238E27FC236}">
+                <a16:creationId xmlns:a16="http://schemas.microsoft.com/office/drawing/2014/main" id="{05DB080C-21EA-BFB1-5147-5B77F89B2E00}"/>
+              </a:ext>
+            </a:extLst>
+          </p:cNvPr>
+          <p:cNvSpPr/>
+          <p:nvPr/>
+        </p:nvSpPr>
+        <p:spPr>
+          <a:xfrm>
+            <a:off x="6823418" y="2048321"/>
+            <a:ext cx="2032781" cy="921490"/>
+          </a:xfrm>
+          <a:prstGeom prst="rect">
+            <a:avLst/>
+          </a:prstGeom>
+          <a:solidFill>
+            <a:schemeClr val="bg1">
+              <a:lumMod val="85000"/>
+            </a:schemeClr>
+          </a:solidFill>
+        </p:spPr>
+        <p:style>
+          <a:lnRef idx="1">
+            <a:schemeClr val="accent3"/>
+          </a:lnRef>
+          <a:fillRef idx="2">
+            <a:schemeClr val="accent3"/>
+          </a:fillRef>
+          <a:effectRef idx="1">
+            <a:schemeClr val="accent3"/>
+          </a:effectRef>
+          <a:fontRef idx="minor">
+            <a:schemeClr val="dk1"/>
+          </a:fontRef>
+        </p:style>
+        <p:txBody>
+          <a:bodyPr rtlCol="0" anchor="t"/>
+          <a:lstStyle/>
+          <a:p>
+            <a:r>
+              <a:rPr lang="nl-NL" sz="1600" b="1" dirty="0"/>
+              <a:t>utils.py</a:t>
+            </a:r>
+          </a:p>
+          <a:p>
+            <a:endParaRPr lang="nl-NL" sz="1600" dirty="0"/>
+          </a:p>
+          <a:p>
+            <a:r>
+              <a:rPr lang="nl-NL" sz="1600" dirty="0">
+                <a:solidFill>
+                  <a:schemeClr val="accent2">
+                    <a:lumMod val="75000"/>
+                  </a:schemeClr>
+                </a:solidFill>
+              </a:rPr>
+              <a:t>"""Utilities module"""</a:t>
+            </a:r>
+          </a:p>
+        </p:txBody>
+      </p:sp>
+      <p:sp>
+        <p:nvSpPr>
+          <p:cNvPr id="17" name="Rectangle 16">
+            <a:extLst>
+              <a:ext uri="{FF2B5EF4-FFF2-40B4-BE49-F238E27FC236}">
+                <a16:creationId xmlns:a16="http://schemas.microsoft.com/office/drawing/2014/main" id="{E4B63278-81CD-0AE7-7971-718AD21107EA}"/>
+              </a:ext>
+            </a:extLst>
+          </p:cNvPr>
+          <p:cNvSpPr/>
+          <p:nvPr/>
+        </p:nvSpPr>
+        <p:spPr>
+          <a:xfrm>
+            <a:off x="9321019" y="2048321"/>
+            <a:ext cx="2032781" cy="921490"/>
+          </a:xfrm>
+          <a:prstGeom prst="rect">
+            <a:avLst/>
+          </a:prstGeom>
+          <a:solidFill>
+            <a:schemeClr val="bg1">
+              <a:lumMod val="85000"/>
+            </a:schemeClr>
+          </a:solidFill>
+        </p:spPr>
+        <p:style>
+          <a:lnRef idx="1">
+            <a:schemeClr val="accent3"/>
+          </a:lnRef>
+          <a:fillRef idx="2">
+            <a:schemeClr val="accent3"/>
+          </a:fillRef>
+          <a:effectRef idx="1">
+            <a:schemeClr val="accent3"/>
+          </a:effectRef>
+          <a:fontRef idx="minor">
+            <a:schemeClr val="dk1"/>
+          </a:fontRef>
+        </p:style>
+        <p:txBody>
+          <a:bodyPr rtlCol="0" anchor="t"/>
+          <a:lstStyle/>
+          <a:p>
+            <a:r>
+              <a:rPr lang="nl-NL" sz="1600" b="1" dirty="0"/>
+              <a:t>main.py</a:t>
+            </a:r>
+          </a:p>
+          <a:p>
+            <a:endParaRPr lang="nl-NL" sz="1600" dirty="0"/>
+          </a:p>
+          <a:p>
+            <a:r>
+              <a:rPr lang="nl-NL" sz="1600" dirty="0">
+                <a:solidFill>
+                  <a:schemeClr val="accent2">
+                    <a:lumMod val="75000"/>
+                  </a:schemeClr>
+                </a:solidFill>
+              </a:rPr>
+              <a:t>"""</a:t>
+            </a:r>
+            <a:r>
+              <a:rPr lang="nl-NL" sz="1600" dirty="0" err="1">
+                <a:solidFill>
+                  <a:schemeClr val="accent2">
+                    <a:lumMod val="75000"/>
+                  </a:schemeClr>
+                </a:solidFill>
+              </a:rPr>
+              <a:t>Main</a:t>
+            </a:r>
+            <a:r>
+              <a:rPr lang="nl-NL" sz="1600" dirty="0">
+                <a:solidFill>
+                  <a:schemeClr val="accent2">
+                    <a:lumMod val="75000"/>
+                  </a:schemeClr>
+                </a:solidFill>
+              </a:rPr>
+              <a:t> module"""</a:t>
+            </a:r>
+          </a:p>
+        </p:txBody>
+      </p:sp>
+      <p:sp>
+        <p:nvSpPr>
+          <p:cNvPr id="19" name="TextBox 18">
+            <a:extLst>
+              <a:ext uri="{FF2B5EF4-FFF2-40B4-BE49-F238E27FC236}">
+                <a16:creationId xmlns:a16="http://schemas.microsoft.com/office/drawing/2014/main" id="{D4B3ABD1-6F54-F74B-7A08-CEA4A601963B}"/>
+              </a:ext>
+            </a:extLst>
+          </p:cNvPr>
+          <p:cNvSpPr txBox="1"/>
+          <p:nvPr/>
+        </p:nvSpPr>
+        <p:spPr>
+          <a:xfrm>
+            <a:off x="8152228" y="1456267"/>
+            <a:ext cx="1926425" cy="369332"/>
+          </a:xfrm>
+          <a:prstGeom prst="rect">
+            <a:avLst/>
+          </a:prstGeom>
+          <a:noFill/>
+        </p:spPr>
+        <p:txBody>
+          <a:bodyPr wrap="none" rtlCol="0">
+            <a:spAutoFit/>
+          </a:bodyPr>
+          <a:lstStyle/>
+          <a:p>
+            <a:r>
+              <a:rPr lang="nl-NL" dirty="0"/>
+              <a:t>feature/make-</a:t>
+            </a:r>
+            <a:r>
+              <a:rPr lang="nl-NL" dirty="0" err="1"/>
+              <a:t>utils</a:t>
+            </a:r>
+            <a:endParaRPr lang="nl-NL" dirty="0"/>
+          </a:p>
+        </p:txBody>
+      </p:sp>
+    </p:spTree>
+    <p:extLst>
+      <p:ext uri="{BB962C8B-B14F-4D97-AF65-F5344CB8AC3E}">
+        <p14:creationId xmlns:p14="http://schemas.microsoft.com/office/powerpoint/2010/main" val="3129000528"/>
+      </p:ext>
+    </p:extLst>
+  </p:cSld>
+  <p:clrMapOvr>
+    <a:masterClrMapping/>
+  </p:clrMapOvr>
+</p:sld>
+</file>
+
+<file path=ppt/slides/slide55.xml><?xml version="1.0" encoding="utf-8"?>
+<p:sld xmlns:a="http://schemas.openxmlformats.org/drawingml/2006/main" xmlns:r="http://schemas.openxmlformats.org/officeDocument/2006/relationships" xmlns:p="http://schemas.openxmlformats.org/presentationml/2006/main">
+  <p:cSld>
+    <p:spTree>
+      <p:nvGrpSpPr>
+        <p:cNvPr id="1" name="">
+          <a:extLst>
+            <a:ext uri="{FF2B5EF4-FFF2-40B4-BE49-F238E27FC236}">
+              <a16:creationId xmlns:a16="http://schemas.microsoft.com/office/drawing/2014/main" id="{53C7062C-0D2F-ACF4-3D1B-2291FCAADD72}"/>
+            </a:ext>
+          </a:extLst>
+        </p:cNvPr>
+        <p:cNvGrpSpPr/>
+        <p:nvPr/>
+      </p:nvGrpSpPr>
+      <p:grpSpPr>
+        <a:xfrm>
+          <a:off x="0" y="0"/>
+          <a:ext cx="0" cy="0"/>
+          <a:chOff x="0" y="0"/>
+          <a:chExt cx="0" cy="0"/>
+        </a:xfrm>
+      </p:grpSpPr>
+      <p:sp>
+        <p:nvSpPr>
+          <p:cNvPr id="2" name="Title 1">
+            <a:extLst>
+              <a:ext uri="{FF2B5EF4-FFF2-40B4-BE49-F238E27FC236}">
+                <a16:creationId xmlns:a16="http://schemas.microsoft.com/office/drawing/2014/main" id="{FACAD2E2-AF92-34F4-4487-FD4E2C215270}"/>
+              </a:ext>
+            </a:extLst>
+          </p:cNvPr>
+          <p:cNvSpPr>
+            <a:spLocks noGrp="1"/>
+          </p:cNvSpPr>
+          <p:nvPr>
+            <p:ph type="title"/>
+          </p:nvPr>
+        </p:nvSpPr>
+        <p:spPr>
+          <a:xfrm>
+            <a:off x="838200" y="365126"/>
+            <a:ext cx="10515600" cy="718608"/>
+          </a:xfrm>
+        </p:spPr>
+        <p:txBody>
+          <a:bodyPr>
+            <a:normAutofit/>
+          </a:bodyPr>
+          <a:lstStyle/>
+          <a:p>
+            <a:r>
+              <a:rPr lang="nl-NL" sz="3600" noProof="0" dirty="0"/>
+              <a:t>Wat is een conflict?</a:t>
+            </a:r>
+          </a:p>
+        </p:txBody>
+      </p:sp>
+      <p:sp>
+        <p:nvSpPr>
+          <p:cNvPr id="9" name="Content Placeholder 2">
+            <a:extLst>
+              <a:ext uri="{FF2B5EF4-FFF2-40B4-BE49-F238E27FC236}">
+                <a16:creationId xmlns:a16="http://schemas.microsoft.com/office/drawing/2014/main" id="{7BE5D703-13E7-A6E2-B6EE-39357722FF87}"/>
+              </a:ext>
+            </a:extLst>
+          </p:cNvPr>
+          <p:cNvSpPr>
+            <a:spLocks noGrp="1"/>
+          </p:cNvSpPr>
+          <p:nvPr>
+            <p:ph idx="1"/>
+          </p:nvPr>
+        </p:nvSpPr>
+        <p:spPr>
+          <a:xfrm>
+            <a:off x="838200" y="1456267"/>
+            <a:ext cx="5520398" cy="4720696"/>
+          </a:xfrm>
+        </p:spPr>
+        <p:txBody>
+          <a:bodyPr>
+            <a:normAutofit/>
+          </a:bodyPr>
+          <a:lstStyle/>
+          <a:p>
+            <a:pPr marL="0" indent="0">
+              <a:buNone/>
+            </a:pPr>
+            <a:r>
+              <a:rPr lang="nl-NL" sz="1800" dirty="0">
+                <a:cs typeface="Courier New" panose="02070309020205020404" pitchFamily="49" charset="0"/>
+              </a:rPr>
+              <a:t>Branches staan los van elkaar en kunnen tegelijkertijd wijzigen.</a:t>
+            </a:r>
+          </a:p>
+          <a:p>
+            <a:pPr marL="0" indent="0">
+              <a:buNone/>
+            </a:pPr>
+            <a:endParaRPr lang="nl-NL" sz="1800" dirty="0">
+              <a:cs typeface="Courier New" panose="02070309020205020404" pitchFamily="49" charset="0"/>
+            </a:endParaRPr>
+          </a:p>
+          <a:p>
+            <a:pPr marL="0" indent="0">
+              <a:buNone/>
+            </a:pPr>
+            <a:r>
+              <a:rPr lang="nl-NL" sz="1800" dirty="0">
+                <a:cs typeface="Courier New" panose="02070309020205020404" pitchFamily="49" charset="0"/>
+              </a:rPr>
+              <a:t>Hierdoor kunnen wijzigingen ontstaan die strijdig met elkaar zijn.</a:t>
+            </a:r>
+          </a:p>
+          <a:p>
+            <a:pPr marL="0" indent="0">
+              <a:buNone/>
+            </a:pPr>
+            <a:endParaRPr lang="nl-NL" sz="1800" dirty="0">
+              <a:cs typeface="Courier New" panose="02070309020205020404" pitchFamily="49" charset="0"/>
+            </a:endParaRPr>
+          </a:p>
+          <a:p>
+            <a:pPr marL="0" indent="0">
+              <a:buNone/>
+            </a:pPr>
+            <a:r>
+              <a:rPr lang="nl-NL" sz="1800" b="1" dirty="0">
+                <a:cs typeface="Courier New" panose="02070309020205020404" pitchFamily="49" charset="0"/>
+              </a:rPr>
+              <a:t>Geen conflict:</a:t>
+            </a:r>
+          </a:p>
+          <a:p>
+            <a:pPr marL="0" indent="0">
+              <a:buNone/>
+            </a:pPr>
+            <a:r>
+              <a:rPr lang="nl-NL" sz="1800" dirty="0">
+                <a:cs typeface="Courier New" panose="02070309020205020404" pitchFamily="49" charset="0"/>
+              </a:rPr>
+              <a:t>Nieuw / gewijzigd / verwijderd bestand op </a:t>
+            </a:r>
+            <a:r>
+              <a:rPr lang="nl-NL" sz="1800" u="sng" dirty="0">
+                <a:cs typeface="Courier New" panose="02070309020205020404" pitchFamily="49" charset="0"/>
+              </a:rPr>
+              <a:t>een </a:t>
+            </a:r>
+            <a:r>
+              <a:rPr lang="nl-NL" sz="1800" u="sng" dirty="0" err="1">
+                <a:cs typeface="Courier New" panose="02070309020205020404" pitchFamily="49" charset="0"/>
+              </a:rPr>
+              <a:t>branch</a:t>
+            </a:r>
+            <a:r>
+              <a:rPr lang="nl-NL" sz="1800" dirty="0">
+                <a:cs typeface="Courier New" panose="02070309020205020404" pitchFamily="49" charset="0"/>
+              </a:rPr>
+              <a:t>.</a:t>
+            </a:r>
+          </a:p>
+          <a:p>
+            <a:pPr marL="0" indent="0">
+              <a:buNone/>
+            </a:pPr>
+            <a:endParaRPr lang="nl-NL" sz="1800" dirty="0">
+              <a:cs typeface="Courier New" panose="02070309020205020404" pitchFamily="49" charset="0"/>
+            </a:endParaRPr>
+          </a:p>
+          <a:p>
+            <a:pPr marL="0" indent="0">
+              <a:buNone/>
+            </a:pPr>
+            <a:endParaRPr lang="nl-NL" sz="1800" dirty="0">
+              <a:cs typeface="Courier New" panose="02070309020205020404" pitchFamily="49" charset="0"/>
+            </a:endParaRPr>
+          </a:p>
+          <a:p>
+            <a:pPr marL="0" indent="0">
+              <a:buNone/>
+            </a:pPr>
+            <a:r>
+              <a:rPr lang="nl-NL" sz="1800" b="1" dirty="0">
+                <a:cs typeface="Courier New" panose="02070309020205020404" pitchFamily="49" charset="0"/>
+              </a:rPr>
+              <a:t>Wel conflict:</a:t>
+            </a:r>
+          </a:p>
+          <a:p>
+            <a:pPr marL="0" indent="0">
+              <a:buNone/>
+            </a:pPr>
+            <a:r>
+              <a:rPr lang="nl-NL" sz="1800" dirty="0">
+                <a:cs typeface="Courier New" panose="02070309020205020404" pitchFamily="49" charset="0"/>
+              </a:rPr>
+              <a:t>Bestand dat op </a:t>
+            </a:r>
+            <a:r>
+              <a:rPr lang="nl-NL" sz="1800" u="sng" dirty="0">
+                <a:cs typeface="Courier New" panose="02070309020205020404" pitchFamily="49" charset="0"/>
+              </a:rPr>
+              <a:t>beide branches</a:t>
+            </a:r>
+            <a:r>
+              <a:rPr lang="nl-NL" sz="1800" dirty="0">
+                <a:cs typeface="Courier New" panose="02070309020205020404" pitchFamily="49" charset="0"/>
+              </a:rPr>
+              <a:t> gewijzigd of verwijderd is.</a:t>
+            </a:r>
+          </a:p>
+        </p:txBody>
+      </p:sp>
+      <p:sp>
+        <p:nvSpPr>
+          <p:cNvPr id="14" name="Rectangle 13">
+            <a:extLst>
+              <a:ext uri="{FF2B5EF4-FFF2-40B4-BE49-F238E27FC236}">
+                <a16:creationId xmlns:a16="http://schemas.microsoft.com/office/drawing/2014/main" id="{DB88D974-0606-418B-9574-1D7C4ED67403}"/>
+              </a:ext>
+            </a:extLst>
+          </p:cNvPr>
+          <p:cNvSpPr/>
+          <p:nvPr/>
+        </p:nvSpPr>
+        <p:spPr>
+          <a:xfrm>
+            <a:off x="6823417" y="4304708"/>
+            <a:ext cx="2032781" cy="921490"/>
+          </a:xfrm>
+          <a:prstGeom prst="rect">
+            <a:avLst/>
+          </a:prstGeom>
+          <a:solidFill>
+            <a:schemeClr val="accent6">
+              <a:lumMod val="40000"/>
+              <a:lumOff val="60000"/>
+            </a:schemeClr>
+          </a:solidFill>
+        </p:spPr>
+        <p:style>
+          <a:lnRef idx="1">
+            <a:schemeClr val="accent6"/>
+          </a:lnRef>
+          <a:fillRef idx="2">
+            <a:schemeClr val="accent6"/>
+          </a:fillRef>
+          <a:effectRef idx="1">
+            <a:schemeClr val="accent6"/>
+          </a:effectRef>
+          <a:fontRef idx="minor">
+            <a:schemeClr val="dk1"/>
+          </a:fontRef>
+        </p:style>
+        <p:txBody>
+          <a:bodyPr rtlCol="0" anchor="t"/>
+          <a:lstStyle/>
+          <a:p>
+            <a:r>
+              <a:rPr lang="nl-NL" sz="1600" b="1" dirty="0"/>
+              <a:t>utils.py</a:t>
+            </a:r>
+          </a:p>
+          <a:p>
+            <a:endParaRPr lang="nl-NL" sz="1600" dirty="0"/>
+          </a:p>
+          <a:p>
+            <a:r>
+              <a:rPr lang="nl-NL" sz="1600" dirty="0">
+                <a:solidFill>
+                  <a:schemeClr val="accent2">
+                    <a:lumMod val="75000"/>
+                  </a:schemeClr>
+                </a:solidFill>
+              </a:rPr>
+              <a:t>"""Utilities module"""</a:t>
+            </a:r>
+          </a:p>
+        </p:txBody>
+      </p:sp>
+      <p:cxnSp>
+        <p:nvCxnSpPr>
+          <p:cNvPr id="18" name="Straight Arrow Connector 17">
+            <a:extLst>
+              <a:ext uri="{FF2B5EF4-FFF2-40B4-BE49-F238E27FC236}">
+                <a16:creationId xmlns:a16="http://schemas.microsoft.com/office/drawing/2014/main" id="{4F19ECB4-A9A8-6FDD-4CEB-4677E2596F41}"/>
+              </a:ext>
+            </a:extLst>
+          </p:cNvPr>
+          <p:cNvCxnSpPr>
+            <a:cxnSpLocks/>
+            <a:stCxn id="12" idx="2"/>
+            <a:endCxn id="14" idx="0"/>
+          </p:cNvCxnSpPr>
+          <p:nvPr/>
+        </p:nvCxnSpPr>
+        <p:spPr>
+          <a:xfrm flipH="1">
+            <a:off x="7839808" y="2969811"/>
+            <a:ext cx="1" cy="1334897"/>
+          </a:xfrm>
+          <a:prstGeom prst="straightConnector1">
+            <a:avLst/>
+          </a:prstGeom>
+          <a:ln>
+            <a:tailEnd type="triangle"/>
+          </a:ln>
+        </p:spPr>
+        <p:style>
+          <a:lnRef idx="2">
+            <a:schemeClr val="accent6"/>
+          </a:lnRef>
+          <a:fillRef idx="0">
+            <a:schemeClr val="accent6"/>
+          </a:fillRef>
+          <a:effectRef idx="1">
+            <a:schemeClr val="accent6"/>
+          </a:effectRef>
+          <a:fontRef idx="minor">
+            <a:schemeClr val="tx1"/>
+          </a:fontRef>
+        </p:style>
+      </p:cxnSp>
+      <p:sp>
+        <p:nvSpPr>
+          <p:cNvPr id="3" name="Rectangle 2">
+            <a:extLst>
+              <a:ext uri="{FF2B5EF4-FFF2-40B4-BE49-F238E27FC236}">
+                <a16:creationId xmlns:a16="http://schemas.microsoft.com/office/drawing/2014/main" id="{9BD8FEFC-A7B2-EA6B-A118-ED748ECE2DCE}"/>
+              </a:ext>
+            </a:extLst>
+          </p:cNvPr>
+          <p:cNvSpPr/>
+          <p:nvPr/>
+        </p:nvSpPr>
+        <p:spPr>
+          <a:xfrm>
+            <a:off x="9321019" y="4304708"/>
+            <a:ext cx="2032781" cy="1209820"/>
+          </a:xfrm>
+          <a:prstGeom prst="rect">
+            <a:avLst/>
+          </a:prstGeom>
+          <a:solidFill>
+            <a:schemeClr val="accent2">
+              <a:lumMod val="40000"/>
+              <a:lumOff val="60000"/>
+            </a:schemeClr>
+          </a:solidFill>
+        </p:spPr>
+        <p:style>
+          <a:lnRef idx="1">
+            <a:schemeClr val="accent2"/>
+          </a:lnRef>
+          <a:fillRef idx="2">
+            <a:schemeClr val="accent2"/>
+          </a:fillRef>
+          <a:effectRef idx="1">
+            <a:schemeClr val="accent2"/>
+          </a:effectRef>
+          <a:fontRef idx="minor">
+            <a:schemeClr val="dk1"/>
+          </a:fontRef>
+        </p:style>
+        <p:txBody>
+          <a:bodyPr rtlCol="0" anchor="t"/>
+          <a:lstStyle/>
+          <a:p>
+            <a:r>
+              <a:rPr lang="nl-NL" sz="1600" b="1" dirty="0"/>
+              <a:t>main.py</a:t>
+            </a:r>
+          </a:p>
+          <a:p>
+            <a:endParaRPr lang="nl-NL" sz="1600" dirty="0"/>
+          </a:p>
+          <a:p>
+            <a:r>
+              <a:rPr lang="nl-NL" sz="1600" dirty="0">
+                <a:solidFill>
+                  <a:srgbClr val="FF0000"/>
+                </a:solidFill>
+              </a:rPr>
+              <a:t>"""</a:t>
+            </a:r>
+            <a:r>
+              <a:rPr lang="nl-NL" sz="1600" dirty="0" err="1">
+                <a:solidFill>
+                  <a:srgbClr val="FF0000"/>
+                </a:solidFill>
+              </a:rPr>
+              <a:t>Main</a:t>
+            </a:r>
+            <a:r>
+              <a:rPr lang="nl-NL" sz="1600" dirty="0">
+                <a:solidFill>
+                  <a:srgbClr val="FF0000"/>
+                </a:solidFill>
+              </a:rPr>
+              <a:t> module"""</a:t>
+            </a:r>
+          </a:p>
+          <a:p>
+            <a:r>
+              <a:rPr lang="nl-NL" sz="1600" dirty="0">
+                <a:solidFill>
+                  <a:srgbClr val="FF0000"/>
+                </a:solidFill>
+              </a:rPr>
+              <a:t>print("</a:t>
+            </a:r>
+            <a:r>
+              <a:rPr lang="nl-NL" sz="1600" dirty="0" err="1">
+                <a:solidFill>
+                  <a:srgbClr val="FF0000"/>
+                </a:solidFill>
+              </a:rPr>
+              <a:t>Hello</a:t>
+            </a:r>
+            <a:r>
+              <a:rPr lang="nl-NL" sz="1600" dirty="0">
+                <a:solidFill>
+                  <a:srgbClr val="FF0000"/>
+                </a:solidFill>
+              </a:rPr>
+              <a:t> World")</a:t>
+            </a:r>
+          </a:p>
+        </p:txBody>
+      </p:sp>
+      <p:cxnSp>
+        <p:nvCxnSpPr>
+          <p:cNvPr id="8" name="Straight Arrow Connector 7">
+            <a:extLst>
+              <a:ext uri="{FF2B5EF4-FFF2-40B4-BE49-F238E27FC236}">
+                <a16:creationId xmlns:a16="http://schemas.microsoft.com/office/drawing/2014/main" id="{7F2A002D-D2BB-7420-25D9-A35E843220B7}"/>
+              </a:ext>
+            </a:extLst>
+          </p:cNvPr>
+          <p:cNvCxnSpPr>
+            <a:cxnSpLocks/>
+            <a:stCxn id="13" idx="2"/>
+            <a:endCxn id="3" idx="0"/>
+          </p:cNvCxnSpPr>
+          <p:nvPr/>
+        </p:nvCxnSpPr>
+        <p:spPr>
+          <a:xfrm>
+            <a:off x="10337410" y="2969811"/>
+            <a:ext cx="0" cy="1334897"/>
+          </a:xfrm>
+          <a:prstGeom prst="straightConnector1">
+            <a:avLst/>
+          </a:prstGeom>
+          <a:ln>
+            <a:tailEnd type="triangle"/>
+          </a:ln>
+        </p:spPr>
+        <p:style>
+          <a:lnRef idx="2">
+            <a:schemeClr val="accent2"/>
+          </a:lnRef>
+          <a:fillRef idx="0">
+            <a:schemeClr val="accent2"/>
+          </a:fillRef>
+          <a:effectRef idx="1">
+            <a:schemeClr val="accent2"/>
+          </a:effectRef>
+          <a:fontRef idx="minor">
+            <a:schemeClr val="tx1"/>
+          </a:fontRef>
+        </p:style>
+      </p:cxnSp>
+      <p:sp>
+        <p:nvSpPr>
+          <p:cNvPr id="11" name="TextBox 10">
+            <a:extLst>
+              <a:ext uri="{FF2B5EF4-FFF2-40B4-BE49-F238E27FC236}">
+                <a16:creationId xmlns:a16="http://schemas.microsoft.com/office/drawing/2014/main" id="{F5092916-D379-2425-F24C-CD9FD4DA0F55}"/>
+              </a:ext>
+            </a:extLst>
+          </p:cNvPr>
+          <p:cNvSpPr txBox="1"/>
+          <p:nvPr/>
+        </p:nvSpPr>
+        <p:spPr>
+          <a:xfrm>
+            <a:off x="8648100" y="5666951"/>
+            <a:ext cx="934679" cy="369332"/>
+          </a:xfrm>
+          <a:prstGeom prst="rect">
+            <a:avLst/>
+          </a:prstGeom>
+          <a:noFill/>
+        </p:spPr>
+        <p:txBody>
+          <a:bodyPr wrap="none" rtlCol="0">
+            <a:spAutoFit/>
+          </a:bodyPr>
+          <a:lstStyle/>
+          <a:p>
+            <a:r>
+              <a:rPr lang="nl-NL" dirty="0" err="1"/>
+              <a:t>develop</a:t>
+            </a:r>
+            <a:endParaRPr lang="nl-NL" dirty="0"/>
+          </a:p>
+        </p:txBody>
+      </p:sp>
+      <p:sp>
+        <p:nvSpPr>
+          <p:cNvPr id="12" name="Rectangle 11">
+            <a:extLst>
+              <a:ext uri="{FF2B5EF4-FFF2-40B4-BE49-F238E27FC236}">
+                <a16:creationId xmlns:a16="http://schemas.microsoft.com/office/drawing/2014/main" id="{FE391CCF-989C-1D80-45A6-856ECD950E4A}"/>
+              </a:ext>
+            </a:extLst>
+          </p:cNvPr>
+          <p:cNvSpPr/>
+          <p:nvPr/>
+        </p:nvSpPr>
+        <p:spPr>
+          <a:xfrm>
+            <a:off x="6823418" y="2048321"/>
+            <a:ext cx="2032781" cy="921490"/>
+          </a:xfrm>
+          <a:prstGeom prst="rect">
+            <a:avLst/>
+          </a:prstGeom>
+          <a:solidFill>
+            <a:schemeClr val="bg1">
+              <a:lumMod val="85000"/>
+            </a:schemeClr>
+          </a:solidFill>
+        </p:spPr>
+        <p:style>
+          <a:lnRef idx="1">
+            <a:schemeClr val="accent3"/>
+          </a:lnRef>
+          <a:fillRef idx="2">
+            <a:schemeClr val="accent3"/>
+          </a:fillRef>
+          <a:effectRef idx="1">
+            <a:schemeClr val="accent3"/>
+          </a:effectRef>
+          <a:fontRef idx="minor">
+            <a:schemeClr val="dk1"/>
+          </a:fontRef>
+        </p:style>
+        <p:txBody>
+          <a:bodyPr rtlCol="0" anchor="t"/>
+          <a:lstStyle/>
+          <a:p>
+            <a:r>
+              <a:rPr lang="nl-NL" sz="1600" b="1" dirty="0"/>
+              <a:t>utils.py</a:t>
+            </a:r>
+          </a:p>
+          <a:p>
+            <a:endParaRPr lang="nl-NL" sz="1600" dirty="0"/>
+          </a:p>
+          <a:p>
+            <a:r>
+              <a:rPr lang="nl-NL" sz="1600" dirty="0">
+                <a:solidFill>
+                  <a:schemeClr val="accent2">
+                    <a:lumMod val="75000"/>
+                  </a:schemeClr>
+                </a:solidFill>
+              </a:rPr>
+              <a:t>"""Utilities module"""</a:t>
+            </a:r>
+          </a:p>
+        </p:txBody>
+      </p:sp>
+      <p:sp>
+        <p:nvSpPr>
+          <p:cNvPr id="13" name="Rectangle 12">
+            <a:extLst>
+              <a:ext uri="{FF2B5EF4-FFF2-40B4-BE49-F238E27FC236}">
+                <a16:creationId xmlns:a16="http://schemas.microsoft.com/office/drawing/2014/main" id="{1B69B069-A907-08FE-D837-73BD5AC128AF}"/>
+              </a:ext>
+            </a:extLst>
+          </p:cNvPr>
+          <p:cNvSpPr/>
+          <p:nvPr/>
+        </p:nvSpPr>
+        <p:spPr>
+          <a:xfrm>
+            <a:off x="9321019" y="2048321"/>
+            <a:ext cx="2032781" cy="921490"/>
+          </a:xfrm>
+          <a:prstGeom prst="rect">
+            <a:avLst/>
+          </a:prstGeom>
+          <a:solidFill>
+            <a:schemeClr val="bg1">
+              <a:lumMod val="85000"/>
+            </a:schemeClr>
+          </a:solidFill>
+        </p:spPr>
+        <p:style>
+          <a:lnRef idx="1">
+            <a:schemeClr val="accent3"/>
+          </a:lnRef>
+          <a:fillRef idx="2">
+            <a:schemeClr val="accent3"/>
+          </a:fillRef>
+          <a:effectRef idx="1">
+            <a:schemeClr val="accent3"/>
+          </a:effectRef>
+          <a:fontRef idx="minor">
+            <a:schemeClr val="dk1"/>
+          </a:fontRef>
+        </p:style>
+        <p:txBody>
+          <a:bodyPr rtlCol="0" anchor="t"/>
+          <a:lstStyle/>
+          <a:p>
+            <a:r>
+              <a:rPr lang="nl-NL" sz="1600" b="1" dirty="0"/>
+              <a:t>main.py</a:t>
+            </a:r>
+          </a:p>
+          <a:p>
+            <a:endParaRPr lang="nl-NL" sz="1600" dirty="0"/>
+          </a:p>
+          <a:p>
+            <a:r>
+              <a:rPr lang="nl-NL" sz="1600" dirty="0">
+                <a:solidFill>
+                  <a:schemeClr val="accent2">
+                    <a:lumMod val="75000"/>
+                  </a:schemeClr>
+                </a:solidFill>
+              </a:rPr>
+              <a:t>"""</a:t>
+            </a:r>
+            <a:r>
+              <a:rPr lang="nl-NL" sz="1600" dirty="0" err="1">
+                <a:solidFill>
+                  <a:schemeClr val="accent2">
+                    <a:lumMod val="75000"/>
+                  </a:schemeClr>
+                </a:solidFill>
+              </a:rPr>
+              <a:t>Main</a:t>
+            </a:r>
+            <a:r>
+              <a:rPr lang="nl-NL" sz="1600" dirty="0">
+                <a:solidFill>
+                  <a:schemeClr val="accent2">
+                    <a:lumMod val="75000"/>
+                  </a:schemeClr>
+                </a:solidFill>
+              </a:rPr>
+              <a:t> module"""</a:t>
+            </a:r>
+          </a:p>
+        </p:txBody>
+      </p:sp>
+      <p:sp>
+        <p:nvSpPr>
+          <p:cNvPr id="15" name="TextBox 14">
+            <a:extLst>
+              <a:ext uri="{FF2B5EF4-FFF2-40B4-BE49-F238E27FC236}">
+                <a16:creationId xmlns:a16="http://schemas.microsoft.com/office/drawing/2014/main" id="{3061178F-E03A-E138-D947-66938BFD2B7B}"/>
+              </a:ext>
+            </a:extLst>
+          </p:cNvPr>
+          <p:cNvSpPr txBox="1"/>
+          <p:nvPr/>
+        </p:nvSpPr>
+        <p:spPr>
+          <a:xfrm>
+            <a:off x="8152228" y="1456267"/>
+            <a:ext cx="1926425" cy="369332"/>
+          </a:xfrm>
+          <a:prstGeom prst="rect">
+            <a:avLst/>
+          </a:prstGeom>
+          <a:noFill/>
+        </p:spPr>
+        <p:txBody>
+          <a:bodyPr wrap="none" rtlCol="0">
+            <a:spAutoFit/>
+          </a:bodyPr>
+          <a:lstStyle/>
+          <a:p>
+            <a:r>
+              <a:rPr lang="nl-NL" dirty="0"/>
+              <a:t>feature/make-</a:t>
+            </a:r>
+            <a:r>
+              <a:rPr lang="nl-NL" dirty="0" err="1"/>
+              <a:t>utils</a:t>
+            </a:r>
+            <a:endParaRPr lang="nl-NL" dirty="0"/>
+          </a:p>
+        </p:txBody>
+      </p:sp>
+    </p:spTree>
+    <p:extLst>
+      <p:ext uri="{BB962C8B-B14F-4D97-AF65-F5344CB8AC3E}">
+        <p14:creationId xmlns:p14="http://schemas.microsoft.com/office/powerpoint/2010/main" val="3037954064"/>
+      </p:ext>
+    </p:extLst>
+  </p:cSld>
+  <p:clrMapOvr>
+    <a:masterClrMapping/>
+  </p:clrMapOvr>
+</p:sld>
+</file>
+
+<file path=ppt/slides/slide56.xml><?xml version="1.0" encoding="utf-8"?>
+<p:sld xmlns:a="http://schemas.openxmlformats.org/drawingml/2006/main" xmlns:r="http://schemas.openxmlformats.org/officeDocument/2006/relationships" xmlns:p="http://schemas.openxmlformats.org/presentationml/2006/main">
+  <p:cSld>
+    <p:spTree>
+      <p:nvGrpSpPr>
+        <p:cNvPr id="1" name="">
+          <a:extLst>
+            <a:ext uri="{FF2B5EF4-FFF2-40B4-BE49-F238E27FC236}">
+              <a16:creationId xmlns:a16="http://schemas.microsoft.com/office/drawing/2014/main" id="{AD3E543B-55C1-6758-420F-A37CC0D96CBE}"/>
+            </a:ext>
+          </a:extLst>
+        </p:cNvPr>
+        <p:cNvGrpSpPr/>
+        <p:nvPr/>
+      </p:nvGrpSpPr>
+      <p:grpSpPr>
+        <a:xfrm>
+          <a:off x="0" y="0"/>
+          <a:ext cx="0" cy="0"/>
+          <a:chOff x="0" y="0"/>
+          <a:chExt cx="0" cy="0"/>
+        </a:xfrm>
+      </p:grpSpPr>
+      <p:sp>
+        <p:nvSpPr>
+          <p:cNvPr id="2" name="Title 1">
+            <a:extLst>
+              <a:ext uri="{FF2B5EF4-FFF2-40B4-BE49-F238E27FC236}">
+                <a16:creationId xmlns:a16="http://schemas.microsoft.com/office/drawing/2014/main" id="{845684A1-E66F-6898-EE26-CB8481E80971}"/>
+              </a:ext>
+            </a:extLst>
+          </p:cNvPr>
+          <p:cNvSpPr>
+            <a:spLocks noGrp="1"/>
+          </p:cNvSpPr>
+          <p:nvPr>
+            <p:ph type="title"/>
+          </p:nvPr>
+        </p:nvSpPr>
+        <p:spPr>
+          <a:xfrm>
+            <a:off x="838200" y="365126"/>
+            <a:ext cx="10515600" cy="718608"/>
+          </a:xfrm>
+        </p:spPr>
+        <p:txBody>
+          <a:bodyPr>
+            <a:normAutofit/>
+          </a:bodyPr>
+          <a:lstStyle/>
+          <a:p>
+            <a:r>
+              <a:rPr lang="nl-NL" sz="3600" noProof="0" dirty="0"/>
+              <a:t>Conflicten oplossen</a:t>
+            </a:r>
+          </a:p>
+        </p:txBody>
+      </p:sp>
+      <p:sp>
+        <p:nvSpPr>
+          <p:cNvPr id="9" name="Content Placeholder 2">
+            <a:extLst>
+              <a:ext uri="{FF2B5EF4-FFF2-40B4-BE49-F238E27FC236}">
+                <a16:creationId xmlns:a16="http://schemas.microsoft.com/office/drawing/2014/main" id="{1C46C58D-5CB0-C7C2-76FB-3B956F088C81}"/>
+              </a:ext>
+            </a:extLst>
+          </p:cNvPr>
+          <p:cNvSpPr>
+            <a:spLocks noGrp="1"/>
+          </p:cNvSpPr>
+          <p:nvPr>
+            <p:ph idx="1"/>
+          </p:nvPr>
+        </p:nvSpPr>
+        <p:spPr>
+          <a:xfrm>
+            <a:off x="838200" y="1456267"/>
+            <a:ext cx="5520398" cy="4720696"/>
+          </a:xfrm>
+        </p:spPr>
+        <p:txBody>
+          <a:bodyPr>
+            <a:normAutofit/>
+          </a:bodyPr>
+          <a:lstStyle/>
+          <a:p>
+            <a:pPr marL="0" indent="0">
+              <a:buNone/>
+            </a:pPr>
+            <a:r>
+              <a:rPr lang="nl-NL" sz="1800" b="1" dirty="0">
+                <a:cs typeface="Courier New" panose="02070309020205020404" pitchFamily="49" charset="0"/>
+              </a:rPr>
+              <a:t>Bij gewijzigde bestanden:</a:t>
+            </a:r>
+          </a:p>
+          <a:p>
+            <a:pPr>
+              <a:buFontTx/>
+              <a:buChar char="-"/>
+            </a:pPr>
+            <a:r>
+              <a:rPr lang="nl-NL" sz="1800" dirty="0">
+                <a:cs typeface="Courier New" panose="02070309020205020404" pitchFamily="49" charset="0"/>
+              </a:rPr>
+              <a:t>Open bestanden waarin conflicten zijn opgetreden.</a:t>
+            </a:r>
+          </a:p>
+          <a:p>
+            <a:pPr>
+              <a:buFontTx/>
+              <a:buChar char="-"/>
+            </a:pPr>
+            <a:r>
+              <a:rPr lang="nl-NL" sz="1800" dirty="0">
+                <a:cs typeface="Courier New" panose="02070309020205020404" pitchFamily="49" charset="0"/>
+              </a:rPr>
+              <a:t>Kies per conflict welke wijzigingen je wilt houden.</a:t>
+            </a:r>
+          </a:p>
+          <a:p>
+            <a:pPr>
+              <a:buFontTx/>
+              <a:buChar char="-"/>
+            </a:pPr>
+            <a:r>
+              <a:rPr lang="nl-NL" sz="1800" dirty="0" err="1">
+                <a:cs typeface="Courier New" panose="02070309020205020404" pitchFamily="49" charset="0"/>
+              </a:rPr>
+              <a:t>Commit</a:t>
+            </a:r>
+            <a:r>
+              <a:rPr lang="nl-NL" sz="1800" dirty="0">
+                <a:cs typeface="Courier New" panose="02070309020205020404" pitchFamily="49" charset="0"/>
+              </a:rPr>
+              <a:t> de wijzigingen.</a:t>
+            </a:r>
+          </a:p>
+        </p:txBody>
+      </p:sp>
+      <p:sp>
+        <p:nvSpPr>
+          <p:cNvPr id="6" name="Rectangle 5">
+            <a:extLst>
+              <a:ext uri="{FF2B5EF4-FFF2-40B4-BE49-F238E27FC236}">
+                <a16:creationId xmlns:a16="http://schemas.microsoft.com/office/drawing/2014/main" id="{7618F556-B906-F20A-4FB4-377F5FD70207}"/>
+              </a:ext>
+            </a:extLst>
+          </p:cNvPr>
+          <p:cNvSpPr/>
+          <p:nvPr/>
+        </p:nvSpPr>
+        <p:spPr>
+          <a:xfrm>
+            <a:off x="8220985" y="1456267"/>
+            <a:ext cx="3132815" cy="2173458"/>
+          </a:xfrm>
+          <a:prstGeom prst="rect">
+            <a:avLst/>
+          </a:prstGeom>
+          <a:solidFill>
+            <a:schemeClr val="bg1">
+              <a:lumMod val="85000"/>
+            </a:schemeClr>
+          </a:solidFill>
+        </p:spPr>
+        <p:style>
+          <a:lnRef idx="1">
+            <a:schemeClr val="accent3"/>
+          </a:lnRef>
+          <a:fillRef idx="2">
+            <a:schemeClr val="accent3"/>
+          </a:fillRef>
+          <a:effectRef idx="1">
+            <a:schemeClr val="accent3"/>
+          </a:effectRef>
+          <a:fontRef idx="minor">
+            <a:schemeClr val="dk1"/>
+          </a:fontRef>
+        </p:style>
+        <p:txBody>
+          <a:bodyPr lIns="288000" tIns="72000" rIns="288000" bIns="72000" rtlCol="0" anchor="ctr"/>
+          <a:lstStyle/>
+          <a:p>
+            <a:r>
+              <a:rPr lang="en-US" sz="1600" dirty="0">
+                <a:solidFill>
+                  <a:schemeClr val="tx1"/>
+                </a:solidFill>
+                <a:latin typeface="Courier New" panose="02070309020205020404" pitchFamily="49" charset="0"/>
+                <a:cs typeface="Courier New" panose="02070309020205020404" pitchFamily="49" charset="0"/>
+              </a:rPr>
+              <a:t>&lt;&lt;&lt;&lt;&lt;&lt;&lt; HEAD</a:t>
+            </a:r>
+          </a:p>
+          <a:p>
+            <a:r>
+              <a:rPr lang="en-US" sz="1600" dirty="0">
+                <a:solidFill>
+                  <a:schemeClr val="tx1"/>
+                </a:solidFill>
+                <a:latin typeface="Courier New" panose="02070309020205020404" pitchFamily="49" charset="0"/>
+                <a:cs typeface="Courier New" panose="02070309020205020404" pitchFamily="49" charset="0"/>
+              </a:rPr>
+              <a:t>Commit 1 on main</a:t>
+            </a:r>
+          </a:p>
+          <a:p>
+            <a:r>
+              <a:rPr lang="en-US" sz="1600" dirty="0">
+                <a:solidFill>
+                  <a:schemeClr val="tx1"/>
+                </a:solidFill>
+                <a:latin typeface="Courier New" panose="02070309020205020404" pitchFamily="49" charset="0"/>
+                <a:cs typeface="Courier New" panose="02070309020205020404" pitchFamily="49" charset="0"/>
+              </a:rPr>
+              <a:t>Commit 2 on main</a:t>
+            </a:r>
+          </a:p>
+          <a:p>
+            <a:r>
+              <a:rPr lang="en-US" sz="1600" dirty="0">
+                <a:solidFill>
+                  <a:schemeClr val="tx1"/>
+                </a:solidFill>
+                <a:latin typeface="Courier New" panose="02070309020205020404" pitchFamily="49" charset="0"/>
+                <a:cs typeface="Courier New" panose="02070309020205020404" pitchFamily="49" charset="0"/>
+              </a:rPr>
+              <a:t>=======</a:t>
+            </a:r>
+          </a:p>
+          <a:p>
+            <a:r>
+              <a:rPr lang="en-US" sz="1600" dirty="0">
+                <a:solidFill>
+                  <a:schemeClr val="tx1"/>
+                </a:solidFill>
+                <a:latin typeface="Courier New" panose="02070309020205020404" pitchFamily="49" charset="0"/>
+                <a:cs typeface="Courier New" panose="02070309020205020404" pitchFamily="49" charset="0"/>
+              </a:rPr>
+              <a:t>This is from develop</a:t>
+            </a:r>
+          </a:p>
+          <a:p>
+            <a:r>
+              <a:rPr lang="en-US" sz="1600" dirty="0">
+                <a:solidFill>
+                  <a:schemeClr val="tx1"/>
+                </a:solidFill>
+                <a:latin typeface="Courier New" panose="02070309020205020404" pitchFamily="49" charset="0"/>
+                <a:cs typeface="Courier New" panose="02070309020205020404" pitchFamily="49" charset="0"/>
+              </a:rPr>
+              <a:t>&gt;&gt;&gt;&gt;&gt;&gt;&gt; develop</a:t>
+            </a:r>
+            <a:endParaRPr lang="nl-NL" sz="1600" dirty="0">
+              <a:solidFill>
+                <a:schemeClr val="tx1"/>
+              </a:solidFill>
+              <a:latin typeface="Courier New" panose="02070309020205020404" pitchFamily="49" charset="0"/>
+              <a:cs typeface="Courier New" panose="02070309020205020404" pitchFamily="49" charset="0"/>
+            </a:endParaRPr>
+          </a:p>
+        </p:txBody>
+      </p:sp>
+      <p:pic>
+        <p:nvPicPr>
+          <p:cNvPr id="10" name="Picture 9" descr="A screenshot of a computer&#10;&#10;Description automatically generated">
+            <a:extLst>
+              <a:ext uri="{FF2B5EF4-FFF2-40B4-BE49-F238E27FC236}">
+                <a16:creationId xmlns:a16="http://schemas.microsoft.com/office/drawing/2014/main" id="{5712057E-EAB4-43CE-A8A5-1735CDEF5906}"/>
+              </a:ext>
+            </a:extLst>
+          </p:cNvPr>
+          <p:cNvPicPr>
+            <a:picLocks noChangeAspect="1"/>
+          </p:cNvPicPr>
+          <p:nvPr/>
+        </p:nvPicPr>
+        <p:blipFill>
+          <a:blip r:embed="rId3">
+            <a:extLst>
+              <a:ext uri="{28A0092B-C50C-407E-A947-70E740481C1C}">
+                <a14:useLocalDpi xmlns:a14="http://schemas.microsoft.com/office/drawing/2010/main" val="0"/>
+              </a:ext>
+            </a:extLst>
+          </a:blip>
+          <a:srcRect l="-1" r="53945"/>
+          <a:stretch/>
+        </p:blipFill>
+        <p:spPr>
+          <a:xfrm>
+            <a:off x="8220983" y="4389738"/>
+            <a:ext cx="3132815" cy="1583500"/>
+          </a:xfrm>
+          <a:prstGeom prst="rect">
+            <a:avLst/>
+          </a:prstGeom>
+        </p:spPr>
+      </p:pic>
+    </p:spTree>
+    <p:extLst>
+      <p:ext uri="{BB962C8B-B14F-4D97-AF65-F5344CB8AC3E}">
+        <p14:creationId xmlns:p14="http://schemas.microsoft.com/office/powerpoint/2010/main" val="1250630321"/>
+      </p:ext>
+    </p:extLst>
+  </p:cSld>
+  <p:clrMapOvr>
+    <a:masterClrMapping/>
+  </p:clrMapOvr>
+</p:sld>
+</file>
+
+<file path=ppt/slides/slide57.xml><?xml version="1.0" encoding="utf-8"?>
+<p:sld xmlns:a="http://schemas.openxmlformats.org/drawingml/2006/main" xmlns:r="http://schemas.openxmlformats.org/officeDocument/2006/relationships" xmlns:p="http://schemas.openxmlformats.org/presentationml/2006/main">
+  <p:cSld>
+    <p:spTree>
+      <p:nvGrpSpPr>
+        <p:cNvPr id="1" name="">
+          <a:extLst>
+            <a:ext uri="{FF2B5EF4-FFF2-40B4-BE49-F238E27FC236}">
+              <a16:creationId xmlns:a16="http://schemas.microsoft.com/office/drawing/2014/main" id="{D3FA81EF-5338-1130-1E48-B3E226D08EEA}"/>
+            </a:ext>
+          </a:extLst>
+        </p:cNvPr>
+        <p:cNvGrpSpPr/>
+        <p:nvPr/>
+      </p:nvGrpSpPr>
+      <p:grpSpPr>
+        <a:xfrm>
+          <a:off x="0" y="0"/>
+          <a:ext cx="0" cy="0"/>
+          <a:chOff x="0" y="0"/>
+          <a:chExt cx="0" cy="0"/>
+        </a:xfrm>
+      </p:grpSpPr>
+      <p:sp>
+        <p:nvSpPr>
+          <p:cNvPr id="2" name="Title 1">
+            <a:extLst>
+              <a:ext uri="{FF2B5EF4-FFF2-40B4-BE49-F238E27FC236}">
+                <a16:creationId xmlns:a16="http://schemas.microsoft.com/office/drawing/2014/main" id="{DF7ED8F7-CBEA-6B14-5F13-6ED2AFB64C01}"/>
+              </a:ext>
+            </a:extLst>
+          </p:cNvPr>
+          <p:cNvSpPr>
+            <a:spLocks noGrp="1"/>
+          </p:cNvSpPr>
+          <p:nvPr>
+            <p:ph type="title"/>
+          </p:nvPr>
+        </p:nvSpPr>
+        <p:spPr>
+          <a:xfrm>
+            <a:off x="838200" y="365126"/>
+            <a:ext cx="10515600" cy="718608"/>
+          </a:xfrm>
+        </p:spPr>
+        <p:txBody>
+          <a:bodyPr>
+            <a:normAutofit/>
+          </a:bodyPr>
+          <a:lstStyle/>
+          <a:p>
+            <a:r>
+              <a:rPr lang="nl-NL" sz="3600" noProof="0" dirty="0"/>
+              <a:t>Conflicten oplossen</a:t>
+            </a:r>
+          </a:p>
+        </p:txBody>
+      </p:sp>
+      <p:sp>
+        <p:nvSpPr>
+          <p:cNvPr id="9" name="Content Placeholder 2">
+            <a:extLst>
+              <a:ext uri="{FF2B5EF4-FFF2-40B4-BE49-F238E27FC236}">
+                <a16:creationId xmlns:a16="http://schemas.microsoft.com/office/drawing/2014/main" id="{2F2B00B4-ACD8-E643-4097-5074D9F7DC1D}"/>
+              </a:ext>
+            </a:extLst>
+          </p:cNvPr>
+          <p:cNvSpPr>
+            <a:spLocks noGrp="1"/>
+          </p:cNvSpPr>
+          <p:nvPr>
+            <p:ph idx="1"/>
+          </p:nvPr>
+        </p:nvSpPr>
+        <p:spPr>
+          <a:xfrm>
+            <a:off x="838200" y="1456267"/>
+            <a:ext cx="5520398" cy="4720696"/>
+          </a:xfrm>
+        </p:spPr>
+        <p:txBody>
+          <a:bodyPr>
+            <a:normAutofit/>
+          </a:bodyPr>
+          <a:lstStyle/>
+          <a:p>
+            <a:pPr marL="0" indent="0">
+              <a:buNone/>
+            </a:pPr>
+            <a:r>
+              <a:rPr lang="nl-NL" sz="1800" b="1" dirty="0">
+                <a:cs typeface="Courier New" panose="02070309020205020404" pitchFamily="49" charset="0"/>
+              </a:rPr>
+              <a:t>Bij gewijzigde bestanden:</a:t>
+            </a:r>
+          </a:p>
+          <a:p>
+            <a:pPr>
+              <a:buFontTx/>
+              <a:buChar char="-"/>
+            </a:pPr>
+            <a:r>
+              <a:rPr lang="nl-NL" sz="1800" dirty="0">
+                <a:cs typeface="Courier New" panose="02070309020205020404" pitchFamily="49" charset="0"/>
+              </a:rPr>
+              <a:t>Open bestanden waarin conflicten zijn opgetreden.</a:t>
+            </a:r>
+          </a:p>
+          <a:p>
+            <a:pPr>
+              <a:buFontTx/>
+              <a:buChar char="-"/>
+            </a:pPr>
+            <a:r>
+              <a:rPr lang="nl-NL" sz="1800" dirty="0">
+                <a:cs typeface="Courier New" panose="02070309020205020404" pitchFamily="49" charset="0"/>
+              </a:rPr>
+              <a:t>Kies per conflict welke wijzigingen je wilt houden.</a:t>
+            </a:r>
+          </a:p>
+          <a:p>
+            <a:pPr>
+              <a:buFontTx/>
+              <a:buChar char="-"/>
+            </a:pPr>
+            <a:r>
+              <a:rPr lang="nl-NL" sz="1800" dirty="0" err="1">
+                <a:cs typeface="Courier New" panose="02070309020205020404" pitchFamily="49" charset="0"/>
+              </a:rPr>
+              <a:t>Commit</a:t>
+            </a:r>
+            <a:r>
+              <a:rPr lang="nl-NL" sz="1800" dirty="0">
+                <a:cs typeface="Courier New" panose="02070309020205020404" pitchFamily="49" charset="0"/>
+              </a:rPr>
+              <a:t> de wijzigingen.</a:t>
+            </a:r>
+          </a:p>
+          <a:p>
+            <a:pPr marL="0" indent="0">
+              <a:buNone/>
+            </a:pPr>
+            <a:endParaRPr lang="nl-NL" sz="1800" dirty="0">
+              <a:cs typeface="Courier New" panose="02070309020205020404" pitchFamily="49" charset="0"/>
+            </a:endParaRPr>
+          </a:p>
+          <a:p>
+            <a:pPr marL="0" indent="0">
+              <a:buNone/>
+            </a:pPr>
+            <a:endParaRPr lang="nl-NL" sz="1800" dirty="0">
+              <a:cs typeface="Courier New" panose="02070309020205020404" pitchFamily="49" charset="0"/>
+            </a:endParaRPr>
+          </a:p>
+          <a:p>
+            <a:pPr marL="0" indent="0">
+              <a:buNone/>
+            </a:pPr>
+            <a:r>
+              <a:rPr lang="nl-NL" sz="1800" b="1" dirty="0">
+                <a:cs typeface="Courier New" panose="02070309020205020404" pitchFamily="49" charset="0"/>
+              </a:rPr>
+              <a:t>Bij verwijderde bestanden:</a:t>
+            </a:r>
+          </a:p>
+          <a:p>
+            <a:pPr>
+              <a:buFontTx/>
+              <a:buChar char="-"/>
+            </a:pPr>
+            <a:r>
+              <a:rPr lang="nl-NL" sz="1800" dirty="0">
+                <a:cs typeface="Courier New" panose="02070309020205020404" pitchFamily="49" charset="0"/>
+              </a:rPr>
+              <a:t>Om het bestand te herstellen, gebruik:</a:t>
+            </a:r>
+          </a:p>
+          <a:p>
+            <a:pPr marL="0" indent="0">
+              <a:buNone/>
+            </a:pPr>
+            <a:r>
+              <a:rPr lang="nl-NL" sz="1800" dirty="0">
+                <a:latin typeface="Courier New" panose="02070309020205020404" pitchFamily="49" charset="0"/>
+                <a:cs typeface="Courier New" panose="02070309020205020404" pitchFamily="49" charset="0"/>
+              </a:rPr>
+              <a:t>  git </a:t>
+            </a:r>
+            <a:r>
+              <a:rPr lang="nl-NL" sz="1800" dirty="0" err="1">
+                <a:latin typeface="Courier New" panose="02070309020205020404" pitchFamily="49" charset="0"/>
+                <a:cs typeface="Courier New" panose="02070309020205020404" pitchFamily="49" charset="0"/>
+              </a:rPr>
+              <a:t>add</a:t>
+            </a:r>
+            <a:r>
+              <a:rPr lang="nl-NL" sz="1800" dirty="0">
+                <a:latin typeface="Courier New" panose="02070309020205020404" pitchFamily="49" charset="0"/>
+                <a:cs typeface="Courier New" panose="02070309020205020404" pitchFamily="49" charset="0"/>
+              </a:rPr>
+              <a:t> &lt;bestand&gt;</a:t>
+            </a:r>
+            <a:endParaRPr lang="nl-NL" sz="1800" dirty="0">
+              <a:cs typeface="Courier New" panose="02070309020205020404" pitchFamily="49" charset="0"/>
+            </a:endParaRPr>
+          </a:p>
+          <a:p>
+            <a:pPr>
+              <a:buFontTx/>
+              <a:buChar char="-"/>
+            </a:pPr>
+            <a:r>
+              <a:rPr lang="nl-NL" sz="1800" dirty="0">
+                <a:cs typeface="Courier New" panose="02070309020205020404" pitchFamily="49" charset="0"/>
+              </a:rPr>
+              <a:t>Doe niets als je het bestand wilt verwijderen.</a:t>
+            </a:r>
+          </a:p>
+          <a:p>
+            <a:pPr>
+              <a:buFontTx/>
+              <a:buChar char="-"/>
+            </a:pPr>
+            <a:r>
+              <a:rPr lang="nl-NL" sz="1800" dirty="0" err="1">
+                <a:cs typeface="Courier New" panose="02070309020205020404" pitchFamily="49" charset="0"/>
+              </a:rPr>
+              <a:t>Commit</a:t>
+            </a:r>
+            <a:r>
+              <a:rPr lang="nl-NL" sz="1800" dirty="0">
+                <a:cs typeface="Courier New" panose="02070309020205020404" pitchFamily="49" charset="0"/>
+              </a:rPr>
+              <a:t>.</a:t>
+            </a:r>
+          </a:p>
+          <a:p>
+            <a:pPr>
+              <a:buFontTx/>
+              <a:buChar char="-"/>
+            </a:pPr>
+            <a:endParaRPr lang="nl-NL" sz="1800" dirty="0">
+              <a:cs typeface="Courier New" panose="02070309020205020404" pitchFamily="49" charset="0"/>
+            </a:endParaRPr>
+          </a:p>
+        </p:txBody>
+      </p:sp>
+      <p:sp>
+        <p:nvSpPr>
+          <p:cNvPr id="10" name="Rectangle 9">
+            <a:extLst>
+              <a:ext uri="{FF2B5EF4-FFF2-40B4-BE49-F238E27FC236}">
+                <a16:creationId xmlns:a16="http://schemas.microsoft.com/office/drawing/2014/main" id="{E19F6B7C-0B16-A930-2F6D-60B6EED38F25}"/>
+              </a:ext>
+            </a:extLst>
+          </p:cNvPr>
+          <p:cNvSpPr/>
+          <p:nvPr/>
+        </p:nvSpPr>
+        <p:spPr>
+          <a:xfrm>
+            <a:off x="8220985" y="1456267"/>
+            <a:ext cx="3132815" cy="2173458"/>
+          </a:xfrm>
+          <a:prstGeom prst="rect">
+            <a:avLst/>
+          </a:prstGeom>
+          <a:solidFill>
+            <a:schemeClr val="bg1">
+              <a:lumMod val="85000"/>
+            </a:schemeClr>
+          </a:solidFill>
+        </p:spPr>
+        <p:style>
+          <a:lnRef idx="1">
+            <a:schemeClr val="accent3"/>
+          </a:lnRef>
+          <a:fillRef idx="2">
+            <a:schemeClr val="accent3"/>
+          </a:fillRef>
+          <a:effectRef idx="1">
+            <a:schemeClr val="accent3"/>
+          </a:effectRef>
+          <a:fontRef idx="minor">
+            <a:schemeClr val="dk1"/>
+          </a:fontRef>
+        </p:style>
+        <p:txBody>
+          <a:bodyPr lIns="288000" tIns="72000" rIns="288000" bIns="72000" rtlCol="0" anchor="ctr"/>
+          <a:lstStyle/>
+          <a:p>
+            <a:r>
+              <a:rPr lang="en-US" sz="1600" dirty="0">
+                <a:solidFill>
+                  <a:schemeClr val="tx1"/>
+                </a:solidFill>
+                <a:latin typeface="Courier New" panose="02070309020205020404" pitchFamily="49" charset="0"/>
+                <a:cs typeface="Courier New" panose="02070309020205020404" pitchFamily="49" charset="0"/>
+              </a:rPr>
+              <a:t>&lt;&lt;&lt;&lt;&lt;&lt;&lt; HEAD</a:t>
+            </a:r>
+          </a:p>
+          <a:p>
+            <a:r>
+              <a:rPr lang="en-US" sz="1600" dirty="0">
+                <a:solidFill>
+                  <a:schemeClr val="tx1"/>
+                </a:solidFill>
+                <a:latin typeface="Courier New" panose="02070309020205020404" pitchFamily="49" charset="0"/>
+                <a:cs typeface="Courier New" panose="02070309020205020404" pitchFamily="49" charset="0"/>
+              </a:rPr>
+              <a:t>Commit 1 on main</a:t>
+            </a:r>
+          </a:p>
+          <a:p>
+            <a:r>
+              <a:rPr lang="en-US" sz="1600" dirty="0">
+                <a:solidFill>
+                  <a:schemeClr val="tx1"/>
+                </a:solidFill>
+                <a:latin typeface="Courier New" panose="02070309020205020404" pitchFamily="49" charset="0"/>
+                <a:cs typeface="Courier New" panose="02070309020205020404" pitchFamily="49" charset="0"/>
+              </a:rPr>
+              <a:t>Commit 2 on main</a:t>
+            </a:r>
+          </a:p>
+          <a:p>
+            <a:r>
+              <a:rPr lang="en-US" sz="1600" dirty="0">
+                <a:solidFill>
+                  <a:schemeClr val="tx1"/>
+                </a:solidFill>
+                <a:latin typeface="Courier New" panose="02070309020205020404" pitchFamily="49" charset="0"/>
+                <a:cs typeface="Courier New" panose="02070309020205020404" pitchFamily="49" charset="0"/>
+              </a:rPr>
+              <a:t>=======</a:t>
+            </a:r>
+          </a:p>
+          <a:p>
+            <a:r>
+              <a:rPr lang="en-US" sz="1600" dirty="0">
+                <a:solidFill>
+                  <a:schemeClr val="tx1"/>
+                </a:solidFill>
+                <a:latin typeface="Courier New" panose="02070309020205020404" pitchFamily="49" charset="0"/>
+                <a:cs typeface="Courier New" panose="02070309020205020404" pitchFamily="49" charset="0"/>
+              </a:rPr>
+              <a:t>This is from develop</a:t>
+            </a:r>
+          </a:p>
+          <a:p>
+            <a:r>
+              <a:rPr lang="en-US" sz="1600" dirty="0">
+                <a:solidFill>
+                  <a:schemeClr val="tx1"/>
+                </a:solidFill>
+                <a:latin typeface="Courier New" panose="02070309020205020404" pitchFamily="49" charset="0"/>
+                <a:cs typeface="Courier New" panose="02070309020205020404" pitchFamily="49" charset="0"/>
+              </a:rPr>
+              <a:t>&gt;&gt;&gt;&gt;&gt;&gt;&gt; develop</a:t>
+            </a:r>
+            <a:endParaRPr lang="nl-NL" sz="1600" dirty="0">
+              <a:solidFill>
+                <a:schemeClr val="tx1"/>
+              </a:solidFill>
+              <a:latin typeface="Courier New" panose="02070309020205020404" pitchFamily="49" charset="0"/>
+              <a:cs typeface="Courier New" panose="02070309020205020404" pitchFamily="49" charset="0"/>
+            </a:endParaRPr>
+          </a:p>
+        </p:txBody>
+      </p:sp>
+      <p:pic>
+        <p:nvPicPr>
+          <p:cNvPr id="11" name="Picture 10" descr="A screenshot of a computer&#10;&#10;Description automatically generated">
+            <a:extLst>
+              <a:ext uri="{FF2B5EF4-FFF2-40B4-BE49-F238E27FC236}">
+                <a16:creationId xmlns:a16="http://schemas.microsoft.com/office/drawing/2014/main" id="{06A6C6FC-A4C5-AB39-FD32-BE383E865127}"/>
+              </a:ext>
+            </a:extLst>
+          </p:cNvPr>
+          <p:cNvPicPr>
+            <a:picLocks noChangeAspect="1"/>
+          </p:cNvPicPr>
+          <p:nvPr/>
+        </p:nvPicPr>
+        <p:blipFill>
+          <a:blip r:embed="rId3">
+            <a:extLst>
+              <a:ext uri="{28A0092B-C50C-407E-A947-70E740481C1C}">
+                <a14:useLocalDpi xmlns:a14="http://schemas.microsoft.com/office/drawing/2010/main" val="0"/>
+              </a:ext>
+            </a:extLst>
+          </a:blip>
+          <a:srcRect l="-1" r="53945"/>
+          <a:stretch/>
+        </p:blipFill>
+        <p:spPr>
+          <a:xfrm>
+            <a:off x="8220983" y="4389738"/>
+            <a:ext cx="3132815" cy="1583500"/>
+          </a:xfrm>
+          <a:prstGeom prst="rect">
+            <a:avLst/>
+          </a:prstGeom>
+        </p:spPr>
+      </p:pic>
+    </p:spTree>
+    <p:extLst>
+      <p:ext uri="{BB962C8B-B14F-4D97-AF65-F5344CB8AC3E}">
+        <p14:creationId xmlns:p14="http://schemas.microsoft.com/office/powerpoint/2010/main" val="3302983853"/>
+      </p:ext>
+    </p:extLst>
+  </p:cSld>
+  <p:clrMapOvr>
+    <a:masterClrMapping/>
+  </p:clrMapOvr>
+</p:sld>
+</file>
+
+<file path=ppt/slides/slide58.xml><?xml version="1.0" encoding="utf-8"?>
+<p:sld xmlns:a="http://schemas.openxmlformats.org/drawingml/2006/main" xmlns:r="http://schemas.openxmlformats.org/officeDocument/2006/relationships" xmlns:p="http://schemas.openxmlformats.org/presentationml/2006/main">
+  <p:cSld>
+    <p:spTree>
+      <p:nvGrpSpPr>
+        <p:cNvPr id="1" name="">
+          <a:extLst>
+            <a:ext uri="{FF2B5EF4-FFF2-40B4-BE49-F238E27FC236}">
+              <a16:creationId xmlns:a16="http://schemas.microsoft.com/office/drawing/2014/main" id="{91D709D0-B0C3-0E48-EE00-90F14C3930BD}"/>
+            </a:ext>
+          </a:extLst>
+        </p:cNvPr>
+        <p:cNvGrpSpPr/>
+        <p:nvPr/>
+      </p:nvGrpSpPr>
+      <p:grpSpPr>
+        <a:xfrm>
+          <a:off x="0" y="0"/>
+          <a:ext cx="0" cy="0"/>
+          <a:chOff x="0" y="0"/>
+          <a:chExt cx="0" cy="0"/>
+        </a:xfrm>
+      </p:grpSpPr>
+      <p:sp>
+        <p:nvSpPr>
+          <p:cNvPr id="2" name="Title 1">
+            <a:extLst>
+              <a:ext uri="{FF2B5EF4-FFF2-40B4-BE49-F238E27FC236}">
+                <a16:creationId xmlns:a16="http://schemas.microsoft.com/office/drawing/2014/main" id="{73EF0333-0297-528F-F9D8-CF9F9AA51545}"/>
+              </a:ext>
+            </a:extLst>
+          </p:cNvPr>
+          <p:cNvSpPr>
+            <a:spLocks noGrp="1"/>
+          </p:cNvSpPr>
+          <p:nvPr>
+            <p:ph type="title"/>
+          </p:nvPr>
+        </p:nvSpPr>
+        <p:spPr>
+          <a:xfrm>
+            <a:off x="838200" y="365126"/>
+            <a:ext cx="10515600" cy="718608"/>
+          </a:xfrm>
+        </p:spPr>
+        <p:txBody>
+          <a:bodyPr>
+            <a:normAutofit/>
+          </a:bodyPr>
+          <a:lstStyle/>
+          <a:p>
+            <a:r>
+              <a:rPr lang="nl-NL" sz="3600" noProof="0" dirty="0"/>
+              <a:t>Conflicten oplossen</a:t>
+            </a:r>
+          </a:p>
+        </p:txBody>
+      </p:sp>
+      <p:sp>
+        <p:nvSpPr>
+          <p:cNvPr id="9" name="Content Placeholder 2">
+            <a:extLst>
+              <a:ext uri="{FF2B5EF4-FFF2-40B4-BE49-F238E27FC236}">
+                <a16:creationId xmlns:a16="http://schemas.microsoft.com/office/drawing/2014/main" id="{F8010C94-9F05-DA33-6E70-6474E7009A00}"/>
+              </a:ext>
+            </a:extLst>
+          </p:cNvPr>
+          <p:cNvSpPr>
+            <a:spLocks noGrp="1"/>
+          </p:cNvSpPr>
+          <p:nvPr>
+            <p:ph idx="1"/>
+          </p:nvPr>
+        </p:nvSpPr>
+        <p:spPr>
+          <a:xfrm>
+            <a:off x="838200" y="1456267"/>
+            <a:ext cx="5520398" cy="4720696"/>
+          </a:xfrm>
+        </p:spPr>
+        <p:txBody>
+          <a:bodyPr>
+            <a:normAutofit/>
+          </a:bodyPr>
+          <a:lstStyle/>
+          <a:p>
+            <a:pPr marL="0" indent="0">
+              <a:buNone/>
+            </a:pPr>
+            <a:r>
+              <a:rPr lang="nl-NL" sz="1800" dirty="0">
+                <a:cs typeface="Courier New" panose="02070309020205020404" pitchFamily="49" charset="0"/>
+              </a:rPr>
+              <a:t>Let op:</a:t>
+            </a:r>
+          </a:p>
+          <a:p>
+            <a:pPr marL="0" indent="0">
+              <a:buNone/>
+            </a:pPr>
+            <a:endParaRPr lang="nl-NL" sz="1800" dirty="0">
+              <a:cs typeface="Courier New" panose="02070309020205020404" pitchFamily="49" charset="0"/>
+            </a:endParaRPr>
+          </a:p>
+          <a:p>
+            <a:pPr>
+              <a:buFontTx/>
+              <a:buChar char="-"/>
+            </a:pPr>
+            <a:r>
+              <a:rPr lang="nl-NL" sz="1800" dirty="0">
+                <a:cs typeface="Courier New" panose="02070309020205020404" pitchFamily="49" charset="0"/>
+              </a:rPr>
+              <a:t>git checkt alleen of wijzigingen compatible zijn.</a:t>
+            </a:r>
+          </a:p>
+          <a:p>
+            <a:pPr>
+              <a:buFontTx/>
+              <a:buChar char="-"/>
+            </a:pPr>
+            <a:endParaRPr lang="nl-NL" sz="1800" dirty="0">
+              <a:cs typeface="Courier New" panose="02070309020205020404" pitchFamily="49" charset="0"/>
+            </a:endParaRPr>
+          </a:p>
+          <a:p>
+            <a:pPr>
+              <a:buFontTx/>
+              <a:buChar char="-"/>
+            </a:pPr>
+            <a:r>
+              <a:rPr lang="nl-NL" sz="1800" dirty="0">
+                <a:cs typeface="Courier New" panose="02070309020205020404" pitchFamily="49" charset="0"/>
+              </a:rPr>
+              <a:t>Dit betekent </a:t>
+            </a:r>
+            <a:r>
+              <a:rPr lang="nl-NL" sz="1800" u="sng" dirty="0">
+                <a:cs typeface="Courier New" panose="02070309020205020404" pitchFamily="49" charset="0"/>
+              </a:rPr>
+              <a:t>niet</a:t>
+            </a:r>
+            <a:r>
+              <a:rPr lang="nl-NL" sz="1800" dirty="0">
+                <a:cs typeface="Courier New" panose="02070309020205020404" pitchFamily="49" charset="0"/>
+              </a:rPr>
+              <a:t> dat je code goed integreert en werkt!</a:t>
+            </a:r>
+          </a:p>
+          <a:p>
+            <a:pPr>
+              <a:buFontTx/>
+              <a:buChar char="-"/>
+            </a:pPr>
+            <a:endParaRPr lang="nl-NL" sz="1800" dirty="0">
+              <a:cs typeface="Courier New" panose="02070309020205020404" pitchFamily="49" charset="0"/>
+            </a:endParaRPr>
+          </a:p>
+          <a:p>
+            <a:pPr>
+              <a:buFontTx/>
+              <a:buChar char="-"/>
+            </a:pPr>
+            <a:r>
+              <a:rPr lang="nl-NL" sz="1800" dirty="0">
+                <a:cs typeface="Courier New" panose="02070309020205020404" pitchFamily="49" charset="0"/>
+              </a:rPr>
+              <a:t>Gebruik hiervoor een </a:t>
+            </a:r>
+            <a:r>
+              <a:rPr lang="nl-NL" sz="1800" dirty="0" err="1">
+                <a:cs typeface="Courier New" panose="02070309020205020404" pitchFamily="49" charset="0"/>
+              </a:rPr>
+              <a:t>linter</a:t>
+            </a:r>
+            <a:r>
+              <a:rPr lang="nl-NL" sz="1800" dirty="0">
+                <a:cs typeface="Courier New" panose="02070309020205020404" pitchFamily="49" charset="0"/>
+              </a:rPr>
+              <a:t> en unit tests.</a:t>
+            </a:r>
+          </a:p>
+        </p:txBody>
+      </p:sp>
+      <p:sp>
+        <p:nvSpPr>
+          <p:cNvPr id="10" name="Rectangle 9">
+            <a:extLst>
+              <a:ext uri="{FF2B5EF4-FFF2-40B4-BE49-F238E27FC236}">
+                <a16:creationId xmlns:a16="http://schemas.microsoft.com/office/drawing/2014/main" id="{F511765E-C9DF-1CB3-D0CA-E414FE1F25B9}"/>
+              </a:ext>
+            </a:extLst>
+          </p:cNvPr>
+          <p:cNvSpPr/>
+          <p:nvPr/>
+        </p:nvSpPr>
+        <p:spPr>
+          <a:xfrm>
+            <a:off x="7195624" y="1456267"/>
+            <a:ext cx="4234375" cy="1972734"/>
+          </a:xfrm>
+          <a:prstGeom prst="rect">
+            <a:avLst/>
+          </a:prstGeom>
+          <a:solidFill>
+            <a:schemeClr val="bg1">
+              <a:lumMod val="85000"/>
+            </a:schemeClr>
+          </a:solidFill>
+        </p:spPr>
+        <p:style>
+          <a:lnRef idx="1">
+            <a:schemeClr val="accent3"/>
+          </a:lnRef>
+          <a:fillRef idx="2">
+            <a:schemeClr val="accent3"/>
+          </a:fillRef>
+          <a:effectRef idx="1">
+            <a:schemeClr val="accent3"/>
+          </a:effectRef>
+          <a:fontRef idx="minor">
+            <a:schemeClr val="dk1"/>
+          </a:fontRef>
+        </p:style>
+        <p:txBody>
+          <a:bodyPr lIns="288000" tIns="72000" rIns="288000" bIns="72000" rtlCol="0" anchor="ctr"/>
+          <a:lstStyle/>
+          <a:p>
+            <a:r>
+              <a:rPr lang="en-US" sz="1400" dirty="0">
+                <a:solidFill>
+                  <a:schemeClr val="tx1"/>
+                </a:solidFill>
+                <a:latin typeface="Courier New" panose="02070309020205020404" pitchFamily="49" charset="0"/>
+                <a:cs typeface="Courier New" panose="02070309020205020404" pitchFamily="49" charset="0"/>
+              </a:rPr>
+              <a:t>&lt;&lt;&lt;&lt;&lt;&lt;&lt; HEAD</a:t>
+            </a:r>
+          </a:p>
+          <a:p>
+            <a:r>
+              <a:rPr lang="en-US" sz="1400" b="1" dirty="0">
+                <a:solidFill>
+                  <a:schemeClr val="tx1"/>
+                </a:solidFill>
+                <a:latin typeface="Courier New" panose="02070309020205020404" pitchFamily="49" charset="0"/>
+                <a:cs typeface="Courier New" panose="02070309020205020404" pitchFamily="49" charset="0"/>
+              </a:rPr>
+              <a:t>def mean(</a:t>
+            </a:r>
+            <a:r>
+              <a:rPr lang="en-US" sz="1400" dirty="0">
+                <a:solidFill>
+                  <a:schemeClr val="tx1"/>
+                </a:solidFill>
+                <a:latin typeface="Courier New" panose="02070309020205020404" pitchFamily="49" charset="0"/>
+                <a:cs typeface="Courier New" panose="02070309020205020404" pitchFamily="49" charset="0"/>
+              </a:rPr>
+              <a:t>values, </a:t>
+            </a:r>
+            <a:r>
+              <a:rPr lang="en-US" sz="1400" b="1" dirty="0" err="1">
+                <a:solidFill>
+                  <a:schemeClr val="tx1"/>
+                </a:solidFill>
+                <a:latin typeface="Courier New" panose="02070309020205020404" pitchFamily="49" charset="0"/>
+                <a:cs typeface="Courier New" panose="02070309020205020404" pitchFamily="49" charset="0"/>
+              </a:rPr>
+              <a:t>dropna</a:t>
+            </a:r>
+            <a:r>
+              <a:rPr lang="en-US" sz="1400" dirty="0">
+                <a:solidFill>
+                  <a:schemeClr val="tx1"/>
+                </a:solidFill>
+                <a:latin typeface="Courier New" panose="02070309020205020404" pitchFamily="49" charset="0"/>
+                <a:cs typeface="Courier New" panose="02070309020205020404" pitchFamily="49" charset="0"/>
+              </a:rPr>
+              <a:t>=False</a:t>
+            </a:r>
+            <a:r>
+              <a:rPr lang="en-US" sz="1400" b="1" dirty="0">
+                <a:solidFill>
+                  <a:schemeClr val="tx1"/>
+                </a:solidFill>
+                <a:latin typeface="Courier New" panose="02070309020205020404" pitchFamily="49" charset="0"/>
+                <a:cs typeface="Courier New" panose="02070309020205020404" pitchFamily="49" charset="0"/>
+              </a:rPr>
+              <a:t>)</a:t>
+            </a:r>
+            <a:r>
+              <a:rPr lang="en-US" sz="1400" dirty="0">
+                <a:solidFill>
+                  <a:schemeClr val="tx1"/>
+                </a:solidFill>
+                <a:latin typeface="Courier New" panose="02070309020205020404" pitchFamily="49" charset="0"/>
+                <a:cs typeface="Courier New" panose="02070309020205020404" pitchFamily="49" charset="0"/>
+              </a:rPr>
+              <a:t>:</a:t>
+            </a:r>
+          </a:p>
+          <a:p>
+            <a:r>
+              <a:rPr lang="en-US" sz="1400" dirty="0">
+                <a:solidFill>
+                  <a:schemeClr val="tx1"/>
+                </a:solidFill>
+                <a:latin typeface="Courier New" panose="02070309020205020404" pitchFamily="49" charset="0"/>
+                <a:cs typeface="Courier New" panose="02070309020205020404" pitchFamily="49" charset="0"/>
+              </a:rPr>
+              <a:t>  ...</a:t>
+            </a:r>
+          </a:p>
+          <a:p>
+            <a:r>
+              <a:rPr lang="en-US" sz="1400" dirty="0">
+                <a:solidFill>
+                  <a:schemeClr val="tx1"/>
+                </a:solidFill>
+                <a:latin typeface="Courier New" panose="02070309020205020404" pitchFamily="49" charset="0"/>
+                <a:cs typeface="Courier New" panose="02070309020205020404" pitchFamily="49" charset="0"/>
+              </a:rPr>
+              <a:t>=======</a:t>
+            </a:r>
+          </a:p>
+          <a:p>
+            <a:r>
+              <a:rPr lang="en-US" sz="1400" b="1" dirty="0">
+                <a:solidFill>
+                  <a:schemeClr val="tx1"/>
+                </a:solidFill>
+                <a:latin typeface="Courier New" panose="02070309020205020404" pitchFamily="49" charset="0"/>
+                <a:cs typeface="Courier New" panose="02070309020205020404" pitchFamily="49" charset="0"/>
+              </a:rPr>
+              <a:t>def mean(</a:t>
+            </a:r>
+            <a:r>
+              <a:rPr lang="en-US" sz="1400" dirty="0">
+                <a:solidFill>
+                  <a:schemeClr val="tx1"/>
+                </a:solidFill>
+                <a:latin typeface="Courier New" panose="02070309020205020404" pitchFamily="49" charset="0"/>
+                <a:cs typeface="Courier New" panose="02070309020205020404" pitchFamily="49" charset="0"/>
+              </a:rPr>
+              <a:t>values</a:t>
+            </a:r>
+            <a:r>
+              <a:rPr lang="en-US" sz="1400" b="1" dirty="0">
+                <a:solidFill>
+                  <a:schemeClr val="tx1"/>
+                </a:solidFill>
+                <a:latin typeface="Courier New" panose="02070309020205020404" pitchFamily="49" charset="0"/>
+                <a:cs typeface="Courier New" panose="02070309020205020404" pitchFamily="49" charset="0"/>
+              </a:rPr>
+              <a:t>)</a:t>
+            </a:r>
+            <a:r>
+              <a:rPr lang="en-US" sz="1400" dirty="0">
+                <a:solidFill>
+                  <a:schemeClr val="tx1"/>
+                </a:solidFill>
+                <a:latin typeface="Courier New" panose="02070309020205020404" pitchFamily="49" charset="0"/>
+                <a:cs typeface="Courier New" panose="02070309020205020404" pitchFamily="49" charset="0"/>
+              </a:rPr>
+              <a:t>:</a:t>
+            </a:r>
+          </a:p>
+          <a:p>
+            <a:r>
+              <a:rPr lang="en-US" sz="1400" dirty="0">
+                <a:solidFill>
+                  <a:schemeClr val="tx1"/>
+                </a:solidFill>
+                <a:latin typeface="Courier New" panose="02070309020205020404" pitchFamily="49" charset="0"/>
+                <a:cs typeface="Courier New" panose="02070309020205020404" pitchFamily="49" charset="0"/>
+              </a:rPr>
+              <a:t>  ...</a:t>
+            </a:r>
+          </a:p>
+          <a:p>
+            <a:r>
+              <a:rPr lang="en-US" sz="1400" dirty="0">
+                <a:solidFill>
+                  <a:schemeClr val="tx1"/>
+                </a:solidFill>
+                <a:latin typeface="Courier New" panose="02070309020205020404" pitchFamily="49" charset="0"/>
+                <a:cs typeface="Courier New" panose="02070309020205020404" pitchFamily="49" charset="0"/>
+              </a:rPr>
+              <a:t>&gt;&gt;&gt;&gt;&gt;&gt;&gt; develop</a:t>
+            </a:r>
+            <a:endParaRPr lang="nl-NL" sz="1400" dirty="0">
+              <a:solidFill>
+                <a:schemeClr val="tx1"/>
+              </a:solidFill>
+              <a:latin typeface="Courier New" panose="02070309020205020404" pitchFamily="49" charset="0"/>
+              <a:cs typeface="Courier New" panose="02070309020205020404" pitchFamily="49" charset="0"/>
+            </a:endParaRPr>
+          </a:p>
+        </p:txBody>
+      </p:sp>
+      <p:sp>
+        <p:nvSpPr>
+          <p:cNvPr id="3" name="Rectangle 2">
+            <a:extLst>
+              <a:ext uri="{FF2B5EF4-FFF2-40B4-BE49-F238E27FC236}">
+                <a16:creationId xmlns:a16="http://schemas.microsoft.com/office/drawing/2014/main" id="{376BAFDF-C2C8-27D4-3F29-E8A0138196B1}"/>
+              </a:ext>
+            </a:extLst>
+          </p:cNvPr>
+          <p:cNvSpPr/>
+          <p:nvPr/>
+        </p:nvSpPr>
+        <p:spPr>
+          <a:xfrm>
+            <a:off x="7195624" y="4505253"/>
+            <a:ext cx="4234375" cy="1671710"/>
+          </a:xfrm>
+          <a:prstGeom prst="rect">
+            <a:avLst/>
+          </a:prstGeom>
+          <a:solidFill>
+            <a:schemeClr val="bg1">
+              <a:lumMod val="85000"/>
+            </a:schemeClr>
+          </a:solidFill>
+        </p:spPr>
+        <p:style>
+          <a:lnRef idx="1">
+            <a:schemeClr val="accent3"/>
+          </a:lnRef>
+          <a:fillRef idx="2">
+            <a:schemeClr val="accent3"/>
+          </a:fillRef>
+          <a:effectRef idx="1">
+            <a:schemeClr val="accent3"/>
+          </a:effectRef>
+          <a:fontRef idx="minor">
+            <a:schemeClr val="dk1"/>
+          </a:fontRef>
+        </p:style>
+        <p:txBody>
+          <a:bodyPr lIns="288000" tIns="72000" rIns="288000" bIns="72000" rtlCol="0" anchor="ctr"/>
+          <a:lstStyle/>
+          <a:p>
+            <a:r>
+              <a:rPr lang="en-US" sz="1400" dirty="0">
+                <a:solidFill>
+                  <a:schemeClr val="tx1"/>
+                </a:solidFill>
+                <a:latin typeface="Courier New" panose="02070309020205020404" pitchFamily="49" charset="0"/>
+                <a:cs typeface="Courier New" panose="02070309020205020404" pitchFamily="49" charset="0"/>
+              </a:rPr>
+              <a:t>def main():</a:t>
+            </a:r>
+          </a:p>
+          <a:p>
+            <a:r>
+              <a:rPr lang="en-US" sz="1400" dirty="0">
+                <a:solidFill>
+                  <a:schemeClr val="tx1"/>
+                </a:solidFill>
+                <a:latin typeface="Courier New" panose="02070309020205020404" pitchFamily="49" charset="0"/>
+                <a:cs typeface="Courier New" panose="02070309020205020404" pitchFamily="49" charset="0"/>
+              </a:rPr>
+              <a:t>  ...</a:t>
+            </a:r>
+          </a:p>
+          <a:p>
+            <a:r>
+              <a:rPr lang="en-US" sz="1400" dirty="0">
+                <a:solidFill>
+                  <a:schemeClr val="tx1"/>
+                </a:solidFill>
+                <a:latin typeface="Courier New" panose="02070309020205020404" pitchFamily="49" charset="0"/>
+                <a:cs typeface="Courier New" panose="02070309020205020404" pitchFamily="49" charset="0"/>
+              </a:rPr>
+              <a:t>  result = mean(ages, </a:t>
+            </a:r>
+            <a:r>
+              <a:rPr lang="en-US" sz="1400" dirty="0" err="1">
+                <a:solidFill>
+                  <a:srgbClr val="FF0000"/>
+                </a:solidFill>
+                <a:latin typeface="Courier New" panose="02070309020205020404" pitchFamily="49" charset="0"/>
+                <a:cs typeface="Courier New" panose="02070309020205020404" pitchFamily="49" charset="0"/>
+              </a:rPr>
+              <a:t>dropna</a:t>
+            </a:r>
+            <a:r>
+              <a:rPr lang="en-US" sz="1400" dirty="0">
+                <a:solidFill>
+                  <a:srgbClr val="FF0000"/>
+                </a:solidFill>
+                <a:latin typeface="Courier New" panose="02070309020205020404" pitchFamily="49" charset="0"/>
+                <a:cs typeface="Courier New" panose="02070309020205020404" pitchFamily="49" charset="0"/>
+              </a:rPr>
+              <a:t>=True</a:t>
+            </a:r>
+            <a:r>
+              <a:rPr lang="en-US" sz="1400" dirty="0">
+                <a:solidFill>
+                  <a:schemeClr val="tx1"/>
+                </a:solidFill>
+                <a:latin typeface="Courier New" panose="02070309020205020404" pitchFamily="49" charset="0"/>
+                <a:cs typeface="Courier New" panose="02070309020205020404" pitchFamily="49" charset="0"/>
+              </a:rPr>
+              <a:t>)</a:t>
+            </a:r>
+            <a:endParaRPr lang="nl-NL" sz="1400" dirty="0">
+              <a:solidFill>
+                <a:schemeClr val="tx1"/>
+              </a:solidFill>
+              <a:latin typeface="Courier New" panose="02070309020205020404" pitchFamily="49" charset="0"/>
+              <a:cs typeface="Courier New" panose="02070309020205020404" pitchFamily="49" charset="0"/>
+            </a:endParaRPr>
+          </a:p>
+        </p:txBody>
+      </p:sp>
+    </p:spTree>
+    <p:extLst>
+      <p:ext uri="{BB962C8B-B14F-4D97-AF65-F5344CB8AC3E}">
+        <p14:creationId xmlns:p14="http://schemas.microsoft.com/office/powerpoint/2010/main" val="720215369"/>
+      </p:ext>
+    </p:extLst>
+  </p:cSld>
+  <p:clrMapOvr>
+    <a:masterClrMapping/>
+  </p:clrMapOvr>
+</p:sld>
+</file>
+
+<file path=ppt/slides/slide59.xml><?xml version="1.0" encoding="utf-8"?>
+<p:sld xmlns:a="http://schemas.openxmlformats.org/drawingml/2006/main" xmlns:r="http://schemas.openxmlformats.org/officeDocument/2006/relationships" xmlns:p="http://schemas.openxmlformats.org/presentationml/2006/main">
+  <p:cSld>
+    <p:spTree>
+      <p:nvGrpSpPr>
+        <p:cNvPr id="1" name="">
+          <a:extLst>
+            <a:ext uri="{FF2B5EF4-FFF2-40B4-BE49-F238E27FC236}">
+              <a16:creationId xmlns:a16="http://schemas.microsoft.com/office/drawing/2014/main" id="{D128C513-936A-1EAB-7785-33C1B6BF5689}"/>
+            </a:ext>
+          </a:extLst>
+        </p:cNvPr>
+        <p:cNvGrpSpPr/>
+        <p:nvPr/>
+      </p:nvGrpSpPr>
+      <p:grpSpPr>
+        <a:xfrm>
+          <a:off x="0" y="0"/>
+          <a:ext cx="0" cy="0"/>
+          <a:chOff x="0" y="0"/>
+          <a:chExt cx="0" cy="0"/>
+        </a:xfrm>
+      </p:grpSpPr>
+      <p:sp>
+        <p:nvSpPr>
+          <p:cNvPr id="4" name="Title 3">
+            <a:extLst>
+              <a:ext uri="{FF2B5EF4-FFF2-40B4-BE49-F238E27FC236}">
+                <a16:creationId xmlns:a16="http://schemas.microsoft.com/office/drawing/2014/main" id="{E6D7E2C0-8474-54CA-8F63-21F447CF6B43}"/>
+              </a:ext>
+            </a:extLst>
+          </p:cNvPr>
+          <p:cNvSpPr>
+            <a:spLocks noGrp="1"/>
+          </p:cNvSpPr>
+          <p:nvPr>
+            <p:ph type="title"/>
+          </p:nvPr>
+        </p:nvSpPr>
+        <p:spPr/>
+        <p:txBody>
+          <a:bodyPr/>
+          <a:lstStyle/>
+          <a:p>
+            <a:r>
+              <a:rPr lang="nl-NL" noProof="0" dirty="0"/>
+              <a:t>Samenvatting</a:t>
+            </a:r>
+          </a:p>
+        </p:txBody>
+      </p:sp>
+      <p:sp>
+        <p:nvSpPr>
+          <p:cNvPr id="5" name="Text Placeholder 4">
+            <a:extLst>
+              <a:ext uri="{FF2B5EF4-FFF2-40B4-BE49-F238E27FC236}">
+                <a16:creationId xmlns:a16="http://schemas.microsoft.com/office/drawing/2014/main" id="{668BB568-9283-7220-4E18-6185FED86C3E}"/>
+              </a:ext>
+            </a:extLst>
+          </p:cNvPr>
+          <p:cNvSpPr>
+            <a:spLocks noGrp="1"/>
+          </p:cNvSpPr>
+          <p:nvPr>
+            <p:ph type="body" idx="1"/>
+          </p:nvPr>
+        </p:nvSpPr>
+        <p:spPr/>
+        <p:txBody>
+          <a:bodyPr/>
+          <a:lstStyle/>
+          <a:p>
+            <a:endParaRPr lang="en-NL"/>
+          </a:p>
+        </p:txBody>
+      </p:sp>
+    </p:spTree>
+    <p:extLst>
+      <p:ext uri="{BB962C8B-B14F-4D97-AF65-F5344CB8AC3E}">
+        <p14:creationId xmlns:p14="http://schemas.microsoft.com/office/powerpoint/2010/main" val="2647715182"/>
+      </p:ext>
+    </p:extLst>
+  </p:cSld>
+  <p:clrMapOvr>
+    <a:masterClrMapping/>
+  </p:clrMapOvr>
+</p:sld>
+</file>
+
 <file path=ppt/slides/slide6.xml><?xml version="1.0" encoding="utf-8"?>
 <p:sld xmlns:a="http://schemas.openxmlformats.org/drawingml/2006/main" xmlns:r="http://schemas.openxmlformats.org/officeDocument/2006/relationships" xmlns:p="http://schemas.openxmlformats.org/presentationml/2006/main">
   <p:cSld>
@@ -36995,6 +41104,348 @@
     <p:extLst>
       <p:ext uri="{BB962C8B-B14F-4D97-AF65-F5344CB8AC3E}">
         <p14:creationId xmlns:p14="http://schemas.microsoft.com/office/powerpoint/2010/main" val="1423388618"/>
+      </p:ext>
+    </p:extLst>
+  </p:cSld>
+  <p:clrMapOvr>
+    <a:masterClrMapping/>
+  </p:clrMapOvr>
+</p:sld>
+</file>
+
+<file path=ppt/slides/slide60.xml><?xml version="1.0" encoding="utf-8"?>
+<p:sld xmlns:a="http://schemas.openxmlformats.org/drawingml/2006/main" xmlns:r="http://schemas.openxmlformats.org/officeDocument/2006/relationships" xmlns:p="http://schemas.openxmlformats.org/presentationml/2006/main">
+  <p:cSld>
+    <p:spTree>
+      <p:nvGrpSpPr>
+        <p:cNvPr id="1" name="">
+          <a:extLst>
+            <a:ext uri="{FF2B5EF4-FFF2-40B4-BE49-F238E27FC236}">
+              <a16:creationId xmlns:a16="http://schemas.microsoft.com/office/drawing/2014/main" id="{D1FC3A8E-AF03-D3BD-C11D-DE29C79BA4D2}"/>
+            </a:ext>
+          </a:extLst>
+        </p:cNvPr>
+        <p:cNvGrpSpPr/>
+        <p:nvPr/>
+      </p:nvGrpSpPr>
+      <p:grpSpPr>
+        <a:xfrm>
+          <a:off x="0" y="0"/>
+          <a:ext cx="0" cy="0"/>
+          <a:chOff x="0" y="0"/>
+          <a:chExt cx="0" cy="0"/>
+        </a:xfrm>
+      </p:grpSpPr>
+      <p:sp>
+        <p:nvSpPr>
+          <p:cNvPr id="2" name="Title 1">
+            <a:extLst>
+              <a:ext uri="{FF2B5EF4-FFF2-40B4-BE49-F238E27FC236}">
+                <a16:creationId xmlns:a16="http://schemas.microsoft.com/office/drawing/2014/main" id="{15A16D41-5602-4F88-B5AF-67584E1AC4EE}"/>
+              </a:ext>
+            </a:extLst>
+          </p:cNvPr>
+          <p:cNvSpPr>
+            <a:spLocks noGrp="1"/>
+          </p:cNvSpPr>
+          <p:nvPr>
+            <p:ph type="title"/>
+          </p:nvPr>
+        </p:nvSpPr>
+        <p:spPr>
+          <a:xfrm>
+            <a:off x="838200" y="365126"/>
+            <a:ext cx="10515600" cy="718608"/>
+          </a:xfrm>
+        </p:spPr>
+        <p:txBody>
+          <a:bodyPr>
+            <a:normAutofit/>
+          </a:bodyPr>
+          <a:lstStyle/>
+          <a:p>
+            <a:r>
+              <a:rPr lang="nl-NL" sz="3600" noProof="0" dirty="0" err="1"/>
+              <a:t>Repo</a:t>
+            </a:r>
+            <a:r>
+              <a:rPr lang="nl-NL" sz="3600" noProof="0" dirty="0"/>
+              <a:t> maken &amp; </a:t>
+            </a:r>
+            <a:r>
+              <a:rPr lang="nl-NL" sz="3600" noProof="0" dirty="0" err="1"/>
+              <a:t>committen</a:t>
+            </a:r>
+            <a:endParaRPr lang="nl-NL" sz="3600" noProof="0" dirty="0"/>
+          </a:p>
+        </p:txBody>
+      </p:sp>
+      <p:sp>
+        <p:nvSpPr>
+          <p:cNvPr id="9" name="Content Placeholder 2">
+            <a:extLst>
+              <a:ext uri="{FF2B5EF4-FFF2-40B4-BE49-F238E27FC236}">
+                <a16:creationId xmlns:a16="http://schemas.microsoft.com/office/drawing/2014/main" id="{16A062CA-3D31-FB0E-8FEF-BF44ED8BA95E}"/>
+              </a:ext>
+            </a:extLst>
+          </p:cNvPr>
+          <p:cNvSpPr>
+            <a:spLocks noGrp="1"/>
+          </p:cNvSpPr>
+          <p:nvPr>
+            <p:ph idx="1"/>
+          </p:nvPr>
+        </p:nvSpPr>
+        <p:spPr>
+          <a:xfrm>
+            <a:off x="838200" y="1456267"/>
+            <a:ext cx="5520398" cy="4720696"/>
+          </a:xfrm>
+        </p:spPr>
+        <p:txBody>
+          <a:bodyPr>
+            <a:normAutofit lnSpcReduction="10000"/>
+          </a:bodyPr>
+          <a:lstStyle/>
+          <a:p>
+            <a:pPr marL="0" indent="0">
+              <a:buNone/>
+            </a:pPr>
+            <a:r>
+              <a:rPr lang="nl-NL" sz="1800" dirty="0">
+                <a:cs typeface="Courier New" panose="02070309020205020404" pitchFamily="49" charset="0"/>
+              </a:rPr>
+              <a:t>Nieuw lokaal </a:t>
+            </a:r>
+            <a:r>
+              <a:rPr lang="nl-NL" sz="1800" dirty="0" err="1">
+                <a:cs typeface="Courier New" panose="02070309020205020404" pitchFamily="49" charset="0"/>
+              </a:rPr>
+              <a:t>repo</a:t>
+            </a:r>
+            <a:r>
+              <a:rPr lang="nl-NL" sz="1800" dirty="0">
+                <a:cs typeface="Courier New" panose="02070309020205020404" pitchFamily="49" charset="0"/>
+              </a:rPr>
+              <a:t> aanmaken:</a:t>
+            </a:r>
+          </a:p>
+          <a:p>
+            <a:pPr marL="0" indent="0">
+              <a:buNone/>
+            </a:pPr>
+            <a:r>
+              <a:rPr lang="nl-NL" sz="1800" dirty="0">
+                <a:latin typeface="Courier New" panose="02070309020205020404" pitchFamily="49" charset="0"/>
+                <a:cs typeface="Courier New" panose="02070309020205020404" pitchFamily="49" charset="0"/>
+              </a:rPr>
+              <a:t>git </a:t>
+            </a:r>
+            <a:r>
+              <a:rPr lang="nl-NL" sz="1800" dirty="0" err="1">
+                <a:latin typeface="Courier New" panose="02070309020205020404" pitchFamily="49" charset="0"/>
+                <a:cs typeface="Courier New" panose="02070309020205020404" pitchFamily="49" charset="0"/>
+              </a:rPr>
+              <a:t>init</a:t>
+            </a:r>
+            <a:endParaRPr lang="nl-NL" sz="1800" dirty="0">
+              <a:latin typeface="Courier New" panose="02070309020205020404" pitchFamily="49" charset="0"/>
+              <a:cs typeface="Courier New" panose="02070309020205020404" pitchFamily="49" charset="0"/>
+            </a:endParaRPr>
+          </a:p>
+          <a:p>
+            <a:pPr marL="0" indent="0">
+              <a:buNone/>
+            </a:pPr>
+            <a:endParaRPr lang="nl-NL" sz="1800" dirty="0">
+              <a:cs typeface="Courier New" panose="02070309020205020404" pitchFamily="49" charset="0"/>
+            </a:endParaRPr>
+          </a:p>
+          <a:p>
+            <a:pPr marL="0" indent="0">
+              <a:buNone/>
+            </a:pPr>
+            <a:r>
+              <a:rPr lang="nl-NL" sz="1800" dirty="0">
+                <a:cs typeface="Courier New" panose="02070309020205020404" pitchFamily="49" charset="0"/>
+              </a:rPr>
+              <a:t>Wijzigingen toevoegen aan de index:</a:t>
+            </a:r>
+          </a:p>
+          <a:p>
+            <a:pPr marL="0" indent="0">
+              <a:buNone/>
+            </a:pPr>
+            <a:r>
+              <a:rPr lang="nl-NL" sz="1800" dirty="0">
+                <a:latin typeface="Courier New" panose="02070309020205020404" pitchFamily="49" charset="0"/>
+                <a:cs typeface="Courier New" panose="02070309020205020404" pitchFamily="49" charset="0"/>
+              </a:rPr>
+              <a:t>git </a:t>
+            </a:r>
+            <a:r>
+              <a:rPr lang="nl-NL" sz="1800" dirty="0" err="1">
+                <a:latin typeface="Courier New" panose="02070309020205020404" pitchFamily="49" charset="0"/>
+                <a:cs typeface="Courier New" panose="02070309020205020404" pitchFamily="49" charset="0"/>
+              </a:rPr>
+              <a:t>add</a:t>
+            </a:r>
+            <a:r>
+              <a:rPr lang="nl-NL" sz="1800" dirty="0">
+                <a:latin typeface="Courier New" panose="02070309020205020404" pitchFamily="49" charset="0"/>
+                <a:cs typeface="Courier New" panose="02070309020205020404" pitchFamily="49" charset="0"/>
+              </a:rPr>
+              <a:t> -A</a:t>
+            </a:r>
+          </a:p>
+          <a:p>
+            <a:pPr marL="0" indent="0">
+              <a:buNone/>
+            </a:pPr>
+            <a:r>
+              <a:rPr lang="nl-NL" sz="1800" dirty="0">
+                <a:latin typeface="Courier New" panose="02070309020205020404" pitchFamily="49" charset="0"/>
+                <a:cs typeface="Courier New" panose="02070309020205020404" pitchFamily="49" charset="0"/>
+              </a:rPr>
+              <a:t>git </a:t>
+            </a:r>
+            <a:r>
+              <a:rPr lang="nl-NL" sz="1800" dirty="0" err="1">
+                <a:latin typeface="Courier New" panose="02070309020205020404" pitchFamily="49" charset="0"/>
+                <a:cs typeface="Courier New" panose="02070309020205020404" pitchFamily="49" charset="0"/>
+              </a:rPr>
+              <a:t>add</a:t>
+            </a:r>
+            <a:r>
+              <a:rPr lang="nl-NL" sz="1800" dirty="0">
+                <a:latin typeface="Courier New" panose="02070309020205020404" pitchFamily="49" charset="0"/>
+                <a:cs typeface="Courier New" panose="02070309020205020404" pitchFamily="49" charset="0"/>
+              </a:rPr>
+              <a:t> &lt;file&gt;</a:t>
+            </a:r>
+          </a:p>
+          <a:p>
+            <a:pPr marL="0" indent="0">
+              <a:buNone/>
+            </a:pPr>
+            <a:endParaRPr lang="nl-NL" sz="1800" dirty="0">
+              <a:cs typeface="Courier New" panose="02070309020205020404" pitchFamily="49" charset="0"/>
+            </a:endParaRPr>
+          </a:p>
+          <a:p>
+            <a:pPr marL="0" indent="0">
+              <a:buNone/>
+            </a:pPr>
+            <a:r>
+              <a:rPr lang="nl-NL" sz="1800" dirty="0">
+                <a:cs typeface="Courier New" panose="02070309020205020404" pitchFamily="49" charset="0"/>
+              </a:rPr>
+              <a:t>Wijzigingen weghalen uit de index:</a:t>
+            </a:r>
+          </a:p>
+          <a:p>
+            <a:pPr marL="0" indent="0">
+              <a:buNone/>
+            </a:pPr>
+            <a:r>
+              <a:rPr lang="nl-NL" sz="1800" dirty="0">
+                <a:latin typeface="Courier New" panose="02070309020205020404" pitchFamily="49" charset="0"/>
+                <a:cs typeface="Courier New" panose="02070309020205020404" pitchFamily="49" charset="0"/>
+              </a:rPr>
+              <a:t>git reset</a:t>
+            </a:r>
+          </a:p>
+          <a:p>
+            <a:pPr marL="0" indent="0">
+              <a:buNone/>
+            </a:pPr>
+            <a:r>
+              <a:rPr lang="nl-NL" sz="1800" dirty="0">
+                <a:latin typeface="Courier New" panose="02070309020205020404" pitchFamily="49" charset="0"/>
+                <a:cs typeface="Courier New" panose="02070309020205020404" pitchFamily="49" charset="0"/>
+              </a:rPr>
+              <a:t>git reset &lt;file&gt;</a:t>
+            </a:r>
+          </a:p>
+          <a:p>
+            <a:pPr marL="0" indent="0">
+              <a:buNone/>
+            </a:pPr>
+            <a:endParaRPr lang="nl-NL" sz="1800" dirty="0">
+              <a:cs typeface="Courier New" panose="02070309020205020404" pitchFamily="49" charset="0"/>
+            </a:endParaRPr>
+          </a:p>
+          <a:p>
+            <a:pPr marL="0" indent="0">
+              <a:buNone/>
+            </a:pPr>
+            <a:r>
+              <a:rPr lang="nl-NL" sz="1800" dirty="0">
+                <a:cs typeface="Courier New" panose="02070309020205020404" pitchFamily="49" charset="0"/>
+              </a:rPr>
+              <a:t>Wijzigingen weghalen uit de index:</a:t>
+            </a:r>
+          </a:p>
+          <a:p>
+            <a:pPr marL="0" indent="0">
+              <a:buNone/>
+            </a:pPr>
+            <a:r>
+              <a:rPr lang="nl-NL" sz="1800" dirty="0">
+                <a:latin typeface="Courier New" panose="02070309020205020404" pitchFamily="49" charset="0"/>
+                <a:cs typeface="Courier New" panose="02070309020205020404" pitchFamily="49" charset="0"/>
+              </a:rPr>
+              <a:t>git </a:t>
+            </a:r>
+            <a:r>
+              <a:rPr lang="nl-NL" sz="1800" dirty="0" err="1">
+                <a:latin typeface="Courier New" panose="02070309020205020404" pitchFamily="49" charset="0"/>
+                <a:cs typeface="Courier New" panose="02070309020205020404" pitchFamily="49" charset="0"/>
+              </a:rPr>
+              <a:t>commit</a:t>
+            </a:r>
+            <a:r>
+              <a:rPr lang="nl-NL" sz="1800" dirty="0">
+                <a:latin typeface="Courier New" panose="02070309020205020404" pitchFamily="49" charset="0"/>
+                <a:cs typeface="Courier New" panose="02070309020205020404" pitchFamily="49" charset="0"/>
+              </a:rPr>
+              <a:t> –m "</a:t>
+            </a:r>
+            <a:r>
+              <a:rPr lang="nl-NL" sz="1800" dirty="0" err="1">
+                <a:latin typeface="Courier New" panose="02070309020205020404" pitchFamily="49" charset="0"/>
+                <a:cs typeface="Courier New" panose="02070309020205020404" pitchFamily="49" charset="0"/>
+              </a:rPr>
+              <a:t>Decripte</a:t>
+            </a:r>
+            <a:r>
+              <a:rPr lang="nl-NL" sz="1800" dirty="0">
+                <a:latin typeface="Courier New" panose="02070309020205020404" pitchFamily="49" charset="0"/>
+                <a:cs typeface="Courier New" panose="02070309020205020404" pitchFamily="49" charset="0"/>
+              </a:rPr>
+              <a:t> </a:t>
+            </a:r>
+            <a:r>
+              <a:rPr lang="nl-NL" sz="1800" dirty="0" err="1">
+                <a:latin typeface="Courier New" panose="02070309020205020404" pitchFamily="49" charset="0"/>
+                <a:cs typeface="Courier New" panose="02070309020205020404" pitchFamily="49" charset="0"/>
+              </a:rPr>
+              <a:t>message</a:t>
+            </a:r>
+            <a:r>
+              <a:rPr lang="nl-NL" sz="1800" dirty="0">
+                <a:latin typeface="Courier New" panose="02070309020205020404" pitchFamily="49" charset="0"/>
+                <a:cs typeface="Courier New" panose="02070309020205020404" pitchFamily="49" charset="0"/>
+              </a:rPr>
+              <a:t>!"</a:t>
+            </a:r>
+          </a:p>
+        </p:txBody>
+      </p:sp>
+    </p:spTree>
+    <p:extLst>
+      <p:ext uri="{BB962C8B-B14F-4D97-AF65-F5344CB8AC3E}">
+        <p14:creationId xmlns:p14="http://schemas.microsoft.com/office/powerpoint/2010/main" val="1037585435"/>
       </p:ext>
     </p:extLst>
   </p:cSld>

</xml_diff>

<commit_message>
Finalize git part 1
</commit_message>
<xml_diff>
--- a/git_course/1_basics/git_basic.pptx
+++ b/git_course/1_basics/git_basic.pptx
@@ -5,7 +5,7 @@
     <p:sldMasterId id="2147483648" r:id="rId1"/>
   </p:sldMasterIdLst>
   <p:notesMasterIdLst>
-    <p:notesMasterId r:id="rId72"/>
+    <p:notesMasterId r:id="rId74"/>
   </p:notesMasterIdLst>
   <p:sldIdLst>
     <p:sldId id="256" r:id="rId2"/>
@@ -75,9 +75,11 @@
     <p:sldId id="420" r:id="rId66"/>
     <p:sldId id="421" r:id="rId67"/>
     <p:sldId id="422" r:id="rId68"/>
-    <p:sldId id="423" r:id="rId69"/>
-    <p:sldId id="424" r:id="rId70"/>
-    <p:sldId id="435" r:id="rId71"/>
+    <p:sldId id="436" r:id="rId69"/>
+    <p:sldId id="437" r:id="rId70"/>
+    <p:sldId id="423" r:id="rId71"/>
+    <p:sldId id="424" r:id="rId72"/>
+    <p:sldId id="435" r:id="rId73"/>
   </p:sldIdLst>
   <p:sldSz cx="12192000" cy="6858000"/>
   <p:notesSz cx="6858000" cy="9144000"/>
@@ -6848,6 +6850,222 @@
         <p:cNvPr id="1" name="">
           <a:extLst>
             <a:ext uri="{FF2B5EF4-FFF2-40B4-BE49-F238E27FC236}">
+              <a16:creationId xmlns:a16="http://schemas.microsoft.com/office/drawing/2014/main" id="{690E94E8-4000-FF6F-6E05-A377C4AD2967}"/>
+            </a:ext>
+          </a:extLst>
+        </p:cNvPr>
+        <p:cNvGrpSpPr/>
+        <p:nvPr/>
+      </p:nvGrpSpPr>
+      <p:grpSpPr>
+        <a:xfrm>
+          <a:off x="0" y="0"/>
+          <a:ext cx="0" cy="0"/>
+          <a:chOff x="0" y="0"/>
+          <a:chExt cx="0" cy="0"/>
+        </a:xfrm>
+      </p:grpSpPr>
+      <p:sp>
+        <p:nvSpPr>
+          <p:cNvPr id="2" name="Slide Image Placeholder 1">
+            <a:extLst>
+              <a:ext uri="{FF2B5EF4-FFF2-40B4-BE49-F238E27FC236}">
+                <a16:creationId xmlns:a16="http://schemas.microsoft.com/office/drawing/2014/main" id="{F5C46A15-F421-B036-9374-343F42A1C603}"/>
+              </a:ext>
+            </a:extLst>
+          </p:cNvPr>
+          <p:cNvSpPr>
+            <a:spLocks noGrp="1" noRot="1" noChangeAspect="1"/>
+          </p:cNvSpPr>
+          <p:nvPr>
+            <p:ph type="sldImg"/>
+          </p:nvPr>
+        </p:nvSpPr>
+        <p:spPr/>
+      </p:sp>
+      <p:sp>
+        <p:nvSpPr>
+          <p:cNvPr id="3" name="Notes Placeholder 2">
+            <a:extLst>
+              <a:ext uri="{FF2B5EF4-FFF2-40B4-BE49-F238E27FC236}">
+                <a16:creationId xmlns:a16="http://schemas.microsoft.com/office/drawing/2014/main" id="{B97EBAEB-3A56-8B90-ACD7-CDC166FA5323}"/>
+              </a:ext>
+            </a:extLst>
+          </p:cNvPr>
+          <p:cNvSpPr>
+            <a:spLocks noGrp="1"/>
+          </p:cNvSpPr>
+          <p:nvPr>
+            <p:ph type="body" idx="1"/>
+          </p:nvPr>
+        </p:nvSpPr>
+        <p:spPr/>
+        <p:txBody>
+          <a:bodyPr/>
+          <a:lstStyle/>
+          <a:p>
+            <a:endParaRPr lang="nl-NL" dirty="0"/>
+          </a:p>
+        </p:txBody>
+      </p:sp>
+      <p:sp>
+        <p:nvSpPr>
+          <p:cNvPr id="4" name="Slide Number Placeholder 3">
+            <a:extLst>
+              <a:ext uri="{FF2B5EF4-FFF2-40B4-BE49-F238E27FC236}">
+                <a16:creationId xmlns:a16="http://schemas.microsoft.com/office/drawing/2014/main" id="{1CB7E8E6-0DDD-B97F-A0DD-5CC6AC40C731}"/>
+              </a:ext>
+            </a:extLst>
+          </p:cNvPr>
+          <p:cNvSpPr>
+            <a:spLocks noGrp="1"/>
+          </p:cNvSpPr>
+          <p:nvPr>
+            <p:ph type="sldNum" sz="quarter" idx="5"/>
+          </p:nvPr>
+        </p:nvSpPr>
+        <p:spPr/>
+        <p:txBody>
+          <a:bodyPr/>
+          <a:lstStyle/>
+          <a:p>
+            <a:fld id="{9583DEA5-E342-4DB2-B087-D0B9C490B19E}" type="slidenum">
+              <a:rPr lang="nl-NL" smtClean="0"/>
+              <a:t>68</a:t>
+            </a:fld>
+            <a:endParaRPr lang="nl-NL"/>
+          </a:p>
+        </p:txBody>
+      </p:sp>
+    </p:spTree>
+    <p:extLst>
+      <p:ext uri="{BB962C8B-B14F-4D97-AF65-F5344CB8AC3E}">
+        <p14:creationId xmlns:p14="http://schemas.microsoft.com/office/powerpoint/2010/main" val="1200827474"/>
+      </p:ext>
+    </p:extLst>
+  </p:cSld>
+  <p:clrMapOvr>
+    <a:masterClrMapping/>
+  </p:clrMapOvr>
+</p:notes>
+</file>
+
+<file path=ppt/notesSlides/notesSlide61.xml><?xml version="1.0" encoding="utf-8"?>
+<p:notes xmlns:a="http://schemas.openxmlformats.org/drawingml/2006/main" xmlns:r="http://schemas.openxmlformats.org/officeDocument/2006/relationships" xmlns:p="http://schemas.openxmlformats.org/presentationml/2006/main">
+  <p:cSld>
+    <p:spTree>
+      <p:nvGrpSpPr>
+        <p:cNvPr id="1" name="">
+          <a:extLst>
+            <a:ext uri="{FF2B5EF4-FFF2-40B4-BE49-F238E27FC236}">
+              <a16:creationId xmlns:a16="http://schemas.microsoft.com/office/drawing/2014/main" id="{774018FC-CA76-F3AB-4A5E-B43BD02F1915}"/>
+            </a:ext>
+          </a:extLst>
+        </p:cNvPr>
+        <p:cNvGrpSpPr/>
+        <p:nvPr/>
+      </p:nvGrpSpPr>
+      <p:grpSpPr>
+        <a:xfrm>
+          <a:off x="0" y="0"/>
+          <a:ext cx="0" cy="0"/>
+          <a:chOff x="0" y="0"/>
+          <a:chExt cx="0" cy="0"/>
+        </a:xfrm>
+      </p:grpSpPr>
+      <p:sp>
+        <p:nvSpPr>
+          <p:cNvPr id="2" name="Slide Image Placeholder 1">
+            <a:extLst>
+              <a:ext uri="{FF2B5EF4-FFF2-40B4-BE49-F238E27FC236}">
+                <a16:creationId xmlns:a16="http://schemas.microsoft.com/office/drawing/2014/main" id="{1DF7B44C-4602-78CD-2F49-028137F1681F}"/>
+              </a:ext>
+            </a:extLst>
+          </p:cNvPr>
+          <p:cNvSpPr>
+            <a:spLocks noGrp="1" noRot="1" noChangeAspect="1"/>
+          </p:cNvSpPr>
+          <p:nvPr>
+            <p:ph type="sldImg"/>
+          </p:nvPr>
+        </p:nvSpPr>
+        <p:spPr/>
+      </p:sp>
+      <p:sp>
+        <p:nvSpPr>
+          <p:cNvPr id="3" name="Notes Placeholder 2">
+            <a:extLst>
+              <a:ext uri="{FF2B5EF4-FFF2-40B4-BE49-F238E27FC236}">
+                <a16:creationId xmlns:a16="http://schemas.microsoft.com/office/drawing/2014/main" id="{EF81833A-2923-DA72-96F5-433C9615F23B}"/>
+              </a:ext>
+            </a:extLst>
+          </p:cNvPr>
+          <p:cNvSpPr>
+            <a:spLocks noGrp="1"/>
+          </p:cNvSpPr>
+          <p:nvPr>
+            <p:ph type="body" idx="1"/>
+          </p:nvPr>
+        </p:nvSpPr>
+        <p:spPr/>
+        <p:txBody>
+          <a:bodyPr/>
+          <a:lstStyle/>
+          <a:p>
+            <a:endParaRPr lang="nl-NL" dirty="0"/>
+          </a:p>
+        </p:txBody>
+      </p:sp>
+      <p:sp>
+        <p:nvSpPr>
+          <p:cNvPr id="4" name="Slide Number Placeholder 3">
+            <a:extLst>
+              <a:ext uri="{FF2B5EF4-FFF2-40B4-BE49-F238E27FC236}">
+                <a16:creationId xmlns:a16="http://schemas.microsoft.com/office/drawing/2014/main" id="{5558C38C-32F6-BDB3-B1E6-F9BE95E46DD8}"/>
+              </a:ext>
+            </a:extLst>
+          </p:cNvPr>
+          <p:cNvSpPr>
+            <a:spLocks noGrp="1"/>
+          </p:cNvSpPr>
+          <p:nvPr>
+            <p:ph type="sldNum" sz="quarter" idx="5"/>
+          </p:nvPr>
+        </p:nvSpPr>
+        <p:spPr/>
+        <p:txBody>
+          <a:bodyPr/>
+          <a:lstStyle/>
+          <a:p>
+            <a:fld id="{9583DEA5-E342-4DB2-B087-D0B9C490B19E}" type="slidenum">
+              <a:rPr lang="nl-NL" smtClean="0"/>
+              <a:t>69</a:t>
+            </a:fld>
+            <a:endParaRPr lang="nl-NL"/>
+          </a:p>
+        </p:txBody>
+      </p:sp>
+    </p:spTree>
+    <p:extLst>
+      <p:ext uri="{BB962C8B-B14F-4D97-AF65-F5344CB8AC3E}">
+        <p14:creationId xmlns:p14="http://schemas.microsoft.com/office/powerpoint/2010/main" val="606190696"/>
+      </p:ext>
+    </p:extLst>
+  </p:cSld>
+  <p:clrMapOvr>
+    <a:masterClrMapping/>
+  </p:clrMapOvr>
+</p:notes>
+</file>
+
+<file path=ppt/notesSlides/notesSlide62.xml><?xml version="1.0" encoding="utf-8"?>
+<p:notes xmlns:a="http://schemas.openxmlformats.org/drawingml/2006/main" xmlns:r="http://schemas.openxmlformats.org/officeDocument/2006/relationships" xmlns:p="http://schemas.openxmlformats.org/presentationml/2006/main">
+  <p:cSld>
+    <p:spTree>
+      <p:nvGrpSpPr>
+        <p:cNvPr id="1" name="">
+          <a:extLst>
+            <a:ext uri="{FF2B5EF4-FFF2-40B4-BE49-F238E27FC236}">
               <a16:creationId xmlns:a16="http://schemas.microsoft.com/office/drawing/2014/main" id="{7EC8D2FA-25A3-F7DD-9713-7067792F793D}"/>
             </a:ext>
           </a:extLst>
@@ -6929,7 +7147,7 @@
           <a:p>
             <a:fld id="{9583DEA5-E342-4DB2-B087-D0B9C490B19E}" type="slidenum">
               <a:rPr lang="nl-NL" smtClean="0"/>
-              <a:t>69</a:t>
+              <a:t>71</a:t>
             </a:fld>
             <a:endParaRPr lang="nl-NL"/>
           </a:p>
@@ -6948,7 +7166,7 @@
 </p:notes>
 </file>
 
-<file path=ppt/notesSlides/notesSlide61.xml><?xml version="1.0" encoding="utf-8"?>
+<file path=ppt/notesSlides/notesSlide63.xml><?xml version="1.0" encoding="utf-8"?>
 <p:notes xmlns:a="http://schemas.openxmlformats.org/drawingml/2006/main" xmlns:r="http://schemas.openxmlformats.org/officeDocument/2006/relationships" xmlns:p="http://schemas.openxmlformats.org/presentationml/2006/main">
   <p:cSld>
     <p:spTree>
@@ -7037,7 +7255,7 @@
           <a:p>
             <a:fld id="{9583DEA5-E342-4DB2-B087-D0B9C490B19E}" type="slidenum">
               <a:rPr lang="nl-NL" smtClean="0"/>
-              <a:t>70</a:t>
+              <a:t>72</a:t>
             </a:fld>
             <a:endParaRPr lang="nl-NL"/>
           </a:p>
@@ -18319,28 +18537,6 @@
             </a:r>
           </a:p>
           <a:p>
-            <a:pPr lvl="1">
-              <a:spcAft>
-                <a:spcPts val="600"/>
-              </a:spcAft>
-            </a:pPr>
-            <a:r>
-              <a:rPr lang="nl-NL" sz="1600" noProof="0" dirty="0"/>
-              <a:t>Wat is git?</a:t>
-            </a:r>
-          </a:p>
-          <a:p>
-            <a:pPr lvl="1">
-              <a:spcAft>
-                <a:spcPts val="600"/>
-              </a:spcAft>
-            </a:pPr>
-            <a:r>
-              <a:rPr lang="nl-NL" sz="1600" noProof="0" dirty="0"/>
-              <a:t>Hoe werkt git?</a:t>
-            </a:r>
-          </a:p>
-          <a:p>
             <a:pPr>
               <a:spcAft>
                 <a:spcPts val="600"/>
@@ -18348,60 +18544,7 @@
             </a:pPr>
             <a:r>
               <a:rPr lang="nl-NL" sz="2000" noProof="0" dirty="0"/>
-              <a:t>Werken met versies</a:t>
-            </a:r>
-            <a:endParaRPr lang="nl-NL" sz="1600" noProof="0" dirty="0"/>
-          </a:p>
-          <a:p>
-            <a:pPr lvl="1">
-              <a:spcAft>
-                <a:spcPts val="600"/>
-              </a:spcAft>
-            </a:pPr>
-            <a:r>
-              <a:rPr lang="nl-NL" sz="1600" noProof="0" dirty="0"/>
-              <a:t>Repository opzetten</a:t>
-            </a:r>
-          </a:p>
-          <a:p>
-            <a:pPr lvl="1">
-              <a:spcAft>
-                <a:spcPts val="600"/>
-              </a:spcAft>
-            </a:pPr>
-            <a:r>
-              <a:rPr lang="nl-NL" sz="1600" noProof="0" dirty="0"/>
-              <a:t>Een </a:t>
-            </a:r>
-            <a:r>
-              <a:rPr lang="nl-NL" sz="1600" noProof="0" dirty="0" err="1"/>
-              <a:t>commit</a:t>
-            </a:r>
-            <a:r>
-              <a:rPr lang="nl-NL" sz="1600" noProof="0" dirty="0"/>
-              <a:t> aanmaken.</a:t>
-            </a:r>
-          </a:p>
-          <a:p>
-            <a:pPr lvl="1">
-              <a:spcAft>
-                <a:spcPts val="600"/>
-              </a:spcAft>
-            </a:pPr>
-            <a:r>
-              <a:rPr lang="nl-NL" sz="1600" noProof="0" dirty="0"/>
-              <a:t>Wat gebeurt er in de repository?</a:t>
-            </a:r>
-          </a:p>
-          <a:p>
-            <a:pPr lvl="1">
-              <a:spcAft>
-                <a:spcPts val="600"/>
-              </a:spcAft>
-            </a:pPr>
-            <a:r>
-              <a:rPr lang="nl-NL" sz="1600" noProof="0" dirty="0"/>
-              <a:t>Fouten herstellen.</a:t>
+              <a:t>Onder de motorkap</a:t>
             </a:r>
           </a:p>
           <a:p>
@@ -18411,58 +18554,37 @@
               </a:spcAft>
             </a:pPr>
             <a:r>
-              <a:rPr lang="nl-NL" sz="2000" noProof="0" dirty="0"/>
-              <a:t>Aftakkingen aanmaken</a:t>
-            </a:r>
-          </a:p>
-          <a:p>
-            <a:pPr lvl="1">
+              <a:rPr lang="nl-NL" sz="2000" dirty="0"/>
+              <a:t>Wijzigingen </a:t>
+            </a:r>
+            <a:r>
+              <a:rPr lang="nl-NL" sz="2000" dirty="0" err="1"/>
+              <a:t>committen</a:t>
+            </a:r>
+            <a:endParaRPr lang="nl-NL" sz="2000" dirty="0"/>
+          </a:p>
+          <a:p>
+            <a:pPr>
               <a:spcAft>
                 <a:spcPts val="600"/>
               </a:spcAft>
             </a:pPr>
             <a:r>
-              <a:rPr lang="nl-NL" sz="1600" noProof="0" dirty="0" err="1"/>
-              <a:t>Branch</a:t>
-            </a:r>
-            <a:r>
-              <a:rPr lang="nl-NL" sz="1600" noProof="0" dirty="0"/>
-              <a:t> aanmaken.</a:t>
-            </a:r>
-          </a:p>
-          <a:p>
-            <a:pPr lvl="1">
+              <a:rPr lang="nl-NL" sz="2000" dirty="0"/>
+              <a:t>Wijzigingen beheren</a:t>
+            </a:r>
+          </a:p>
+          <a:p>
+            <a:pPr>
               <a:spcAft>
                 <a:spcPts val="600"/>
               </a:spcAft>
             </a:pPr>
             <a:r>
-              <a:rPr lang="nl-NL" sz="1600" noProof="0" dirty="0" err="1"/>
-              <a:t>Merge</a:t>
-            </a:r>
-            <a:r>
-              <a:rPr lang="nl-NL" sz="1600" noProof="0" dirty="0"/>
-              <a:t> strategieën.</a:t>
-            </a:r>
-          </a:p>
-          <a:p>
-            <a:pPr lvl="1">
-              <a:spcAft>
-                <a:spcPts val="600"/>
-              </a:spcAft>
-            </a:pPr>
-            <a:r>
-              <a:rPr lang="nl-NL" sz="1600" noProof="0" dirty="0"/>
-              <a:t>Conflicten oplossen.</a:t>
-            </a:r>
-          </a:p>
-          <a:p>
-            <a:pPr lvl="1">
-              <a:spcAft>
-                <a:spcPts val="600"/>
-              </a:spcAft>
-            </a:pPr>
-            <a:endParaRPr lang="nl-NL" sz="1600" noProof="0" dirty="0"/>
+              <a:rPr lang="nl-NL" sz="2000"/>
+              <a:t>Branches</a:t>
+            </a:r>
+            <a:endParaRPr lang="nl-NL" sz="2000" dirty="0"/>
           </a:p>
         </p:txBody>
       </p:sp>
@@ -18555,7 +18677,7 @@
           <a:p>
             <a:r>
               <a:rPr lang="nl-NL" noProof="0" dirty="0"/>
-              <a:t>Werk </a:t>
+              <a:t>Wijzigingen </a:t>
             </a:r>
             <a:r>
               <a:rPr lang="nl-NL" noProof="0" dirty="0" err="1"/>
@@ -21826,7 +21948,7 @@
           <a:p>
             <a:r>
               <a:rPr lang="nl-NL" noProof="0" dirty="0"/>
-              <a:t>Wijzigingen</a:t>
+              <a:t>Wijzigingen beheren</a:t>
             </a:r>
           </a:p>
         </p:txBody>
@@ -45586,8 +45708,8 @@
         </p:nvCxnSpPr>
         <p:spPr>
           <a:xfrm flipV="1">
-            <a:off x="7369355" y="3501930"/>
-            <a:ext cx="297537" cy="844240"/>
+            <a:off x="6820714" y="3501930"/>
+            <a:ext cx="494487" cy="844240"/>
           </a:xfrm>
           <a:prstGeom prst="bentConnector2">
             <a:avLst/>
@@ -45855,7 +45977,7 @@
         </p:nvSpPr>
         <p:spPr>
           <a:xfrm>
-            <a:off x="9298259" y="2135702"/>
+            <a:off x="9368599" y="2135702"/>
             <a:ext cx="654346" cy="369332"/>
           </a:xfrm>
           <a:prstGeom prst="rect">
@@ -45891,7 +46013,7 @@
         </p:nvSpPr>
         <p:spPr>
           <a:xfrm>
-            <a:off x="9298259" y="3170230"/>
+            <a:off x="9368599" y="3170230"/>
             <a:ext cx="983955" cy="369332"/>
           </a:xfrm>
           <a:prstGeom prst="rect">
@@ -45927,7 +46049,7 @@
         </p:nvSpPr>
         <p:spPr>
           <a:xfrm>
-            <a:off x="4317887" y="3180896"/>
+            <a:off x="3881788" y="3180896"/>
             <a:ext cx="323160" cy="322207"/>
           </a:xfrm>
           <a:prstGeom prst="ellipse">
@@ -45983,7 +46105,7 @@
         </p:nvCxnSpPr>
         <p:spPr>
           <a:xfrm rot="16200000" flipH="1">
-            <a:off x="5419155" y="2563414"/>
+            <a:off x="4983056" y="2563414"/>
             <a:ext cx="843814" cy="2723191"/>
           </a:xfrm>
           <a:prstGeom prst="bentConnector2">
@@ -46022,7 +46144,7 @@
         </p:nvSpPr>
         <p:spPr>
           <a:xfrm>
-            <a:off x="6143518" y="4185066"/>
+            <a:off x="5594877" y="4185066"/>
             <a:ext cx="323160" cy="322207"/>
           </a:xfrm>
           <a:prstGeom prst="ellipse">
@@ -46075,7 +46197,7 @@
         </p:nvSpPr>
         <p:spPr>
           <a:xfrm>
-            <a:off x="9294360" y="4137941"/>
+            <a:off x="9364700" y="4137941"/>
             <a:ext cx="2001992" cy="369332"/>
           </a:xfrm>
           <a:prstGeom prst="rect">
@@ -46110,7 +46232,7 @@
         </p:nvSpPr>
         <p:spPr>
           <a:xfrm>
-            <a:off x="5240841" y="4185066"/>
+            <a:off x="4692200" y="4185066"/>
             <a:ext cx="323160" cy="322207"/>
           </a:xfrm>
           <a:prstGeom prst="ellipse">
@@ -46163,7 +46285,7 @@
         </p:nvSpPr>
         <p:spPr>
           <a:xfrm>
-            <a:off x="7046195" y="4185066"/>
+            <a:off x="6497554" y="4185066"/>
             <a:ext cx="323160" cy="322207"/>
           </a:xfrm>
           <a:prstGeom prst="ellipse">
@@ -46219,7 +46341,7 @@
         </p:nvCxnSpPr>
         <p:spPr>
           <a:xfrm flipV="1">
-            <a:off x="8384344" y="2511525"/>
+            <a:off x="8032653" y="2511525"/>
             <a:ext cx="0" cy="830471"/>
           </a:xfrm>
           <a:prstGeom prst="straightConnector1">
@@ -46258,7 +46380,7 @@
         </p:nvSpPr>
         <p:spPr>
           <a:xfrm>
-            <a:off x="7505312" y="3179723"/>
+            <a:off x="7153621" y="3179723"/>
             <a:ext cx="323160" cy="322207"/>
           </a:xfrm>
           <a:prstGeom prst="ellipse">
@@ -46311,7 +46433,7 @@
         </p:nvSpPr>
         <p:spPr>
           <a:xfrm>
-            <a:off x="7722964" y="3669228"/>
+            <a:off x="7371273" y="3669228"/>
             <a:ext cx="840295" cy="369332"/>
           </a:xfrm>
           <a:prstGeom prst="rect">
@@ -46352,7 +46474,7 @@
         </p:nvSpPr>
         <p:spPr>
           <a:xfrm>
-            <a:off x="8384344" y="2665677"/>
+            <a:off x="8032653" y="2665677"/>
             <a:ext cx="783933" cy="369332"/>
           </a:xfrm>
           <a:prstGeom prst="rect">
@@ -46400,7 +46522,7 @@
         </p:nvSpPr>
         <p:spPr>
           <a:xfrm>
-            <a:off x="8222764" y="2189318"/>
+            <a:off x="7871073" y="2189318"/>
             <a:ext cx="323160" cy="322207"/>
           </a:xfrm>
           <a:prstGeom prst="ellipse">
@@ -50035,14 +50157,14 @@
 </file>
 
 <file path=ppt/slides/slide68.xml><?xml version="1.0" encoding="utf-8"?>
-<p:sld xmlns:a="http://schemas.openxmlformats.org/drawingml/2006/main" xmlns:r="http://schemas.openxmlformats.org/officeDocument/2006/relationships" xmlns:p="http://schemas.openxmlformats.org/presentationml/2006/main" show="0">
+<p:sld xmlns:a="http://schemas.openxmlformats.org/drawingml/2006/main" xmlns:r="http://schemas.openxmlformats.org/officeDocument/2006/relationships" xmlns:p="http://schemas.openxmlformats.org/presentationml/2006/main">
   <p:cSld>
     <p:spTree>
       <p:nvGrpSpPr>
         <p:cNvPr id="1" name="">
           <a:extLst>
             <a:ext uri="{FF2B5EF4-FFF2-40B4-BE49-F238E27FC236}">
-              <a16:creationId xmlns:a16="http://schemas.microsoft.com/office/drawing/2014/main" id="{D128C513-936A-1EAB-7785-33C1B6BF5689}"/>
+              <a16:creationId xmlns:a16="http://schemas.microsoft.com/office/drawing/2014/main" id="{D09B7076-4C9C-5195-A79C-4133B1584BF9}"/>
             </a:ext>
           </a:extLst>
         </p:cNvPr>
@@ -50059,10 +50181,103 @@
       </p:grpSpPr>
       <p:sp>
         <p:nvSpPr>
-          <p:cNvPr id="4" name="Title 3">
-            <a:extLst>
-              <a:ext uri="{FF2B5EF4-FFF2-40B4-BE49-F238E27FC236}">
-                <a16:creationId xmlns:a16="http://schemas.microsoft.com/office/drawing/2014/main" id="{E6D7E2C0-8474-54CA-8F63-21F447CF6B43}"/>
+          <p:cNvPr id="52" name="Explosion: 14 Points 51">
+            <a:extLst>
+              <a:ext uri="{FF2B5EF4-FFF2-40B4-BE49-F238E27FC236}">
+                <a16:creationId xmlns:a16="http://schemas.microsoft.com/office/drawing/2014/main" id="{38171959-7756-790E-3E34-6440F4CD0552}"/>
+              </a:ext>
+            </a:extLst>
+          </p:cNvPr>
+          <p:cNvSpPr/>
+          <p:nvPr/>
+        </p:nvSpPr>
+        <p:spPr>
+          <a:xfrm>
+            <a:off x="7974789" y="2370917"/>
+            <a:ext cx="778179" cy="774542"/>
+          </a:xfrm>
+          <a:prstGeom prst="irregularSeal2">
+            <a:avLst/>
+          </a:prstGeom>
+          <a:noFill/>
+          <a:ln>
+            <a:solidFill>
+              <a:srgbClr val="FF0000"/>
+            </a:solidFill>
+          </a:ln>
+        </p:spPr>
+        <p:style>
+          <a:lnRef idx="2">
+            <a:schemeClr val="accent1">
+              <a:shade val="15000"/>
+            </a:schemeClr>
+          </a:lnRef>
+          <a:fillRef idx="1">
+            <a:schemeClr val="accent1"/>
+          </a:fillRef>
+          <a:effectRef idx="0">
+            <a:schemeClr val="accent1"/>
+          </a:effectRef>
+          <a:fontRef idx="minor">
+            <a:schemeClr val="lt1"/>
+          </a:fontRef>
+        </p:style>
+        <p:txBody>
+          <a:bodyPr rtlCol="0" anchor="ctr"/>
+          <a:lstStyle/>
+          <a:p>
+            <a:pPr algn="ctr"/>
+            <a:endParaRPr lang="nl-NL" noProof="0" dirty="0"/>
+          </a:p>
+        </p:txBody>
+      </p:sp>
+      <p:cxnSp>
+        <p:nvCxnSpPr>
+          <p:cNvPr id="16" name="Straight Arrow Connector 15">
+            <a:extLst>
+              <a:ext uri="{FF2B5EF4-FFF2-40B4-BE49-F238E27FC236}">
+                <a16:creationId xmlns:a16="http://schemas.microsoft.com/office/drawing/2014/main" id="{0F1DDF26-A6DE-88F6-3861-083535309E29}"/>
+              </a:ext>
+            </a:extLst>
+          </p:cNvPr>
+          <p:cNvCxnSpPr>
+            <a:cxnSpLocks/>
+          </p:cNvCxnSpPr>
+          <p:nvPr/>
+        </p:nvCxnSpPr>
+        <p:spPr>
+          <a:xfrm>
+            <a:off x="1744394" y="2758192"/>
+            <a:ext cx="8088437" cy="5808"/>
+          </a:xfrm>
+          <a:prstGeom prst="straightConnector1">
+            <a:avLst/>
+          </a:prstGeom>
+          <a:ln>
+            <a:tailEnd type="triangle"/>
+          </a:ln>
+        </p:spPr>
+        <p:style>
+          <a:lnRef idx="2">
+            <a:schemeClr val="dk1"/>
+          </a:lnRef>
+          <a:fillRef idx="0">
+            <a:schemeClr val="dk1"/>
+          </a:fillRef>
+          <a:effectRef idx="1">
+            <a:schemeClr val="dk1"/>
+          </a:effectRef>
+          <a:fontRef idx="minor">
+            <a:schemeClr val="tx1"/>
+          </a:fontRef>
+        </p:style>
+      </p:cxnSp>
+      <p:sp>
+        <p:nvSpPr>
+          <p:cNvPr id="2" name="Title 1">
+            <a:extLst>
+              <a:ext uri="{FF2B5EF4-FFF2-40B4-BE49-F238E27FC236}">
+                <a16:creationId xmlns:a16="http://schemas.microsoft.com/office/drawing/2014/main" id="{93A5E193-08B6-CE3C-7B30-6E9FA805BFAB}"/>
               </a:ext>
             </a:extLst>
           </p:cNvPr>
@@ -50073,47 +50288,677 @@
             <p:ph type="title"/>
           </p:nvPr>
         </p:nvSpPr>
-        <p:spPr/>
+        <p:spPr>
+          <a:xfrm>
+            <a:off x="838200" y="365126"/>
+            <a:ext cx="10515600" cy="718608"/>
+          </a:xfrm>
+        </p:spPr>
         <p:txBody>
-          <a:bodyPr/>
+          <a:bodyPr>
+            <a:normAutofit/>
+          </a:bodyPr>
           <a:lstStyle/>
           <a:p>
             <a:r>
+              <a:rPr lang="nl-NL" sz="3600" dirty="0"/>
+              <a:t>Waar los je conflicten op?</a:t>
+            </a:r>
+            <a:endParaRPr lang="nl-NL" sz="3600" noProof="0" dirty="0"/>
+          </a:p>
+        </p:txBody>
+      </p:sp>
+      <p:sp>
+        <p:nvSpPr>
+          <p:cNvPr id="9" name="TextBox 8">
+            <a:extLst>
+              <a:ext uri="{FF2B5EF4-FFF2-40B4-BE49-F238E27FC236}">
+                <a16:creationId xmlns:a16="http://schemas.microsoft.com/office/drawing/2014/main" id="{22CBED75-95BA-575C-6C2F-37DAC42C8C29}"/>
+              </a:ext>
+            </a:extLst>
+          </p:cNvPr>
+          <p:cNvSpPr txBox="1"/>
+          <p:nvPr/>
+        </p:nvSpPr>
+        <p:spPr>
+          <a:xfrm>
+            <a:off x="5030775" y="1995858"/>
+            <a:ext cx="934679" cy="369332"/>
+          </a:xfrm>
+          <a:prstGeom prst="rect">
+            <a:avLst/>
+          </a:prstGeom>
+          <a:noFill/>
+        </p:spPr>
+        <p:txBody>
+          <a:bodyPr wrap="none" rtlCol="0">
+            <a:spAutoFit/>
+          </a:bodyPr>
+          <a:lstStyle/>
+          <a:p>
+            <a:r>
+              <a:rPr lang="nl-NL" noProof="0" dirty="0" err="1"/>
+              <a:t>develop</a:t>
+            </a:r>
+            <a:endParaRPr lang="nl-NL" noProof="0" dirty="0"/>
+          </a:p>
+        </p:txBody>
+      </p:sp>
+      <p:sp>
+        <p:nvSpPr>
+          <p:cNvPr id="19" name="Oval 18">
+            <a:extLst>
+              <a:ext uri="{FF2B5EF4-FFF2-40B4-BE49-F238E27FC236}">
+                <a16:creationId xmlns:a16="http://schemas.microsoft.com/office/drawing/2014/main" id="{C8231235-C079-209F-AAAD-A712AB77D59C}"/>
+              </a:ext>
+            </a:extLst>
+          </p:cNvPr>
+          <p:cNvSpPr/>
+          <p:nvPr/>
+        </p:nvSpPr>
+        <p:spPr>
+          <a:xfrm>
+            <a:off x="2793887" y="2604122"/>
+            <a:ext cx="323160" cy="322207"/>
+          </a:xfrm>
+          <a:prstGeom prst="ellipse">
+            <a:avLst/>
+          </a:prstGeom>
+          <a:solidFill>
+            <a:schemeClr val="accent5">
+              <a:lumMod val="40000"/>
+              <a:lumOff val="60000"/>
+            </a:schemeClr>
+          </a:solidFill>
+        </p:spPr>
+        <p:style>
+          <a:lnRef idx="2">
+            <a:schemeClr val="dk1"/>
+          </a:lnRef>
+          <a:fillRef idx="1">
+            <a:schemeClr val="lt1"/>
+          </a:fillRef>
+          <a:effectRef idx="0">
+            <a:schemeClr val="dk1"/>
+          </a:effectRef>
+          <a:fontRef idx="minor">
+            <a:schemeClr val="dk1"/>
+          </a:fontRef>
+        </p:style>
+        <p:txBody>
+          <a:bodyPr rtlCol="0" anchor="ctr"/>
+          <a:lstStyle/>
+          <a:p>
+            <a:pPr algn="ctr"/>
+            <a:r>
+              <a:rPr lang="nl-NL" dirty="0"/>
+              <a:t>C</a:t>
+            </a:r>
+            <a:endParaRPr lang="nl-NL" noProof="0" dirty="0"/>
+          </a:p>
+        </p:txBody>
+      </p:sp>
+      <p:sp>
+        <p:nvSpPr>
+          <p:cNvPr id="23" name="Oval 22">
+            <a:extLst>
+              <a:ext uri="{FF2B5EF4-FFF2-40B4-BE49-F238E27FC236}">
+                <a16:creationId xmlns:a16="http://schemas.microsoft.com/office/drawing/2014/main" id="{FD8C6623-C92C-6D22-FB3A-4A002FFFCB9A}"/>
+              </a:ext>
+            </a:extLst>
+          </p:cNvPr>
+          <p:cNvSpPr/>
+          <p:nvPr/>
+        </p:nvSpPr>
+        <p:spPr>
+          <a:xfrm>
+            <a:off x="5688034" y="3770570"/>
+            <a:ext cx="323160" cy="322207"/>
+          </a:xfrm>
+          <a:prstGeom prst="ellipse">
+            <a:avLst/>
+          </a:prstGeom>
+          <a:solidFill>
+            <a:schemeClr val="accent2">
+              <a:lumMod val="40000"/>
+              <a:lumOff val="60000"/>
+            </a:schemeClr>
+          </a:solidFill>
+        </p:spPr>
+        <p:style>
+          <a:lnRef idx="2">
+            <a:schemeClr val="dk1"/>
+          </a:lnRef>
+          <a:fillRef idx="1">
+            <a:schemeClr val="lt1"/>
+          </a:fillRef>
+          <a:effectRef idx="0">
+            <a:schemeClr val="dk1"/>
+          </a:effectRef>
+          <a:fontRef idx="minor">
+            <a:schemeClr val="dk1"/>
+          </a:fontRef>
+        </p:style>
+        <p:txBody>
+          <a:bodyPr rtlCol="0" anchor="ctr"/>
+          <a:lstStyle/>
+          <a:p>
+            <a:pPr algn="ctr"/>
+            <a:r>
               <a:rPr lang="nl-NL" noProof="0" dirty="0"/>
-              <a:t>Samenvatting</a:t>
+              <a:t>C</a:t>
             </a:r>
           </a:p>
         </p:txBody>
       </p:sp>
       <p:sp>
         <p:nvSpPr>
-          <p:cNvPr id="5" name="Text Placeholder 4">
-            <a:extLst>
-              <a:ext uri="{FF2B5EF4-FFF2-40B4-BE49-F238E27FC236}">
-                <a16:creationId xmlns:a16="http://schemas.microsoft.com/office/drawing/2014/main" id="{668BB568-9283-7220-4E18-6185FED86C3E}"/>
-              </a:ext>
-            </a:extLst>
-          </p:cNvPr>
-          <p:cNvSpPr>
-            <a:spLocks noGrp="1"/>
-          </p:cNvSpPr>
-          <p:nvPr>
-            <p:ph type="body" idx="1"/>
-          </p:nvPr>
-        </p:nvSpPr>
-        <p:spPr/>
+          <p:cNvPr id="27" name="TextBox 26">
+            <a:extLst>
+              <a:ext uri="{FF2B5EF4-FFF2-40B4-BE49-F238E27FC236}">
+                <a16:creationId xmlns:a16="http://schemas.microsoft.com/office/drawing/2014/main" id="{B16E2B5A-AF2A-345B-D842-0D8F1797F5F4}"/>
+              </a:ext>
+            </a:extLst>
+          </p:cNvPr>
+          <p:cNvSpPr txBox="1"/>
+          <p:nvPr/>
+        </p:nvSpPr>
+        <p:spPr>
+          <a:xfrm>
+            <a:off x="4687038" y="4412762"/>
+            <a:ext cx="2001992" cy="369332"/>
+          </a:xfrm>
+          <a:prstGeom prst="rect">
+            <a:avLst/>
+          </a:prstGeom>
+          <a:noFill/>
+        </p:spPr>
         <p:txBody>
-          <a:bodyPr/>
+          <a:bodyPr wrap="square" rtlCol="0">
+            <a:spAutoFit/>
+          </a:bodyPr>
           <a:lstStyle/>
           <a:p>
+            <a:r>
+              <a:rPr lang="nl-NL" noProof="0" dirty="0"/>
+              <a:t>feature/unit-tests</a:t>
+            </a:r>
+          </a:p>
+        </p:txBody>
+      </p:sp>
+      <p:sp>
+        <p:nvSpPr>
+          <p:cNvPr id="3" name="Oval 2">
+            <a:extLst>
+              <a:ext uri="{FF2B5EF4-FFF2-40B4-BE49-F238E27FC236}">
+                <a16:creationId xmlns:a16="http://schemas.microsoft.com/office/drawing/2014/main" id="{7D1125D4-05C8-C4BC-673F-86D58F46FC98}"/>
+              </a:ext>
+            </a:extLst>
+          </p:cNvPr>
+          <p:cNvSpPr/>
+          <p:nvPr/>
+        </p:nvSpPr>
+        <p:spPr>
+          <a:xfrm>
+            <a:off x="4094324" y="3770570"/>
+            <a:ext cx="323160" cy="322207"/>
+          </a:xfrm>
+          <a:prstGeom prst="ellipse">
+            <a:avLst/>
+          </a:prstGeom>
+          <a:solidFill>
+            <a:schemeClr val="accent2">
+              <a:lumMod val="40000"/>
+              <a:lumOff val="60000"/>
+            </a:schemeClr>
+          </a:solidFill>
+        </p:spPr>
+        <p:style>
+          <a:lnRef idx="2">
+            <a:schemeClr val="dk1"/>
+          </a:lnRef>
+          <a:fillRef idx="1">
+            <a:schemeClr val="lt1"/>
+          </a:fillRef>
+          <a:effectRef idx="0">
+            <a:schemeClr val="dk1"/>
+          </a:effectRef>
+          <a:fontRef idx="minor">
+            <a:schemeClr val="dk1"/>
+          </a:fontRef>
+        </p:style>
+        <p:txBody>
+          <a:bodyPr rtlCol="0" anchor="ctr"/>
+          <a:lstStyle/>
+          <a:p>
+            <a:pPr algn="ctr"/>
+            <a:r>
+              <a:rPr lang="nl-NL" noProof="0" dirty="0"/>
+              <a:t>C</a:t>
+            </a:r>
+          </a:p>
+        </p:txBody>
+      </p:sp>
+      <p:sp>
+        <p:nvSpPr>
+          <p:cNvPr id="4" name="Oval 3">
+            <a:extLst>
+              <a:ext uri="{FF2B5EF4-FFF2-40B4-BE49-F238E27FC236}">
+                <a16:creationId xmlns:a16="http://schemas.microsoft.com/office/drawing/2014/main" id="{27E8B471-6A2A-F074-D18E-B819E257BB97}"/>
+              </a:ext>
+            </a:extLst>
+          </p:cNvPr>
+          <p:cNvSpPr/>
+          <p:nvPr/>
+        </p:nvSpPr>
+        <p:spPr>
+          <a:xfrm>
+            <a:off x="7152598" y="3770569"/>
+            <a:ext cx="323160" cy="322207"/>
+          </a:xfrm>
+          <a:prstGeom prst="ellipse">
+            <a:avLst/>
+          </a:prstGeom>
+          <a:solidFill>
+            <a:schemeClr val="accent2">
+              <a:lumMod val="40000"/>
+              <a:lumOff val="60000"/>
+            </a:schemeClr>
+          </a:solidFill>
+        </p:spPr>
+        <p:style>
+          <a:lnRef idx="2">
+            <a:schemeClr val="dk1"/>
+          </a:lnRef>
+          <a:fillRef idx="1">
+            <a:schemeClr val="lt1"/>
+          </a:fillRef>
+          <a:effectRef idx="0">
+            <a:schemeClr val="dk1"/>
+          </a:effectRef>
+          <a:fontRef idx="minor">
+            <a:schemeClr val="dk1"/>
+          </a:fontRef>
+        </p:style>
+        <p:txBody>
+          <a:bodyPr rtlCol="0" anchor="ctr"/>
+          <a:lstStyle/>
+          <a:p>
+            <a:pPr algn="ctr"/>
+            <a:r>
+              <a:rPr lang="nl-NL" noProof="0" dirty="0"/>
+              <a:t>M</a:t>
+            </a:r>
+          </a:p>
+        </p:txBody>
+      </p:sp>
+      <p:sp>
+        <p:nvSpPr>
+          <p:cNvPr id="6" name="Oval 5">
+            <a:extLst>
+              <a:ext uri="{FF2B5EF4-FFF2-40B4-BE49-F238E27FC236}">
+                <a16:creationId xmlns:a16="http://schemas.microsoft.com/office/drawing/2014/main" id="{5D78CD22-FB42-7784-D588-9F3B641C5818}"/>
+              </a:ext>
+            </a:extLst>
+          </p:cNvPr>
+          <p:cNvSpPr/>
+          <p:nvPr/>
+        </p:nvSpPr>
+        <p:spPr>
+          <a:xfrm>
+            <a:off x="8184230" y="2604119"/>
+            <a:ext cx="323160" cy="322207"/>
+          </a:xfrm>
+          <a:prstGeom prst="ellipse">
+            <a:avLst/>
+          </a:prstGeom>
+          <a:solidFill>
+            <a:schemeClr val="accent5">
+              <a:lumMod val="40000"/>
+              <a:lumOff val="60000"/>
+            </a:schemeClr>
+          </a:solidFill>
+        </p:spPr>
+        <p:style>
+          <a:lnRef idx="2">
+            <a:schemeClr val="dk1"/>
+          </a:lnRef>
+          <a:fillRef idx="1">
+            <a:schemeClr val="lt1"/>
+          </a:fillRef>
+          <a:effectRef idx="0">
+            <a:schemeClr val="dk1"/>
+          </a:effectRef>
+          <a:fontRef idx="minor">
+            <a:schemeClr val="dk1"/>
+          </a:fontRef>
+        </p:style>
+        <p:txBody>
+          <a:bodyPr rtlCol="0" anchor="ctr"/>
+          <a:lstStyle/>
+          <a:p>
+            <a:pPr algn="ctr"/>
+            <a:r>
+              <a:rPr lang="nl-NL" noProof="0" dirty="0"/>
+              <a:t>M</a:t>
+            </a:r>
+          </a:p>
+        </p:txBody>
+      </p:sp>
+      <p:sp>
+        <p:nvSpPr>
+          <p:cNvPr id="22" name="Oval 21">
+            <a:extLst>
+              <a:ext uri="{FF2B5EF4-FFF2-40B4-BE49-F238E27FC236}">
+                <a16:creationId xmlns:a16="http://schemas.microsoft.com/office/drawing/2014/main" id="{89905D22-E3F8-7C30-852C-46599318AAB3}"/>
+              </a:ext>
+            </a:extLst>
+          </p:cNvPr>
+          <p:cNvSpPr/>
+          <p:nvPr/>
+        </p:nvSpPr>
+        <p:spPr>
+          <a:xfrm>
+            <a:off x="3916922" y="2604120"/>
+            <a:ext cx="323160" cy="322207"/>
+          </a:xfrm>
+          <a:prstGeom prst="ellipse">
+            <a:avLst/>
+          </a:prstGeom>
+          <a:solidFill>
+            <a:schemeClr val="accent5">
+              <a:lumMod val="40000"/>
+              <a:lumOff val="60000"/>
+            </a:schemeClr>
+          </a:solidFill>
+        </p:spPr>
+        <p:style>
+          <a:lnRef idx="2">
+            <a:schemeClr val="dk1"/>
+          </a:lnRef>
+          <a:fillRef idx="1">
+            <a:schemeClr val="lt1"/>
+          </a:fillRef>
+          <a:effectRef idx="0">
+            <a:schemeClr val="dk1"/>
+          </a:effectRef>
+          <a:fontRef idx="minor">
+            <a:schemeClr val="dk1"/>
+          </a:fontRef>
+        </p:style>
+        <p:txBody>
+          <a:bodyPr rtlCol="0" anchor="ctr"/>
+          <a:lstStyle/>
+          <a:p>
+            <a:pPr algn="ctr"/>
+            <a:r>
+              <a:rPr lang="nl-NL" dirty="0"/>
+              <a:t>C</a:t>
+            </a:r>
             <a:endParaRPr lang="nl-NL" noProof="0" dirty="0"/>
+          </a:p>
+        </p:txBody>
+      </p:sp>
+      <p:sp>
+        <p:nvSpPr>
+          <p:cNvPr id="26" name="Oval 25">
+            <a:extLst>
+              <a:ext uri="{FF2B5EF4-FFF2-40B4-BE49-F238E27FC236}">
+                <a16:creationId xmlns:a16="http://schemas.microsoft.com/office/drawing/2014/main" id="{7E022C6A-45F4-18BF-C81A-B0E106F6C423}"/>
+              </a:ext>
+            </a:extLst>
+          </p:cNvPr>
+          <p:cNvSpPr/>
+          <p:nvPr/>
+        </p:nvSpPr>
+        <p:spPr>
+          <a:xfrm>
+            <a:off x="5357970" y="2604119"/>
+            <a:ext cx="323160" cy="322207"/>
+          </a:xfrm>
+          <a:prstGeom prst="ellipse">
+            <a:avLst/>
+          </a:prstGeom>
+          <a:solidFill>
+            <a:schemeClr val="accent5">
+              <a:lumMod val="40000"/>
+              <a:lumOff val="60000"/>
+            </a:schemeClr>
+          </a:solidFill>
+        </p:spPr>
+        <p:style>
+          <a:lnRef idx="2">
+            <a:schemeClr val="dk1"/>
+          </a:lnRef>
+          <a:fillRef idx="1">
+            <a:schemeClr val="lt1"/>
+          </a:fillRef>
+          <a:effectRef idx="0">
+            <a:schemeClr val="dk1"/>
+          </a:effectRef>
+          <a:fontRef idx="minor">
+            <a:schemeClr val="dk1"/>
+          </a:fontRef>
+        </p:style>
+        <p:txBody>
+          <a:bodyPr rtlCol="0" anchor="ctr"/>
+          <a:lstStyle/>
+          <a:p>
+            <a:pPr algn="ctr"/>
+            <a:r>
+              <a:rPr lang="nl-NL" dirty="0"/>
+              <a:t>C</a:t>
+            </a:r>
+            <a:endParaRPr lang="nl-NL" noProof="0" dirty="0"/>
+          </a:p>
+        </p:txBody>
+      </p:sp>
+      <p:cxnSp>
+        <p:nvCxnSpPr>
+          <p:cNvPr id="36" name="Connector: Elbow 35">
+            <a:extLst>
+              <a:ext uri="{FF2B5EF4-FFF2-40B4-BE49-F238E27FC236}">
+                <a16:creationId xmlns:a16="http://schemas.microsoft.com/office/drawing/2014/main" id="{E4B06D45-B7B7-4E5F-B3F9-300038C7F692}"/>
+              </a:ext>
+            </a:extLst>
+          </p:cNvPr>
+          <p:cNvCxnSpPr>
+            <a:cxnSpLocks/>
+            <a:stCxn id="19" idx="4"/>
+            <a:endCxn id="3" idx="2"/>
+          </p:cNvCxnSpPr>
+          <p:nvPr/>
+        </p:nvCxnSpPr>
+        <p:spPr>
+          <a:xfrm rot="16200000" flipH="1">
+            <a:off x="3022223" y="2859572"/>
+            <a:ext cx="1005345" cy="1138857"/>
+          </a:xfrm>
+          <a:prstGeom prst="bentConnector2">
+            <a:avLst/>
+          </a:prstGeom>
+          <a:ln>
+            <a:tailEnd type="triangle"/>
+          </a:ln>
+        </p:spPr>
+        <p:style>
+          <a:lnRef idx="2">
+            <a:schemeClr val="accent2"/>
+          </a:lnRef>
+          <a:fillRef idx="0">
+            <a:schemeClr val="accent2"/>
+          </a:fillRef>
+          <a:effectRef idx="1">
+            <a:schemeClr val="accent2"/>
+          </a:effectRef>
+          <a:fontRef idx="minor">
+            <a:schemeClr val="tx1"/>
+          </a:fontRef>
+        </p:style>
+      </p:cxnSp>
+      <p:cxnSp>
+        <p:nvCxnSpPr>
+          <p:cNvPr id="40" name="Straight Connector 39">
+            <a:extLst>
+              <a:ext uri="{FF2B5EF4-FFF2-40B4-BE49-F238E27FC236}">
+                <a16:creationId xmlns:a16="http://schemas.microsoft.com/office/drawing/2014/main" id="{4F7FBA3B-F6B9-0FEA-17A8-1B8BB3073436}"/>
+              </a:ext>
+            </a:extLst>
+          </p:cNvPr>
+          <p:cNvCxnSpPr>
+            <a:stCxn id="3" idx="6"/>
+            <a:endCxn id="23" idx="2"/>
+          </p:cNvCxnSpPr>
+          <p:nvPr/>
+        </p:nvCxnSpPr>
+        <p:spPr>
+          <a:xfrm>
+            <a:off x="4417484" y="3931674"/>
+            <a:ext cx="1270550" cy="0"/>
+          </a:xfrm>
+          <a:prstGeom prst="line">
+            <a:avLst/>
+          </a:prstGeom>
+        </p:spPr>
+        <p:style>
+          <a:lnRef idx="2">
+            <a:schemeClr val="accent2"/>
+          </a:lnRef>
+          <a:fillRef idx="0">
+            <a:schemeClr val="accent2"/>
+          </a:fillRef>
+          <a:effectRef idx="1">
+            <a:schemeClr val="accent2"/>
+          </a:effectRef>
+          <a:fontRef idx="minor">
+            <a:schemeClr val="tx1"/>
+          </a:fontRef>
+        </p:style>
+      </p:cxnSp>
+      <p:cxnSp>
+        <p:nvCxnSpPr>
+          <p:cNvPr id="43" name="Straight Connector 42">
+            <a:extLst>
+              <a:ext uri="{FF2B5EF4-FFF2-40B4-BE49-F238E27FC236}">
+                <a16:creationId xmlns:a16="http://schemas.microsoft.com/office/drawing/2014/main" id="{DDA6B047-4AF4-D096-084F-BBD6120041C5}"/>
+              </a:ext>
+            </a:extLst>
+          </p:cNvPr>
+          <p:cNvCxnSpPr>
+            <a:stCxn id="23" idx="6"/>
+            <a:endCxn id="4" idx="2"/>
+          </p:cNvCxnSpPr>
+          <p:nvPr/>
+        </p:nvCxnSpPr>
+        <p:spPr>
+          <a:xfrm flipV="1">
+            <a:off x="6011194" y="3931673"/>
+            <a:ext cx="1141404" cy="1"/>
+          </a:xfrm>
+          <a:prstGeom prst="line">
+            <a:avLst/>
+          </a:prstGeom>
+        </p:spPr>
+        <p:style>
+          <a:lnRef idx="2">
+            <a:schemeClr val="accent2"/>
+          </a:lnRef>
+          <a:fillRef idx="0">
+            <a:schemeClr val="accent2"/>
+          </a:fillRef>
+          <a:effectRef idx="1">
+            <a:schemeClr val="accent2"/>
+          </a:effectRef>
+          <a:fontRef idx="minor">
+            <a:schemeClr val="tx1"/>
+          </a:fontRef>
+        </p:style>
+      </p:cxnSp>
+      <p:cxnSp>
+        <p:nvCxnSpPr>
+          <p:cNvPr id="45" name="Connector: Elbow 44">
+            <a:extLst>
+              <a:ext uri="{FF2B5EF4-FFF2-40B4-BE49-F238E27FC236}">
+                <a16:creationId xmlns:a16="http://schemas.microsoft.com/office/drawing/2014/main" id="{9BF25879-0870-83BF-B0BC-56B677B5D5CC}"/>
+              </a:ext>
+            </a:extLst>
+          </p:cNvPr>
+          <p:cNvCxnSpPr>
+            <a:stCxn id="4" idx="6"/>
+            <a:endCxn id="6" idx="4"/>
+          </p:cNvCxnSpPr>
+          <p:nvPr/>
+        </p:nvCxnSpPr>
+        <p:spPr>
+          <a:xfrm flipV="1">
+            <a:off x="7475758" y="2926326"/>
+            <a:ext cx="870052" cy="1005347"/>
+          </a:xfrm>
+          <a:prstGeom prst="bentConnector2">
+            <a:avLst/>
+          </a:prstGeom>
+          <a:ln>
+            <a:tailEnd type="triangle"/>
+          </a:ln>
+        </p:spPr>
+        <p:style>
+          <a:lnRef idx="2">
+            <a:schemeClr val="accent2"/>
+          </a:lnRef>
+          <a:fillRef idx="0">
+            <a:schemeClr val="accent2"/>
+          </a:fillRef>
+          <a:effectRef idx="1">
+            <a:schemeClr val="accent2"/>
+          </a:effectRef>
+          <a:fontRef idx="minor">
+            <a:schemeClr val="tx1"/>
+          </a:fontRef>
+        </p:style>
+      </p:cxnSp>
+      <p:sp>
+        <p:nvSpPr>
+          <p:cNvPr id="50" name="TextBox 49">
+            <a:extLst>
+              <a:ext uri="{FF2B5EF4-FFF2-40B4-BE49-F238E27FC236}">
+                <a16:creationId xmlns:a16="http://schemas.microsoft.com/office/drawing/2014/main" id="{CD6FDCEA-F982-C7E6-273A-D72A88063D8C}"/>
+              </a:ext>
+            </a:extLst>
+          </p:cNvPr>
+          <p:cNvSpPr txBox="1"/>
+          <p:nvPr/>
+        </p:nvSpPr>
+        <p:spPr>
+          <a:xfrm>
+            <a:off x="8363879" y="3140831"/>
+            <a:ext cx="1516825" cy="369332"/>
+          </a:xfrm>
+          <a:prstGeom prst="rect">
+            <a:avLst/>
+          </a:prstGeom>
+          <a:noFill/>
+        </p:spPr>
+        <p:txBody>
+          <a:bodyPr wrap="none" rtlCol="0">
+            <a:spAutoFit/>
+          </a:bodyPr>
+          <a:lstStyle/>
+          <a:p>
+            <a:r>
+              <a:rPr lang="nl-NL" dirty="0" err="1"/>
+              <a:t>merge</a:t>
+            </a:r>
+            <a:r>
+              <a:rPr lang="nl-NL" dirty="0"/>
+              <a:t> feature</a:t>
+            </a:r>
           </a:p>
         </p:txBody>
       </p:sp>
     </p:spTree>
     <p:extLst>
       <p:ext uri="{BB962C8B-B14F-4D97-AF65-F5344CB8AC3E}">
-        <p14:creationId xmlns:p14="http://schemas.microsoft.com/office/powerpoint/2010/main" val="2647715182"/>
+        <p14:creationId xmlns:p14="http://schemas.microsoft.com/office/powerpoint/2010/main" val="760393835"/>
       </p:ext>
     </p:extLst>
   </p:cSld>
@@ -50124,14 +50969,14 @@
 </file>
 
 <file path=ppt/slides/slide69.xml><?xml version="1.0" encoding="utf-8"?>
-<p:sld xmlns:a="http://schemas.openxmlformats.org/drawingml/2006/main" xmlns:r="http://schemas.openxmlformats.org/officeDocument/2006/relationships" xmlns:p="http://schemas.openxmlformats.org/presentationml/2006/main" show="0">
+<p:sld xmlns:a="http://schemas.openxmlformats.org/drawingml/2006/main" xmlns:r="http://schemas.openxmlformats.org/officeDocument/2006/relationships" xmlns:p="http://schemas.openxmlformats.org/presentationml/2006/main">
   <p:cSld>
     <p:spTree>
       <p:nvGrpSpPr>
         <p:cNvPr id="1" name="">
           <a:extLst>
             <a:ext uri="{FF2B5EF4-FFF2-40B4-BE49-F238E27FC236}">
-              <a16:creationId xmlns:a16="http://schemas.microsoft.com/office/drawing/2014/main" id="{D1FC3A8E-AF03-D3BD-C11D-DE29C79BA4D2}"/>
+              <a16:creationId xmlns:a16="http://schemas.microsoft.com/office/drawing/2014/main" id="{63A361C9-D5AC-5C2A-C8E0-254CB1B1223F}"/>
             </a:ext>
           </a:extLst>
         </p:cNvPr>
@@ -50146,12 +50991,53 @@
           <a:chExt cx="0" cy="0"/>
         </a:xfrm>
       </p:grpSpPr>
+      <p:cxnSp>
+        <p:nvCxnSpPr>
+          <p:cNvPr id="16" name="Straight Arrow Connector 15">
+            <a:extLst>
+              <a:ext uri="{FF2B5EF4-FFF2-40B4-BE49-F238E27FC236}">
+                <a16:creationId xmlns:a16="http://schemas.microsoft.com/office/drawing/2014/main" id="{547B71F0-6C98-B613-24A1-C098ED063701}"/>
+              </a:ext>
+            </a:extLst>
+          </p:cNvPr>
+          <p:cNvCxnSpPr>
+            <a:cxnSpLocks/>
+          </p:cNvCxnSpPr>
+          <p:nvPr/>
+        </p:nvCxnSpPr>
+        <p:spPr>
+          <a:xfrm>
+            <a:off x="1744394" y="2758192"/>
+            <a:ext cx="8088437" cy="5808"/>
+          </a:xfrm>
+          <a:prstGeom prst="straightConnector1">
+            <a:avLst/>
+          </a:prstGeom>
+          <a:ln>
+            <a:tailEnd type="triangle"/>
+          </a:ln>
+        </p:spPr>
+        <p:style>
+          <a:lnRef idx="2">
+            <a:schemeClr val="dk1"/>
+          </a:lnRef>
+          <a:fillRef idx="0">
+            <a:schemeClr val="dk1"/>
+          </a:fillRef>
+          <a:effectRef idx="1">
+            <a:schemeClr val="dk1"/>
+          </a:effectRef>
+          <a:fontRef idx="minor">
+            <a:schemeClr val="tx1"/>
+          </a:fontRef>
+        </p:style>
+      </p:cxnSp>
       <p:sp>
         <p:nvSpPr>
           <p:cNvPr id="2" name="Title 1">
             <a:extLst>
               <a:ext uri="{FF2B5EF4-FFF2-40B4-BE49-F238E27FC236}">
-                <a16:creationId xmlns:a16="http://schemas.microsoft.com/office/drawing/2014/main" id="{15A16D41-5602-4F88-B5AF-67584E1AC4EE}"/>
+                <a16:creationId xmlns:a16="http://schemas.microsoft.com/office/drawing/2014/main" id="{DFFA58BC-FF87-5B67-2AF7-D681B62D4D7C}"/>
               </a:ext>
             </a:extLst>
           </p:cNvPr>
@@ -50175,16 +51061,8 @@
           <a:lstStyle/>
           <a:p>
             <a:r>
-              <a:rPr lang="nl-NL" sz="3600" noProof="0" dirty="0" err="1"/>
-              <a:t>Repo</a:t>
-            </a:r>
-            <a:r>
-              <a:rPr lang="nl-NL" sz="3600" noProof="0" dirty="0"/>
-              <a:t> maken &amp; </a:t>
-            </a:r>
-            <a:r>
-              <a:rPr lang="nl-NL" sz="3600" noProof="0" dirty="0" err="1"/>
-              <a:t>committen</a:t>
+              <a:rPr lang="nl-NL" sz="3600" dirty="0"/>
+              <a:t>Waar los je conflicten op?</a:t>
             </a:r>
             <a:endParaRPr lang="nl-NL" sz="3600" noProof="0" dirty="0"/>
           </a:p>
@@ -50192,270 +51070,795 @@
       </p:sp>
       <p:sp>
         <p:nvSpPr>
-          <p:cNvPr id="9" name="Content Placeholder 2">
-            <a:extLst>
-              <a:ext uri="{FF2B5EF4-FFF2-40B4-BE49-F238E27FC236}">
-                <a16:creationId xmlns:a16="http://schemas.microsoft.com/office/drawing/2014/main" id="{16A062CA-3D31-FB0E-8FEF-BF44ED8BA95E}"/>
-              </a:ext>
-            </a:extLst>
-          </p:cNvPr>
-          <p:cNvSpPr>
-            <a:spLocks noGrp="1"/>
-          </p:cNvSpPr>
-          <p:nvPr>
-            <p:ph idx="1"/>
-          </p:nvPr>
+          <p:cNvPr id="9" name="TextBox 8">
+            <a:extLst>
+              <a:ext uri="{FF2B5EF4-FFF2-40B4-BE49-F238E27FC236}">
+                <a16:creationId xmlns:a16="http://schemas.microsoft.com/office/drawing/2014/main" id="{6F2B2166-7D13-1FD9-97B2-3E43052E46A9}"/>
+              </a:ext>
+            </a:extLst>
+          </p:cNvPr>
+          <p:cNvSpPr txBox="1"/>
+          <p:nvPr/>
         </p:nvSpPr>
         <p:spPr>
           <a:xfrm>
-            <a:off x="838200" y="1456267"/>
-            <a:ext cx="5520398" cy="4720696"/>
+            <a:off x="5030775" y="1995858"/>
+            <a:ext cx="934679" cy="369332"/>
           </a:xfrm>
+          <a:prstGeom prst="rect">
+            <a:avLst/>
+          </a:prstGeom>
+          <a:noFill/>
         </p:spPr>
         <p:txBody>
-          <a:bodyPr>
-            <a:normAutofit lnSpcReduction="10000"/>
+          <a:bodyPr wrap="none" rtlCol="0">
+            <a:spAutoFit/>
           </a:bodyPr>
           <a:lstStyle/>
           <a:p>
-            <a:pPr marL="0" indent="0">
-              <a:buNone/>
-            </a:pPr>
-            <a:r>
-              <a:rPr lang="nl-NL" sz="1800" noProof="0" dirty="0">
-                <a:cs typeface="Courier New" panose="02070309020205020404" pitchFamily="49" charset="0"/>
-              </a:rPr>
-              <a:t>Nieuw lokaal </a:t>
-            </a:r>
-            <a:r>
-              <a:rPr lang="nl-NL" sz="1800" noProof="0" dirty="0" err="1">
-                <a:cs typeface="Courier New" panose="02070309020205020404" pitchFamily="49" charset="0"/>
-              </a:rPr>
-              <a:t>repo</a:t>
-            </a:r>
-            <a:r>
-              <a:rPr lang="nl-NL" sz="1800" noProof="0" dirty="0">
-                <a:cs typeface="Courier New" panose="02070309020205020404" pitchFamily="49" charset="0"/>
-              </a:rPr>
-              <a:t> aanmaken:</a:t>
-            </a:r>
-          </a:p>
-          <a:p>
-            <a:pPr marL="0" indent="0">
-              <a:buNone/>
-            </a:pPr>
-            <a:r>
-              <a:rPr lang="nl-NL" sz="1800" noProof="0" dirty="0">
-                <a:latin typeface="Courier New" panose="02070309020205020404" pitchFamily="49" charset="0"/>
-                <a:cs typeface="Courier New" panose="02070309020205020404" pitchFamily="49" charset="0"/>
-              </a:rPr>
-              <a:t>git </a:t>
-            </a:r>
-            <a:r>
-              <a:rPr lang="nl-NL" sz="1800" noProof="0" dirty="0" err="1">
-                <a:latin typeface="Courier New" panose="02070309020205020404" pitchFamily="49" charset="0"/>
-                <a:cs typeface="Courier New" panose="02070309020205020404" pitchFamily="49" charset="0"/>
-              </a:rPr>
-              <a:t>init</a:t>
-            </a:r>
-            <a:endParaRPr lang="nl-NL" sz="1800" noProof="0" dirty="0">
-              <a:latin typeface="Courier New" panose="02070309020205020404" pitchFamily="49" charset="0"/>
-              <a:cs typeface="Courier New" panose="02070309020205020404" pitchFamily="49" charset="0"/>
-            </a:endParaRPr>
-          </a:p>
-          <a:p>
-            <a:pPr marL="0" indent="0">
-              <a:buNone/>
-            </a:pPr>
-            <a:endParaRPr lang="nl-NL" sz="1800" noProof="0" dirty="0">
-              <a:cs typeface="Courier New" panose="02070309020205020404" pitchFamily="49" charset="0"/>
-            </a:endParaRPr>
-          </a:p>
-          <a:p>
-            <a:pPr marL="0" indent="0">
-              <a:buNone/>
-            </a:pPr>
-            <a:r>
-              <a:rPr lang="nl-NL" sz="1800" noProof="0" dirty="0">
-                <a:cs typeface="Courier New" panose="02070309020205020404" pitchFamily="49" charset="0"/>
-              </a:rPr>
-              <a:t>Wijzigingen toevoegen aan de index:</a:t>
-            </a:r>
-          </a:p>
-          <a:p>
-            <a:pPr marL="0" indent="0">
-              <a:buNone/>
-            </a:pPr>
-            <a:r>
-              <a:rPr lang="nl-NL" sz="1800" noProof="0" dirty="0">
-                <a:latin typeface="Courier New" panose="02070309020205020404" pitchFamily="49" charset="0"/>
-                <a:cs typeface="Courier New" panose="02070309020205020404" pitchFamily="49" charset="0"/>
-              </a:rPr>
-              <a:t>git </a:t>
-            </a:r>
-            <a:r>
-              <a:rPr lang="nl-NL" sz="1800" noProof="0" dirty="0" err="1">
-                <a:latin typeface="Courier New" panose="02070309020205020404" pitchFamily="49" charset="0"/>
-                <a:cs typeface="Courier New" panose="02070309020205020404" pitchFamily="49" charset="0"/>
-              </a:rPr>
-              <a:t>add</a:t>
-            </a:r>
-            <a:r>
-              <a:rPr lang="nl-NL" sz="1800" noProof="0" dirty="0">
-                <a:latin typeface="Courier New" panose="02070309020205020404" pitchFamily="49" charset="0"/>
-                <a:cs typeface="Courier New" panose="02070309020205020404" pitchFamily="49" charset="0"/>
-              </a:rPr>
-              <a:t> -A</a:t>
-            </a:r>
-          </a:p>
-          <a:p>
-            <a:pPr marL="0" indent="0">
-              <a:buNone/>
-            </a:pPr>
-            <a:r>
-              <a:rPr lang="nl-NL" sz="1800" noProof="0" dirty="0">
-                <a:latin typeface="Courier New" panose="02070309020205020404" pitchFamily="49" charset="0"/>
-                <a:cs typeface="Courier New" panose="02070309020205020404" pitchFamily="49" charset="0"/>
-              </a:rPr>
-              <a:t>git </a:t>
-            </a:r>
-            <a:r>
-              <a:rPr lang="nl-NL" sz="1800" noProof="0" dirty="0" err="1">
-                <a:latin typeface="Courier New" panose="02070309020205020404" pitchFamily="49" charset="0"/>
-                <a:cs typeface="Courier New" panose="02070309020205020404" pitchFamily="49" charset="0"/>
-              </a:rPr>
-              <a:t>add</a:t>
-            </a:r>
-            <a:r>
-              <a:rPr lang="nl-NL" sz="1800" noProof="0" dirty="0">
-                <a:latin typeface="Courier New" panose="02070309020205020404" pitchFamily="49" charset="0"/>
-                <a:cs typeface="Courier New" panose="02070309020205020404" pitchFamily="49" charset="0"/>
-              </a:rPr>
-              <a:t> &lt;file&gt;</a:t>
-            </a:r>
-          </a:p>
-          <a:p>
-            <a:pPr marL="0" indent="0">
-              <a:buNone/>
-            </a:pPr>
-            <a:endParaRPr lang="nl-NL" sz="1800" noProof="0" dirty="0">
-              <a:cs typeface="Courier New" panose="02070309020205020404" pitchFamily="49" charset="0"/>
-            </a:endParaRPr>
-          </a:p>
-          <a:p>
-            <a:pPr marL="0" indent="0">
-              <a:buNone/>
-            </a:pPr>
-            <a:r>
-              <a:rPr lang="nl-NL" sz="1800" noProof="0" dirty="0">
-                <a:cs typeface="Courier New" panose="02070309020205020404" pitchFamily="49" charset="0"/>
-              </a:rPr>
-              <a:t>Wijzigingen weghalen uit de index:</a:t>
-            </a:r>
-          </a:p>
-          <a:p>
-            <a:pPr marL="0" indent="0">
-              <a:buNone/>
-            </a:pPr>
-            <a:r>
-              <a:rPr lang="nl-NL" sz="1800" noProof="0" dirty="0">
-                <a:latin typeface="Courier New" panose="02070309020205020404" pitchFamily="49" charset="0"/>
-                <a:cs typeface="Courier New" panose="02070309020205020404" pitchFamily="49" charset="0"/>
-              </a:rPr>
-              <a:t>git reset</a:t>
-            </a:r>
-          </a:p>
-          <a:p>
-            <a:pPr marL="0" indent="0">
-              <a:buNone/>
-            </a:pPr>
-            <a:r>
-              <a:rPr lang="nl-NL" sz="1800" noProof="0" dirty="0">
-                <a:latin typeface="Courier New" panose="02070309020205020404" pitchFamily="49" charset="0"/>
-                <a:cs typeface="Courier New" panose="02070309020205020404" pitchFamily="49" charset="0"/>
-              </a:rPr>
-              <a:t>git reset &lt;file&gt;</a:t>
-            </a:r>
-          </a:p>
-          <a:p>
-            <a:pPr marL="0" indent="0">
-              <a:buNone/>
-            </a:pPr>
-            <a:endParaRPr lang="nl-NL" sz="1800" noProof="0" dirty="0">
-              <a:cs typeface="Courier New" panose="02070309020205020404" pitchFamily="49" charset="0"/>
-            </a:endParaRPr>
-          </a:p>
-          <a:p>
-            <a:pPr marL="0" indent="0">
-              <a:buNone/>
-            </a:pPr>
-            <a:r>
-              <a:rPr lang="nl-NL" sz="1800" noProof="0" dirty="0">
-                <a:cs typeface="Courier New" panose="02070309020205020404" pitchFamily="49" charset="0"/>
-              </a:rPr>
-              <a:t>Wijzigingen opslaan in repository:</a:t>
-            </a:r>
-          </a:p>
-          <a:p>
-            <a:pPr marL="0" indent="0">
-              <a:buNone/>
-            </a:pPr>
-            <a:r>
-              <a:rPr lang="nl-NL" sz="1800" noProof="0" dirty="0">
-                <a:latin typeface="Courier New" panose="02070309020205020404" pitchFamily="49" charset="0"/>
-                <a:cs typeface="Courier New" panose="02070309020205020404" pitchFamily="49" charset="0"/>
-              </a:rPr>
-              <a:t>git </a:t>
-            </a:r>
-            <a:r>
-              <a:rPr lang="nl-NL" sz="1800" noProof="0" dirty="0" err="1">
-                <a:latin typeface="Courier New" panose="02070309020205020404" pitchFamily="49" charset="0"/>
-                <a:cs typeface="Courier New" panose="02070309020205020404" pitchFamily="49" charset="0"/>
-              </a:rPr>
-              <a:t>commit</a:t>
-            </a:r>
-            <a:r>
-              <a:rPr lang="nl-NL" sz="1800" noProof="0" dirty="0">
-                <a:latin typeface="Courier New" panose="02070309020205020404" pitchFamily="49" charset="0"/>
-                <a:cs typeface="Courier New" panose="02070309020205020404" pitchFamily="49" charset="0"/>
-              </a:rPr>
-              <a:t> –m "</a:t>
-            </a:r>
-            <a:r>
-              <a:rPr lang="nl-NL" sz="1800" noProof="0" dirty="0" err="1">
-                <a:latin typeface="Courier New" panose="02070309020205020404" pitchFamily="49" charset="0"/>
-                <a:cs typeface="Courier New" panose="02070309020205020404" pitchFamily="49" charset="0"/>
-              </a:rPr>
-              <a:t>Descriptive</a:t>
-            </a:r>
-            <a:r>
-              <a:rPr lang="nl-NL" sz="1800" noProof="0" dirty="0">
-                <a:latin typeface="Courier New" panose="02070309020205020404" pitchFamily="49" charset="0"/>
-                <a:cs typeface="Courier New" panose="02070309020205020404" pitchFamily="49" charset="0"/>
-              </a:rPr>
+            <a:r>
+              <a:rPr lang="nl-NL" noProof="0" dirty="0" err="1"/>
+              <a:t>develop</a:t>
+            </a:r>
+            <a:endParaRPr lang="nl-NL" noProof="0" dirty="0"/>
+          </a:p>
+        </p:txBody>
+      </p:sp>
+      <p:sp>
+        <p:nvSpPr>
+          <p:cNvPr id="19" name="Oval 18">
+            <a:extLst>
+              <a:ext uri="{FF2B5EF4-FFF2-40B4-BE49-F238E27FC236}">
+                <a16:creationId xmlns:a16="http://schemas.microsoft.com/office/drawing/2014/main" id="{1416188E-F9D0-AA14-A9D0-2FA89D738DC0}"/>
+              </a:ext>
+            </a:extLst>
+          </p:cNvPr>
+          <p:cNvSpPr/>
+          <p:nvPr/>
+        </p:nvSpPr>
+        <p:spPr>
+          <a:xfrm>
+            <a:off x="2793887" y="2604122"/>
+            <a:ext cx="323160" cy="322207"/>
+          </a:xfrm>
+          <a:prstGeom prst="ellipse">
+            <a:avLst/>
+          </a:prstGeom>
+          <a:solidFill>
+            <a:schemeClr val="accent5">
+              <a:lumMod val="40000"/>
+              <a:lumOff val="60000"/>
+            </a:schemeClr>
+          </a:solidFill>
+        </p:spPr>
+        <p:style>
+          <a:lnRef idx="2">
+            <a:schemeClr val="dk1"/>
+          </a:lnRef>
+          <a:fillRef idx="1">
+            <a:schemeClr val="lt1"/>
+          </a:fillRef>
+          <a:effectRef idx="0">
+            <a:schemeClr val="dk1"/>
+          </a:effectRef>
+          <a:fontRef idx="minor">
+            <a:schemeClr val="dk1"/>
+          </a:fontRef>
+        </p:style>
+        <p:txBody>
+          <a:bodyPr rtlCol="0" anchor="ctr"/>
+          <a:lstStyle/>
+          <a:p>
+            <a:pPr algn="ctr"/>
+            <a:r>
+              <a:rPr lang="nl-NL" dirty="0"/>
+              <a:t>C</a:t>
+            </a:r>
+            <a:endParaRPr lang="nl-NL" noProof="0" dirty="0"/>
+          </a:p>
+        </p:txBody>
+      </p:sp>
+      <p:sp>
+        <p:nvSpPr>
+          <p:cNvPr id="23" name="Oval 22">
+            <a:extLst>
+              <a:ext uri="{FF2B5EF4-FFF2-40B4-BE49-F238E27FC236}">
+                <a16:creationId xmlns:a16="http://schemas.microsoft.com/office/drawing/2014/main" id="{BBD538A0-AD3D-1255-021F-BBB4192F08BA}"/>
+              </a:ext>
+            </a:extLst>
+          </p:cNvPr>
+          <p:cNvSpPr/>
+          <p:nvPr/>
+        </p:nvSpPr>
+        <p:spPr>
+          <a:xfrm>
+            <a:off x="5688034" y="3770570"/>
+            <a:ext cx="323160" cy="322207"/>
+          </a:xfrm>
+          <a:prstGeom prst="ellipse">
+            <a:avLst/>
+          </a:prstGeom>
+          <a:solidFill>
+            <a:schemeClr val="accent2">
+              <a:lumMod val="40000"/>
+              <a:lumOff val="60000"/>
+            </a:schemeClr>
+          </a:solidFill>
+        </p:spPr>
+        <p:style>
+          <a:lnRef idx="2">
+            <a:schemeClr val="dk1"/>
+          </a:lnRef>
+          <a:fillRef idx="1">
+            <a:schemeClr val="lt1"/>
+          </a:fillRef>
+          <a:effectRef idx="0">
+            <a:schemeClr val="dk1"/>
+          </a:effectRef>
+          <a:fontRef idx="minor">
+            <a:schemeClr val="dk1"/>
+          </a:fontRef>
+        </p:style>
+        <p:txBody>
+          <a:bodyPr rtlCol="0" anchor="ctr"/>
+          <a:lstStyle/>
+          <a:p>
+            <a:pPr algn="ctr"/>
+            <a:r>
+              <a:rPr lang="nl-NL" noProof="0" dirty="0"/>
+              <a:t>C</a:t>
+            </a:r>
+          </a:p>
+        </p:txBody>
+      </p:sp>
+      <p:sp>
+        <p:nvSpPr>
+          <p:cNvPr id="27" name="TextBox 26">
+            <a:extLst>
+              <a:ext uri="{FF2B5EF4-FFF2-40B4-BE49-F238E27FC236}">
+                <a16:creationId xmlns:a16="http://schemas.microsoft.com/office/drawing/2014/main" id="{70D08205-0196-C492-F446-F0F97FB41CC5}"/>
+              </a:ext>
+            </a:extLst>
+          </p:cNvPr>
+          <p:cNvSpPr txBox="1"/>
+          <p:nvPr/>
+        </p:nvSpPr>
+        <p:spPr>
+          <a:xfrm>
+            <a:off x="4687038" y="4412762"/>
+            <a:ext cx="2001992" cy="369332"/>
+          </a:xfrm>
+          <a:prstGeom prst="rect">
+            <a:avLst/>
+          </a:prstGeom>
+          <a:noFill/>
+        </p:spPr>
+        <p:txBody>
+          <a:bodyPr wrap="square" rtlCol="0">
+            <a:spAutoFit/>
+          </a:bodyPr>
+          <a:lstStyle/>
+          <a:p>
+            <a:r>
+              <a:rPr lang="nl-NL" noProof="0" dirty="0"/>
+              <a:t>feature/unit-tests</a:t>
+            </a:r>
+          </a:p>
+        </p:txBody>
+      </p:sp>
+      <p:sp>
+        <p:nvSpPr>
+          <p:cNvPr id="3" name="Oval 2">
+            <a:extLst>
+              <a:ext uri="{FF2B5EF4-FFF2-40B4-BE49-F238E27FC236}">
+                <a16:creationId xmlns:a16="http://schemas.microsoft.com/office/drawing/2014/main" id="{950F5A03-0DAB-BE6D-BA77-06EF005F23D9}"/>
+              </a:ext>
+            </a:extLst>
+          </p:cNvPr>
+          <p:cNvSpPr/>
+          <p:nvPr/>
+        </p:nvSpPr>
+        <p:spPr>
+          <a:xfrm>
+            <a:off x="4094324" y="3770570"/>
+            <a:ext cx="323160" cy="322207"/>
+          </a:xfrm>
+          <a:prstGeom prst="ellipse">
+            <a:avLst/>
+          </a:prstGeom>
+          <a:solidFill>
+            <a:schemeClr val="accent2">
+              <a:lumMod val="40000"/>
+              <a:lumOff val="60000"/>
+            </a:schemeClr>
+          </a:solidFill>
+        </p:spPr>
+        <p:style>
+          <a:lnRef idx="2">
+            <a:schemeClr val="dk1"/>
+          </a:lnRef>
+          <a:fillRef idx="1">
+            <a:schemeClr val="lt1"/>
+          </a:fillRef>
+          <a:effectRef idx="0">
+            <a:schemeClr val="dk1"/>
+          </a:effectRef>
+          <a:fontRef idx="minor">
+            <a:schemeClr val="dk1"/>
+          </a:fontRef>
+        </p:style>
+        <p:txBody>
+          <a:bodyPr rtlCol="0" anchor="ctr"/>
+          <a:lstStyle/>
+          <a:p>
+            <a:pPr algn="ctr"/>
+            <a:r>
+              <a:rPr lang="nl-NL" noProof="0" dirty="0"/>
+              <a:t>C</a:t>
+            </a:r>
+          </a:p>
+        </p:txBody>
+      </p:sp>
+      <p:sp>
+        <p:nvSpPr>
+          <p:cNvPr id="4" name="Oval 3">
+            <a:extLst>
+              <a:ext uri="{FF2B5EF4-FFF2-40B4-BE49-F238E27FC236}">
+                <a16:creationId xmlns:a16="http://schemas.microsoft.com/office/drawing/2014/main" id="{2C695C64-ECAB-6400-9AEA-17C7B80803FA}"/>
+              </a:ext>
+            </a:extLst>
+          </p:cNvPr>
+          <p:cNvSpPr/>
+          <p:nvPr/>
+        </p:nvSpPr>
+        <p:spPr>
+          <a:xfrm>
+            <a:off x="7152598" y="3770569"/>
+            <a:ext cx="323160" cy="322207"/>
+          </a:xfrm>
+          <a:prstGeom prst="ellipse">
+            <a:avLst/>
+          </a:prstGeom>
+          <a:solidFill>
+            <a:schemeClr val="accent2">
+              <a:lumMod val="40000"/>
+              <a:lumOff val="60000"/>
+            </a:schemeClr>
+          </a:solidFill>
+        </p:spPr>
+        <p:style>
+          <a:lnRef idx="2">
+            <a:schemeClr val="dk1"/>
+          </a:lnRef>
+          <a:fillRef idx="1">
+            <a:schemeClr val="lt1"/>
+          </a:fillRef>
+          <a:effectRef idx="0">
+            <a:schemeClr val="dk1"/>
+          </a:effectRef>
+          <a:fontRef idx="minor">
+            <a:schemeClr val="dk1"/>
+          </a:fontRef>
+        </p:style>
+        <p:txBody>
+          <a:bodyPr rtlCol="0" anchor="ctr"/>
+          <a:lstStyle/>
+          <a:p>
+            <a:pPr algn="ctr"/>
+            <a:r>
+              <a:rPr lang="nl-NL" noProof="0" dirty="0"/>
+              <a:t>M</a:t>
+            </a:r>
+          </a:p>
+        </p:txBody>
+      </p:sp>
+      <p:sp>
+        <p:nvSpPr>
+          <p:cNvPr id="6" name="Oval 5">
+            <a:extLst>
+              <a:ext uri="{FF2B5EF4-FFF2-40B4-BE49-F238E27FC236}">
+                <a16:creationId xmlns:a16="http://schemas.microsoft.com/office/drawing/2014/main" id="{A5AB69B4-3F1B-3567-26EA-612D3BCE56BA}"/>
+              </a:ext>
+            </a:extLst>
+          </p:cNvPr>
+          <p:cNvSpPr/>
+          <p:nvPr/>
+        </p:nvSpPr>
+        <p:spPr>
+          <a:xfrm>
+            <a:off x="8184230" y="2604119"/>
+            <a:ext cx="323160" cy="322207"/>
+          </a:xfrm>
+          <a:prstGeom prst="ellipse">
+            <a:avLst/>
+          </a:prstGeom>
+          <a:solidFill>
+            <a:schemeClr val="accent5">
+              <a:lumMod val="40000"/>
+              <a:lumOff val="60000"/>
+            </a:schemeClr>
+          </a:solidFill>
+        </p:spPr>
+        <p:style>
+          <a:lnRef idx="2">
+            <a:schemeClr val="dk1"/>
+          </a:lnRef>
+          <a:fillRef idx="1">
+            <a:schemeClr val="lt1"/>
+          </a:fillRef>
+          <a:effectRef idx="0">
+            <a:schemeClr val="dk1"/>
+          </a:effectRef>
+          <a:fontRef idx="minor">
+            <a:schemeClr val="dk1"/>
+          </a:fontRef>
+        </p:style>
+        <p:txBody>
+          <a:bodyPr rtlCol="0" anchor="ctr"/>
+          <a:lstStyle/>
+          <a:p>
+            <a:pPr algn="ctr"/>
+            <a:r>
+              <a:rPr lang="nl-NL" noProof="0" dirty="0"/>
+              <a:t>M</a:t>
+            </a:r>
+          </a:p>
+        </p:txBody>
+      </p:sp>
+      <p:sp>
+        <p:nvSpPr>
+          <p:cNvPr id="22" name="Oval 21">
+            <a:extLst>
+              <a:ext uri="{FF2B5EF4-FFF2-40B4-BE49-F238E27FC236}">
+                <a16:creationId xmlns:a16="http://schemas.microsoft.com/office/drawing/2014/main" id="{161812A3-74C3-5DED-E6AC-6D4095EF3685}"/>
+              </a:ext>
+            </a:extLst>
+          </p:cNvPr>
+          <p:cNvSpPr/>
+          <p:nvPr/>
+        </p:nvSpPr>
+        <p:spPr>
+          <a:xfrm>
+            <a:off x="3916922" y="2604120"/>
+            <a:ext cx="323160" cy="322207"/>
+          </a:xfrm>
+          <a:prstGeom prst="ellipse">
+            <a:avLst/>
+          </a:prstGeom>
+          <a:solidFill>
+            <a:schemeClr val="accent5">
+              <a:lumMod val="40000"/>
+              <a:lumOff val="60000"/>
+            </a:schemeClr>
+          </a:solidFill>
+        </p:spPr>
+        <p:style>
+          <a:lnRef idx="2">
+            <a:schemeClr val="dk1"/>
+          </a:lnRef>
+          <a:fillRef idx="1">
+            <a:schemeClr val="lt1"/>
+          </a:fillRef>
+          <a:effectRef idx="0">
+            <a:schemeClr val="dk1"/>
+          </a:effectRef>
+          <a:fontRef idx="minor">
+            <a:schemeClr val="dk1"/>
+          </a:fontRef>
+        </p:style>
+        <p:txBody>
+          <a:bodyPr rtlCol="0" anchor="ctr"/>
+          <a:lstStyle/>
+          <a:p>
+            <a:pPr algn="ctr"/>
+            <a:r>
+              <a:rPr lang="nl-NL" dirty="0"/>
+              <a:t>C</a:t>
+            </a:r>
+            <a:endParaRPr lang="nl-NL" noProof="0" dirty="0"/>
+          </a:p>
+        </p:txBody>
+      </p:sp>
+      <p:sp>
+        <p:nvSpPr>
+          <p:cNvPr id="26" name="Oval 25">
+            <a:extLst>
+              <a:ext uri="{FF2B5EF4-FFF2-40B4-BE49-F238E27FC236}">
+                <a16:creationId xmlns:a16="http://schemas.microsoft.com/office/drawing/2014/main" id="{CE05E4B4-A8ED-5F3D-3E96-A3CE2860D467}"/>
+              </a:ext>
+            </a:extLst>
+          </p:cNvPr>
+          <p:cNvSpPr/>
+          <p:nvPr/>
+        </p:nvSpPr>
+        <p:spPr>
+          <a:xfrm>
+            <a:off x="5357970" y="2604119"/>
+            <a:ext cx="323160" cy="322207"/>
+          </a:xfrm>
+          <a:prstGeom prst="ellipse">
+            <a:avLst/>
+          </a:prstGeom>
+          <a:solidFill>
+            <a:schemeClr val="accent5">
+              <a:lumMod val="40000"/>
+              <a:lumOff val="60000"/>
+            </a:schemeClr>
+          </a:solidFill>
+        </p:spPr>
+        <p:style>
+          <a:lnRef idx="2">
+            <a:schemeClr val="dk1"/>
+          </a:lnRef>
+          <a:fillRef idx="1">
+            <a:schemeClr val="lt1"/>
+          </a:fillRef>
+          <a:effectRef idx="0">
+            <a:schemeClr val="dk1"/>
+          </a:effectRef>
+          <a:fontRef idx="minor">
+            <a:schemeClr val="dk1"/>
+          </a:fontRef>
+        </p:style>
+        <p:txBody>
+          <a:bodyPr rtlCol="0" anchor="ctr"/>
+          <a:lstStyle/>
+          <a:p>
+            <a:pPr algn="ctr"/>
+            <a:r>
+              <a:rPr lang="nl-NL" dirty="0"/>
+              <a:t>C</a:t>
+            </a:r>
+            <a:endParaRPr lang="nl-NL" noProof="0" dirty="0"/>
+          </a:p>
+        </p:txBody>
+      </p:sp>
+      <p:cxnSp>
+        <p:nvCxnSpPr>
+          <p:cNvPr id="36" name="Connector: Elbow 35">
+            <a:extLst>
+              <a:ext uri="{FF2B5EF4-FFF2-40B4-BE49-F238E27FC236}">
+                <a16:creationId xmlns:a16="http://schemas.microsoft.com/office/drawing/2014/main" id="{0C61ABA4-97FE-967E-0373-BFD2F06ED8B3}"/>
+              </a:ext>
+            </a:extLst>
+          </p:cNvPr>
+          <p:cNvCxnSpPr>
+            <a:cxnSpLocks/>
+            <a:stCxn id="19" idx="4"/>
+            <a:endCxn id="3" idx="2"/>
+          </p:cNvCxnSpPr>
+          <p:nvPr/>
+        </p:nvCxnSpPr>
+        <p:spPr>
+          <a:xfrm rot="16200000" flipH="1">
+            <a:off x="3022223" y="2859572"/>
+            <a:ext cx="1005345" cy="1138857"/>
+          </a:xfrm>
+          <a:prstGeom prst="bentConnector2">
+            <a:avLst/>
+          </a:prstGeom>
+          <a:ln>
+            <a:tailEnd type="triangle"/>
+          </a:ln>
+        </p:spPr>
+        <p:style>
+          <a:lnRef idx="2">
+            <a:schemeClr val="accent2"/>
+          </a:lnRef>
+          <a:fillRef idx="0">
+            <a:schemeClr val="accent2"/>
+          </a:fillRef>
+          <a:effectRef idx="1">
+            <a:schemeClr val="accent2"/>
+          </a:effectRef>
+          <a:fontRef idx="minor">
+            <a:schemeClr val="tx1"/>
+          </a:fontRef>
+        </p:style>
+      </p:cxnSp>
+      <p:cxnSp>
+        <p:nvCxnSpPr>
+          <p:cNvPr id="40" name="Straight Connector 39">
+            <a:extLst>
+              <a:ext uri="{FF2B5EF4-FFF2-40B4-BE49-F238E27FC236}">
+                <a16:creationId xmlns:a16="http://schemas.microsoft.com/office/drawing/2014/main" id="{606E1085-7B31-DECB-7FF7-15755300F21B}"/>
+              </a:ext>
+            </a:extLst>
+          </p:cNvPr>
+          <p:cNvCxnSpPr>
+            <a:stCxn id="3" idx="6"/>
+            <a:endCxn id="23" idx="2"/>
+          </p:cNvCxnSpPr>
+          <p:nvPr/>
+        </p:nvCxnSpPr>
+        <p:spPr>
+          <a:xfrm>
+            <a:off x="4417484" y="3931674"/>
+            <a:ext cx="1270550" cy="0"/>
+          </a:xfrm>
+          <a:prstGeom prst="line">
+            <a:avLst/>
+          </a:prstGeom>
+        </p:spPr>
+        <p:style>
+          <a:lnRef idx="2">
+            <a:schemeClr val="accent2"/>
+          </a:lnRef>
+          <a:fillRef idx="0">
+            <a:schemeClr val="accent2"/>
+          </a:fillRef>
+          <a:effectRef idx="1">
+            <a:schemeClr val="accent2"/>
+          </a:effectRef>
+          <a:fontRef idx="minor">
+            <a:schemeClr val="tx1"/>
+          </a:fontRef>
+        </p:style>
+      </p:cxnSp>
+      <p:cxnSp>
+        <p:nvCxnSpPr>
+          <p:cNvPr id="43" name="Straight Connector 42">
+            <a:extLst>
+              <a:ext uri="{FF2B5EF4-FFF2-40B4-BE49-F238E27FC236}">
+                <a16:creationId xmlns:a16="http://schemas.microsoft.com/office/drawing/2014/main" id="{BF6743CD-7A32-26FB-685A-BD150B1BBF01}"/>
+              </a:ext>
+            </a:extLst>
+          </p:cNvPr>
+          <p:cNvCxnSpPr>
+            <a:stCxn id="23" idx="6"/>
+            <a:endCxn id="4" idx="2"/>
+          </p:cNvCxnSpPr>
+          <p:nvPr/>
+        </p:nvCxnSpPr>
+        <p:spPr>
+          <a:xfrm flipV="1">
+            <a:off x="6011194" y="3931673"/>
+            <a:ext cx="1141404" cy="1"/>
+          </a:xfrm>
+          <a:prstGeom prst="line">
+            <a:avLst/>
+          </a:prstGeom>
+        </p:spPr>
+        <p:style>
+          <a:lnRef idx="2">
+            <a:schemeClr val="accent2"/>
+          </a:lnRef>
+          <a:fillRef idx="0">
+            <a:schemeClr val="accent2"/>
+          </a:fillRef>
+          <a:effectRef idx="1">
+            <a:schemeClr val="accent2"/>
+          </a:effectRef>
+          <a:fontRef idx="minor">
+            <a:schemeClr val="tx1"/>
+          </a:fontRef>
+        </p:style>
+      </p:cxnSp>
+      <p:cxnSp>
+        <p:nvCxnSpPr>
+          <p:cNvPr id="45" name="Connector: Elbow 44">
+            <a:extLst>
+              <a:ext uri="{FF2B5EF4-FFF2-40B4-BE49-F238E27FC236}">
+                <a16:creationId xmlns:a16="http://schemas.microsoft.com/office/drawing/2014/main" id="{22299C49-3267-4FB8-23E1-068F1DD0BEAE}"/>
+              </a:ext>
+            </a:extLst>
+          </p:cNvPr>
+          <p:cNvCxnSpPr>
+            <a:stCxn id="4" idx="6"/>
+            <a:endCxn id="6" idx="4"/>
+          </p:cNvCxnSpPr>
+          <p:nvPr/>
+        </p:nvCxnSpPr>
+        <p:spPr>
+          <a:xfrm flipV="1">
+            <a:off x="7475758" y="2926326"/>
+            <a:ext cx="870052" cy="1005347"/>
+          </a:xfrm>
+          <a:prstGeom prst="bentConnector2">
+            <a:avLst/>
+          </a:prstGeom>
+          <a:ln>
+            <a:tailEnd type="triangle"/>
+          </a:ln>
+        </p:spPr>
+        <p:style>
+          <a:lnRef idx="2">
+            <a:schemeClr val="accent2"/>
+          </a:lnRef>
+          <a:fillRef idx="0">
+            <a:schemeClr val="accent2"/>
+          </a:fillRef>
+          <a:effectRef idx="1">
+            <a:schemeClr val="accent2"/>
+          </a:effectRef>
+          <a:fontRef idx="minor">
+            <a:schemeClr val="tx1"/>
+          </a:fontRef>
+        </p:style>
+      </p:cxnSp>
+      <p:cxnSp>
+        <p:nvCxnSpPr>
+          <p:cNvPr id="47" name="Connector: Elbow 46">
+            <a:extLst>
+              <a:ext uri="{FF2B5EF4-FFF2-40B4-BE49-F238E27FC236}">
+                <a16:creationId xmlns:a16="http://schemas.microsoft.com/office/drawing/2014/main" id="{AE8154D0-A3AD-3E49-57E1-D2950C46D9E1}"/>
+              </a:ext>
+            </a:extLst>
+          </p:cNvPr>
+          <p:cNvCxnSpPr>
+            <a:stCxn id="26" idx="6"/>
+            <a:endCxn id="4" idx="2"/>
+          </p:cNvCxnSpPr>
+          <p:nvPr/>
+        </p:nvCxnSpPr>
+        <p:spPr>
+          <a:xfrm>
+            <a:off x="5681130" y="2765223"/>
+            <a:ext cx="1471468" cy="1166450"/>
+          </a:xfrm>
+          <a:prstGeom prst="bentConnector3">
+            <a:avLst>
+              <a:gd name="adj1" fmla="val 78203"/>
+            </a:avLst>
+          </a:prstGeom>
+          <a:ln>
+            <a:tailEnd type="triangle"/>
+          </a:ln>
+        </p:spPr>
+        <p:style>
+          <a:lnRef idx="2">
+            <a:schemeClr val="dk1"/>
+          </a:lnRef>
+          <a:fillRef idx="0">
+            <a:schemeClr val="dk1"/>
+          </a:fillRef>
+          <a:effectRef idx="1">
+            <a:schemeClr val="dk1"/>
+          </a:effectRef>
+          <a:fontRef idx="minor">
+            <a:schemeClr val="tx1"/>
+          </a:fontRef>
+        </p:style>
+      </p:cxnSp>
+      <p:sp>
+        <p:nvSpPr>
+          <p:cNvPr id="49" name="TextBox 48">
+            <a:extLst>
+              <a:ext uri="{FF2B5EF4-FFF2-40B4-BE49-F238E27FC236}">
+                <a16:creationId xmlns:a16="http://schemas.microsoft.com/office/drawing/2014/main" id="{ED3180F2-2F03-DDEC-91FB-5E512883C020}"/>
+              </a:ext>
+            </a:extLst>
+          </p:cNvPr>
+          <p:cNvSpPr txBox="1"/>
+          <p:nvPr/>
+        </p:nvSpPr>
+        <p:spPr>
+          <a:xfrm>
+            <a:off x="5220398" y="3163782"/>
+            <a:ext cx="1586845" cy="369332"/>
+          </a:xfrm>
+          <a:prstGeom prst="rect">
+            <a:avLst/>
+          </a:prstGeom>
+          <a:noFill/>
+        </p:spPr>
+        <p:txBody>
+          <a:bodyPr wrap="none" rtlCol="0">
+            <a:spAutoFit/>
+          </a:bodyPr>
+          <a:lstStyle/>
+          <a:p>
+            <a:r>
+              <a:rPr lang="nl-NL" dirty="0" err="1"/>
+              <a:t>merge</a:t>
+            </a:r>
+            <a:r>
+              <a:rPr lang="nl-NL" dirty="0"/>
               <a:t> </a:t>
             </a:r>
             <a:r>
-              <a:rPr lang="nl-NL" sz="1800" noProof="0" dirty="0" err="1">
-                <a:latin typeface="Courier New" panose="02070309020205020404" pitchFamily="49" charset="0"/>
-                <a:cs typeface="Courier New" panose="02070309020205020404" pitchFamily="49" charset="0"/>
-              </a:rPr>
-              <a:t>message</a:t>
-            </a:r>
-            <a:r>
-              <a:rPr lang="nl-NL" sz="1800" noProof="0" dirty="0">
-                <a:latin typeface="Courier New" panose="02070309020205020404" pitchFamily="49" charset="0"/>
-                <a:cs typeface="Courier New" panose="02070309020205020404" pitchFamily="49" charset="0"/>
-              </a:rPr>
-              <a:t>"</a:t>
-            </a:r>
+              <a:rPr lang="nl-NL" dirty="0" err="1"/>
+              <a:t>develop</a:t>
+            </a:r>
+            <a:endParaRPr lang="nl-NL" dirty="0"/>
+          </a:p>
+        </p:txBody>
+      </p:sp>
+      <p:sp>
+        <p:nvSpPr>
+          <p:cNvPr id="50" name="TextBox 49">
+            <a:extLst>
+              <a:ext uri="{FF2B5EF4-FFF2-40B4-BE49-F238E27FC236}">
+                <a16:creationId xmlns:a16="http://schemas.microsoft.com/office/drawing/2014/main" id="{4E296F20-97E4-1A46-5DFE-A1D12F76AD59}"/>
+              </a:ext>
+            </a:extLst>
+          </p:cNvPr>
+          <p:cNvSpPr txBox="1"/>
+          <p:nvPr/>
+        </p:nvSpPr>
+        <p:spPr>
+          <a:xfrm>
+            <a:off x="8363879" y="3140831"/>
+            <a:ext cx="1516825" cy="369332"/>
+          </a:xfrm>
+          <a:prstGeom prst="rect">
+            <a:avLst/>
+          </a:prstGeom>
+          <a:noFill/>
+        </p:spPr>
+        <p:txBody>
+          <a:bodyPr wrap="none" rtlCol="0">
+            <a:spAutoFit/>
+          </a:bodyPr>
+          <a:lstStyle/>
+          <a:p>
+            <a:r>
+              <a:rPr lang="nl-NL" dirty="0" err="1"/>
+              <a:t>merge</a:t>
+            </a:r>
+            <a:r>
+              <a:rPr lang="nl-NL" dirty="0"/>
+              <a:t> feature</a:t>
+            </a:r>
+          </a:p>
+        </p:txBody>
+      </p:sp>
+      <p:sp>
+        <p:nvSpPr>
+          <p:cNvPr id="7" name="Explosion: 14 Points 6">
+            <a:extLst>
+              <a:ext uri="{FF2B5EF4-FFF2-40B4-BE49-F238E27FC236}">
+                <a16:creationId xmlns:a16="http://schemas.microsoft.com/office/drawing/2014/main" id="{098BF1F5-F507-8E5D-C335-E5EA004A24B4}"/>
+              </a:ext>
+            </a:extLst>
+          </p:cNvPr>
+          <p:cNvSpPr/>
+          <p:nvPr/>
+        </p:nvSpPr>
+        <p:spPr>
+          <a:xfrm>
+            <a:off x="6948513" y="3533114"/>
+            <a:ext cx="778179" cy="774542"/>
+          </a:xfrm>
+          <a:prstGeom prst="irregularSeal2">
+            <a:avLst/>
+          </a:prstGeom>
+          <a:noFill/>
+          <a:ln>
+            <a:solidFill>
+              <a:srgbClr val="FF0000"/>
+            </a:solidFill>
+          </a:ln>
+        </p:spPr>
+        <p:style>
+          <a:lnRef idx="2">
+            <a:schemeClr val="accent1">
+              <a:shade val="15000"/>
+            </a:schemeClr>
+          </a:lnRef>
+          <a:fillRef idx="1">
+            <a:schemeClr val="accent1"/>
+          </a:fillRef>
+          <a:effectRef idx="0">
+            <a:schemeClr val="accent1"/>
+          </a:effectRef>
+          <a:fontRef idx="minor">
+            <a:schemeClr val="lt1"/>
+          </a:fontRef>
+        </p:style>
+        <p:txBody>
+          <a:bodyPr rtlCol="0" anchor="ctr"/>
+          <a:lstStyle/>
+          <a:p>
+            <a:pPr algn="ctr"/>
+            <a:endParaRPr lang="nl-NL" noProof="0" dirty="0"/>
           </a:p>
         </p:txBody>
       </p:sp>
     </p:spTree>
     <p:extLst>
       <p:ext uri="{BB962C8B-B14F-4D97-AF65-F5344CB8AC3E}">
-        <p14:creationId xmlns:p14="http://schemas.microsoft.com/office/powerpoint/2010/main" val="1037585435"/>
+        <p14:creationId xmlns:p14="http://schemas.microsoft.com/office/powerpoint/2010/main" val="2445000840"/>
       </p:ext>
     </p:extLst>
   </p:cSld>
@@ -50995,6 +52398,437 @@
 </file>
 
 <file path=ppt/slides/slide70.xml><?xml version="1.0" encoding="utf-8"?>
+<p:sld xmlns:a="http://schemas.openxmlformats.org/drawingml/2006/main" xmlns:r="http://schemas.openxmlformats.org/officeDocument/2006/relationships" xmlns:p="http://schemas.openxmlformats.org/presentationml/2006/main" show="0">
+  <p:cSld>
+    <p:spTree>
+      <p:nvGrpSpPr>
+        <p:cNvPr id="1" name="">
+          <a:extLst>
+            <a:ext uri="{FF2B5EF4-FFF2-40B4-BE49-F238E27FC236}">
+              <a16:creationId xmlns:a16="http://schemas.microsoft.com/office/drawing/2014/main" id="{D128C513-936A-1EAB-7785-33C1B6BF5689}"/>
+            </a:ext>
+          </a:extLst>
+        </p:cNvPr>
+        <p:cNvGrpSpPr/>
+        <p:nvPr/>
+      </p:nvGrpSpPr>
+      <p:grpSpPr>
+        <a:xfrm>
+          <a:off x="0" y="0"/>
+          <a:ext cx="0" cy="0"/>
+          <a:chOff x="0" y="0"/>
+          <a:chExt cx="0" cy="0"/>
+        </a:xfrm>
+      </p:grpSpPr>
+      <p:sp>
+        <p:nvSpPr>
+          <p:cNvPr id="4" name="Title 3">
+            <a:extLst>
+              <a:ext uri="{FF2B5EF4-FFF2-40B4-BE49-F238E27FC236}">
+                <a16:creationId xmlns:a16="http://schemas.microsoft.com/office/drawing/2014/main" id="{E6D7E2C0-8474-54CA-8F63-21F447CF6B43}"/>
+              </a:ext>
+            </a:extLst>
+          </p:cNvPr>
+          <p:cNvSpPr>
+            <a:spLocks noGrp="1"/>
+          </p:cNvSpPr>
+          <p:nvPr>
+            <p:ph type="title"/>
+          </p:nvPr>
+        </p:nvSpPr>
+        <p:spPr/>
+        <p:txBody>
+          <a:bodyPr/>
+          <a:lstStyle/>
+          <a:p>
+            <a:r>
+              <a:rPr lang="nl-NL" noProof="0" dirty="0"/>
+              <a:t>Samenvatting</a:t>
+            </a:r>
+          </a:p>
+        </p:txBody>
+      </p:sp>
+      <p:sp>
+        <p:nvSpPr>
+          <p:cNvPr id="5" name="Text Placeholder 4">
+            <a:extLst>
+              <a:ext uri="{FF2B5EF4-FFF2-40B4-BE49-F238E27FC236}">
+                <a16:creationId xmlns:a16="http://schemas.microsoft.com/office/drawing/2014/main" id="{668BB568-9283-7220-4E18-6185FED86C3E}"/>
+              </a:ext>
+            </a:extLst>
+          </p:cNvPr>
+          <p:cNvSpPr>
+            <a:spLocks noGrp="1"/>
+          </p:cNvSpPr>
+          <p:nvPr>
+            <p:ph type="body" idx="1"/>
+          </p:nvPr>
+        </p:nvSpPr>
+        <p:spPr/>
+        <p:txBody>
+          <a:bodyPr/>
+          <a:lstStyle/>
+          <a:p>
+            <a:endParaRPr lang="nl-NL" noProof="0" dirty="0"/>
+          </a:p>
+        </p:txBody>
+      </p:sp>
+    </p:spTree>
+    <p:extLst>
+      <p:ext uri="{BB962C8B-B14F-4D97-AF65-F5344CB8AC3E}">
+        <p14:creationId xmlns:p14="http://schemas.microsoft.com/office/powerpoint/2010/main" val="2647715182"/>
+      </p:ext>
+    </p:extLst>
+  </p:cSld>
+  <p:clrMapOvr>
+    <a:masterClrMapping/>
+  </p:clrMapOvr>
+</p:sld>
+</file>
+
+<file path=ppt/slides/slide71.xml><?xml version="1.0" encoding="utf-8"?>
+<p:sld xmlns:a="http://schemas.openxmlformats.org/drawingml/2006/main" xmlns:r="http://schemas.openxmlformats.org/officeDocument/2006/relationships" xmlns:p="http://schemas.openxmlformats.org/presentationml/2006/main" show="0">
+  <p:cSld>
+    <p:spTree>
+      <p:nvGrpSpPr>
+        <p:cNvPr id="1" name="">
+          <a:extLst>
+            <a:ext uri="{FF2B5EF4-FFF2-40B4-BE49-F238E27FC236}">
+              <a16:creationId xmlns:a16="http://schemas.microsoft.com/office/drawing/2014/main" id="{D1FC3A8E-AF03-D3BD-C11D-DE29C79BA4D2}"/>
+            </a:ext>
+          </a:extLst>
+        </p:cNvPr>
+        <p:cNvGrpSpPr/>
+        <p:nvPr/>
+      </p:nvGrpSpPr>
+      <p:grpSpPr>
+        <a:xfrm>
+          <a:off x="0" y="0"/>
+          <a:ext cx="0" cy="0"/>
+          <a:chOff x="0" y="0"/>
+          <a:chExt cx="0" cy="0"/>
+        </a:xfrm>
+      </p:grpSpPr>
+      <p:sp>
+        <p:nvSpPr>
+          <p:cNvPr id="2" name="Title 1">
+            <a:extLst>
+              <a:ext uri="{FF2B5EF4-FFF2-40B4-BE49-F238E27FC236}">
+                <a16:creationId xmlns:a16="http://schemas.microsoft.com/office/drawing/2014/main" id="{15A16D41-5602-4F88-B5AF-67584E1AC4EE}"/>
+              </a:ext>
+            </a:extLst>
+          </p:cNvPr>
+          <p:cNvSpPr>
+            <a:spLocks noGrp="1"/>
+          </p:cNvSpPr>
+          <p:nvPr>
+            <p:ph type="title"/>
+          </p:nvPr>
+        </p:nvSpPr>
+        <p:spPr>
+          <a:xfrm>
+            <a:off x="838200" y="365126"/>
+            <a:ext cx="10515600" cy="718608"/>
+          </a:xfrm>
+        </p:spPr>
+        <p:txBody>
+          <a:bodyPr>
+            <a:normAutofit/>
+          </a:bodyPr>
+          <a:lstStyle/>
+          <a:p>
+            <a:r>
+              <a:rPr lang="nl-NL" sz="3600" noProof="0" dirty="0" err="1"/>
+              <a:t>Repo</a:t>
+            </a:r>
+            <a:r>
+              <a:rPr lang="nl-NL" sz="3600" noProof="0" dirty="0"/>
+              <a:t> maken &amp; </a:t>
+            </a:r>
+            <a:r>
+              <a:rPr lang="nl-NL" sz="3600" noProof="0" dirty="0" err="1"/>
+              <a:t>committen</a:t>
+            </a:r>
+            <a:endParaRPr lang="nl-NL" sz="3600" noProof="0" dirty="0"/>
+          </a:p>
+        </p:txBody>
+      </p:sp>
+      <p:sp>
+        <p:nvSpPr>
+          <p:cNvPr id="9" name="Content Placeholder 2">
+            <a:extLst>
+              <a:ext uri="{FF2B5EF4-FFF2-40B4-BE49-F238E27FC236}">
+                <a16:creationId xmlns:a16="http://schemas.microsoft.com/office/drawing/2014/main" id="{16A062CA-3D31-FB0E-8FEF-BF44ED8BA95E}"/>
+              </a:ext>
+            </a:extLst>
+          </p:cNvPr>
+          <p:cNvSpPr>
+            <a:spLocks noGrp="1"/>
+          </p:cNvSpPr>
+          <p:nvPr>
+            <p:ph idx="1"/>
+          </p:nvPr>
+        </p:nvSpPr>
+        <p:spPr>
+          <a:xfrm>
+            <a:off x="838200" y="1456267"/>
+            <a:ext cx="5520398" cy="4720696"/>
+          </a:xfrm>
+        </p:spPr>
+        <p:txBody>
+          <a:bodyPr>
+            <a:normAutofit lnSpcReduction="10000"/>
+          </a:bodyPr>
+          <a:lstStyle/>
+          <a:p>
+            <a:pPr marL="0" indent="0">
+              <a:buNone/>
+            </a:pPr>
+            <a:r>
+              <a:rPr lang="nl-NL" sz="1800" noProof="0" dirty="0">
+                <a:cs typeface="Courier New" panose="02070309020205020404" pitchFamily="49" charset="0"/>
+              </a:rPr>
+              <a:t>Nieuw lokaal </a:t>
+            </a:r>
+            <a:r>
+              <a:rPr lang="nl-NL" sz="1800" noProof="0" dirty="0" err="1">
+                <a:cs typeface="Courier New" panose="02070309020205020404" pitchFamily="49" charset="0"/>
+              </a:rPr>
+              <a:t>repo</a:t>
+            </a:r>
+            <a:r>
+              <a:rPr lang="nl-NL" sz="1800" noProof="0" dirty="0">
+                <a:cs typeface="Courier New" panose="02070309020205020404" pitchFamily="49" charset="0"/>
+              </a:rPr>
+              <a:t> aanmaken:</a:t>
+            </a:r>
+          </a:p>
+          <a:p>
+            <a:pPr marL="0" indent="0">
+              <a:buNone/>
+            </a:pPr>
+            <a:r>
+              <a:rPr lang="nl-NL" sz="1800" noProof="0" dirty="0">
+                <a:latin typeface="Courier New" panose="02070309020205020404" pitchFamily="49" charset="0"/>
+                <a:cs typeface="Courier New" panose="02070309020205020404" pitchFamily="49" charset="0"/>
+              </a:rPr>
+              <a:t>git </a:t>
+            </a:r>
+            <a:r>
+              <a:rPr lang="nl-NL" sz="1800" noProof="0" dirty="0" err="1">
+                <a:latin typeface="Courier New" panose="02070309020205020404" pitchFamily="49" charset="0"/>
+                <a:cs typeface="Courier New" panose="02070309020205020404" pitchFamily="49" charset="0"/>
+              </a:rPr>
+              <a:t>init</a:t>
+            </a:r>
+            <a:endParaRPr lang="nl-NL" sz="1800" noProof="0" dirty="0">
+              <a:latin typeface="Courier New" panose="02070309020205020404" pitchFamily="49" charset="0"/>
+              <a:cs typeface="Courier New" panose="02070309020205020404" pitchFamily="49" charset="0"/>
+            </a:endParaRPr>
+          </a:p>
+          <a:p>
+            <a:pPr marL="0" indent="0">
+              <a:buNone/>
+            </a:pPr>
+            <a:endParaRPr lang="nl-NL" sz="1800" noProof="0" dirty="0">
+              <a:cs typeface="Courier New" panose="02070309020205020404" pitchFamily="49" charset="0"/>
+            </a:endParaRPr>
+          </a:p>
+          <a:p>
+            <a:pPr marL="0" indent="0">
+              <a:buNone/>
+            </a:pPr>
+            <a:r>
+              <a:rPr lang="nl-NL" sz="1800" noProof="0" dirty="0">
+                <a:cs typeface="Courier New" panose="02070309020205020404" pitchFamily="49" charset="0"/>
+              </a:rPr>
+              <a:t>Wijzigingen toevoegen aan de index:</a:t>
+            </a:r>
+          </a:p>
+          <a:p>
+            <a:pPr marL="0" indent="0">
+              <a:buNone/>
+            </a:pPr>
+            <a:r>
+              <a:rPr lang="nl-NL" sz="1800" noProof="0" dirty="0">
+                <a:latin typeface="Courier New" panose="02070309020205020404" pitchFamily="49" charset="0"/>
+                <a:cs typeface="Courier New" panose="02070309020205020404" pitchFamily="49" charset="0"/>
+              </a:rPr>
+              <a:t>git </a:t>
+            </a:r>
+            <a:r>
+              <a:rPr lang="nl-NL" sz="1800" noProof="0" dirty="0" err="1">
+                <a:latin typeface="Courier New" panose="02070309020205020404" pitchFamily="49" charset="0"/>
+                <a:cs typeface="Courier New" panose="02070309020205020404" pitchFamily="49" charset="0"/>
+              </a:rPr>
+              <a:t>add</a:t>
+            </a:r>
+            <a:r>
+              <a:rPr lang="nl-NL" sz="1800" noProof="0" dirty="0">
+                <a:latin typeface="Courier New" panose="02070309020205020404" pitchFamily="49" charset="0"/>
+                <a:cs typeface="Courier New" panose="02070309020205020404" pitchFamily="49" charset="0"/>
+              </a:rPr>
+              <a:t> -A</a:t>
+            </a:r>
+          </a:p>
+          <a:p>
+            <a:pPr marL="0" indent="0">
+              <a:buNone/>
+            </a:pPr>
+            <a:r>
+              <a:rPr lang="nl-NL" sz="1800" noProof="0" dirty="0">
+                <a:latin typeface="Courier New" panose="02070309020205020404" pitchFamily="49" charset="0"/>
+                <a:cs typeface="Courier New" panose="02070309020205020404" pitchFamily="49" charset="0"/>
+              </a:rPr>
+              <a:t>git </a:t>
+            </a:r>
+            <a:r>
+              <a:rPr lang="nl-NL" sz="1800" noProof="0" dirty="0" err="1">
+                <a:latin typeface="Courier New" panose="02070309020205020404" pitchFamily="49" charset="0"/>
+                <a:cs typeface="Courier New" panose="02070309020205020404" pitchFamily="49" charset="0"/>
+              </a:rPr>
+              <a:t>add</a:t>
+            </a:r>
+            <a:r>
+              <a:rPr lang="nl-NL" sz="1800" noProof="0" dirty="0">
+                <a:latin typeface="Courier New" panose="02070309020205020404" pitchFamily="49" charset="0"/>
+                <a:cs typeface="Courier New" panose="02070309020205020404" pitchFamily="49" charset="0"/>
+              </a:rPr>
+              <a:t> &lt;file&gt;</a:t>
+            </a:r>
+          </a:p>
+          <a:p>
+            <a:pPr marL="0" indent="0">
+              <a:buNone/>
+            </a:pPr>
+            <a:endParaRPr lang="nl-NL" sz="1800" noProof="0" dirty="0">
+              <a:cs typeface="Courier New" panose="02070309020205020404" pitchFamily="49" charset="0"/>
+            </a:endParaRPr>
+          </a:p>
+          <a:p>
+            <a:pPr marL="0" indent="0">
+              <a:buNone/>
+            </a:pPr>
+            <a:r>
+              <a:rPr lang="nl-NL" sz="1800" noProof="0" dirty="0">
+                <a:cs typeface="Courier New" panose="02070309020205020404" pitchFamily="49" charset="0"/>
+              </a:rPr>
+              <a:t>Wijzigingen weghalen uit de index:</a:t>
+            </a:r>
+          </a:p>
+          <a:p>
+            <a:pPr marL="0" indent="0">
+              <a:buNone/>
+            </a:pPr>
+            <a:r>
+              <a:rPr lang="nl-NL" sz="1800" noProof="0" dirty="0">
+                <a:latin typeface="Courier New" panose="02070309020205020404" pitchFamily="49" charset="0"/>
+                <a:cs typeface="Courier New" panose="02070309020205020404" pitchFamily="49" charset="0"/>
+              </a:rPr>
+              <a:t>git reset</a:t>
+            </a:r>
+          </a:p>
+          <a:p>
+            <a:pPr marL="0" indent="0">
+              <a:buNone/>
+            </a:pPr>
+            <a:r>
+              <a:rPr lang="nl-NL" sz="1800" noProof="0" dirty="0">
+                <a:latin typeface="Courier New" panose="02070309020205020404" pitchFamily="49" charset="0"/>
+                <a:cs typeface="Courier New" panose="02070309020205020404" pitchFamily="49" charset="0"/>
+              </a:rPr>
+              <a:t>git reset &lt;file&gt;</a:t>
+            </a:r>
+          </a:p>
+          <a:p>
+            <a:pPr marL="0" indent="0">
+              <a:buNone/>
+            </a:pPr>
+            <a:endParaRPr lang="nl-NL" sz="1800" noProof="0" dirty="0">
+              <a:cs typeface="Courier New" panose="02070309020205020404" pitchFamily="49" charset="0"/>
+            </a:endParaRPr>
+          </a:p>
+          <a:p>
+            <a:pPr marL="0" indent="0">
+              <a:buNone/>
+            </a:pPr>
+            <a:r>
+              <a:rPr lang="nl-NL" sz="1800" noProof="0" dirty="0">
+                <a:cs typeface="Courier New" panose="02070309020205020404" pitchFamily="49" charset="0"/>
+              </a:rPr>
+              <a:t>Wijzigingen opslaan in repository:</a:t>
+            </a:r>
+          </a:p>
+          <a:p>
+            <a:pPr marL="0" indent="0">
+              <a:buNone/>
+            </a:pPr>
+            <a:r>
+              <a:rPr lang="nl-NL" sz="1800" noProof="0" dirty="0">
+                <a:latin typeface="Courier New" panose="02070309020205020404" pitchFamily="49" charset="0"/>
+                <a:cs typeface="Courier New" panose="02070309020205020404" pitchFamily="49" charset="0"/>
+              </a:rPr>
+              <a:t>git </a:t>
+            </a:r>
+            <a:r>
+              <a:rPr lang="nl-NL" sz="1800" noProof="0" dirty="0" err="1">
+                <a:latin typeface="Courier New" panose="02070309020205020404" pitchFamily="49" charset="0"/>
+                <a:cs typeface="Courier New" panose="02070309020205020404" pitchFamily="49" charset="0"/>
+              </a:rPr>
+              <a:t>commit</a:t>
+            </a:r>
+            <a:r>
+              <a:rPr lang="nl-NL" sz="1800" noProof="0" dirty="0">
+                <a:latin typeface="Courier New" panose="02070309020205020404" pitchFamily="49" charset="0"/>
+                <a:cs typeface="Courier New" panose="02070309020205020404" pitchFamily="49" charset="0"/>
+              </a:rPr>
+              <a:t> –m "</a:t>
+            </a:r>
+            <a:r>
+              <a:rPr lang="nl-NL" sz="1800" noProof="0" dirty="0" err="1">
+                <a:latin typeface="Courier New" panose="02070309020205020404" pitchFamily="49" charset="0"/>
+                <a:cs typeface="Courier New" panose="02070309020205020404" pitchFamily="49" charset="0"/>
+              </a:rPr>
+              <a:t>Descriptive</a:t>
+            </a:r>
+            <a:r>
+              <a:rPr lang="nl-NL" sz="1800" noProof="0" dirty="0">
+                <a:latin typeface="Courier New" panose="02070309020205020404" pitchFamily="49" charset="0"/>
+                <a:cs typeface="Courier New" panose="02070309020205020404" pitchFamily="49" charset="0"/>
+              </a:rPr>
+              <a:t> </a:t>
+            </a:r>
+            <a:r>
+              <a:rPr lang="nl-NL" sz="1800" noProof="0" dirty="0" err="1">
+                <a:latin typeface="Courier New" panose="02070309020205020404" pitchFamily="49" charset="0"/>
+                <a:cs typeface="Courier New" panose="02070309020205020404" pitchFamily="49" charset="0"/>
+              </a:rPr>
+              <a:t>message</a:t>
+            </a:r>
+            <a:r>
+              <a:rPr lang="nl-NL" sz="1800" noProof="0" dirty="0">
+                <a:latin typeface="Courier New" panose="02070309020205020404" pitchFamily="49" charset="0"/>
+                <a:cs typeface="Courier New" panose="02070309020205020404" pitchFamily="49" charset="0"/>
+              </a:rPr>
+              <a:t>"</a:t>
+            </a:r>
+          </a:p>
+        </p:txBody>
+      </p:sp>
+    </p:spTree>
+    <p:extLst>
+      <p:ext uri="{BB962C8B-B14F-4D97-AF65-F5344CB8AC3E}">
+        <p14:creationId xmlns:p14="http://schemas.microsoft.com/office/powerpoint/2010/main" val="1037585435"/>
+      </p:ext>
+    </p:extLst>
+  </p:cSld>
+  <p:clrMapOvr>
+    <a:masterClrMapping/>
+  </p:clrMapOvr>
+</p:sld>
+</file>
+
+<file path=ppt/slides/slide72.xml><?xml version="1.0" encoding="utf-8"?>
 <p:sld xmlns:a="http://schemas.openxmlformats.org/drawingml/2006/main" xmlns:r="http://schemas.openxmlformats.org/officeDocument/2006/relationships" xmlns:p="http://schemas.openxmlformats.org/presentationml/2006/main" show="0">
   <p:cSld>
     <p:spTree>

</xml_diff>